<commit_message>
Added IDisposable to lesson #2 presentation
</commit_message>
<xml_diff>
--- a/Presentation/lesson-02.pptx
+++ b/Presentation/lesson-02.pptx
@@ -309,7 +309,7 @@
           <a:p>
             <a:fld id="{8E6E6A2A-E9D3-4A0D-B04A-ABDD367A1E08}" type="datetimeFigureOut">
               <a:rPr lang="ru-RU" smtClean="0"/>
-              <a:t>13.08.2012</a:t>
+              <a:t>14.08.2012</a:t>
             </a:fld>
             <a:endParaRPr lang="ru-RU"/>
           </a:p>
@@ -479,7 +479,7 @@
           <a:p>
             <a:fld id="{8E6E6A2A-E9D3-4A0D-B04A-ABDD367A1E08}" type="datetimeFigureOut">
               <a:rPr lang="ru-RU" smtClean="0"/>
-              <a:t>13.08.2012</a:t>
+              <a:t>14.08.2012</a:t>
             </a:fld>
             <a:endParaRPr lang="ru-RU"/>
           </a:p>
@@ -659,7 +659,7 @@
           <a:p>
             <a:fld id="{8E6E6A2A-E9D3-4A0D-B04A-ABDD367A1E08}" type="datetimeFigureOut">
               <a:rPr lang="ru-RU" smtClean="0"/>
-              <a:t>13.08.2012</a:t>
+              <a:t>14.08.2012</a:t>
             </a:fld>
             <a:endParaRPr lang="ru-RU"/>
           </a:p>
@@ -829,7 +829,7 @@
           <a:p>
             <a:fld id="{8E6E6A2A-E9D3-4A0D-B04A-ABDD367A1E08}" type="datetimeFigureOut">
               <a:rPr lang="ru-RU" smtClean="0"/>
-              <a:t>13.08.2012</a:t>
+              <a:t>14.08.2012</a:t>
             </a:fld>
             <a:endParaRPr lang="ru-RU"/>
           </a:p>
@@ -1075,7 +1075,7 @@
           <a:p>
             <a:fld id="{8E6E6A2A-E9D3-4A0D-B04A-ABDD367A1E08}" type="datetimeFigureOut">
               <a:rPr lang="ru-RU" smtClean="0"/>
-              <a:t>13.08.2012</a:t>
+              <a:t>14.08.2012</a:t>
             </a:fld>
             <a:endParaRPr lang="ru-RU"/>
           </a:p>
@@ -1363,7 +1363,7 @@
           <a:p>
             <a:fld id="{8E6E6A2A-E9D3-4A0D-B04A-ABDD367A1E08}" type="datetimeFigureOut">
               <a:rPr lang="ru-RU" smtClean="0"/>
-              <a:t>13.08.2012</a:t>
+              <a:t>14.08.2012</a:t>
             </a:fld>
             <a:endParaRPr lang="ru-RU"/>
           </a:p>
@@ -1785,7 +1785,7 @@
           <a:p>
             <a:fld id="{8E6E6A2A-E9D3-4A0D-B04A-ABDD367A1E08}" type="datetimeFigureOut">
               <a:rPr lang="ru-RU" smtClean="0"/>
-              <a:t>13.08.2012</a:t>
+              <a:t>14.08.2012</a:t>
             </a:fld>
             <a:endParaRPr lang="ru-RU"/>
           </a:p>
@@ -1903,7 +1903,7 @@
           <a:p>
             <a:fld id="{8E6E6A2A-E9D3-4A0D-B04A-ABDD367A1E08}" type="datetimeFigureOut">
               <a:rPr lang="ru-RU" smtClean="0"/>
-              <a:t>13.08.2012</a:t>
+              <a:t>14.08.2012</a:t>
             </a:fld>
             <a:endParaRPr lang="ru-RU"/>
           </a:p>
@@ -1998,7 +1998,7 @@
           <a:p>
             <a:fld id="{8E6E6A2A-E9D3-4A0D-B04A-ABDD367A1E08}" type="datetimeFigureOut">
               <a:rPr lang="ru-RU" smtClean="0"/>
-              <a:t>13.08.2012</a:t>
+              <a:t>14.08.2012</a:t>
             </a:fld>
             <a:endParaRPr lang="ru-RU"/>
           </a:p>
@@ -2275,7 +2275,7 @@
           <a:p>
             <a:fld id="{8E6E6A2A-E9D3-4A0D-B04A-ABDD367A1E08}" type="datetimeFigureOut">
               <a:rPr lang="ru-RU" smtClean="0"/>
-              <a:t>13.08.2012</a:t>
+              <a:t>14.08.2012</a:t>
             </a:fld>
             <a:endParaRPr lang="ru-RU"/>
           </a:p>
@@ -2528,7 +2528,7 @@
           <a:p>
             <a:fld id="{8E6E6A2A-E9D3-4A0D-B04A-ABDD367A1E08}" type="datetimeFigureOut">
               <a:rPr lang="ru-RU" smtClean="0"/>
-              <a:t>13.08.2012</a:t>
+              <a:t>14.08.2012</a:t>
             </a:fld>
             <a:endParaRPr lang="ru-RU"/>
           </a:p>
@@ -2741,7 +2741,7 @@
           <a:p>
             <a:fld id="{8E6E6A2A-E9D3-4A0D-B04A-ABDD367A1E08}" type="datetimeFigureOut">
               <a:rPr lang="ru-RU" smtClean="0"/>
-              <a:t>13.08.2012</a:t>
+              <a:t>14.08.2012</a:t>
             </a:fld>
             <a:endParaRPr lang="ru-RU"/>
           </a:p>
@@ -12533,7 +12533,7 @@
         <p:spPr bwMode="auto">
           <a:xfrm>
             <a:off x="152400" y="457200"/>
-            <a:ext cx="8839200" cy="2062103"/>
+            <a:ext cx="8839200" cy="2308324"/>
           </a:xfrm>
           <a:prstGeom prst="rect">
             <a:avLst/>
@@ -12932,7 +12932,33 @@
                 <a:latin typeface="Courier New" pitchFamily="49" charset="0"/>
                 <a:cs typeface="Courier New" pitchFamily="49" charset="0"/>
               </a:rPr>
-              <a:t>&lt;T&gt;</a:t>
+              <a:t>&lt;T</a:t>
+            </a:r>
+            <a:r>
+              <a:rPr lang="en-US" sz="1600" b="1" dirty="0" smtClean="0">
+                <a:solidFill>
+                  <a:schemeClr val="bg1"/>
+                </a:solidFill>
+                <a:latin typeface="Courier New" pitchFamily="49" charset="0"/>
+                <a:cs typeface="Courier New" pitchFamily="49" charset="0"/>
+              </a:rPr>
+              <a:t>&gt;</a:t>
+            </a:r>
+          </a:p>
+          <a:p>
+            <a:pPr marL="1028700" lvl="1" eaLnBrk="1" hangingPunct="1">
+              <a:buFont typeface="Arial" pitchFamily="34" charset="0"/>
+              <a:buChar char="•"/>
+            </a:pPr>
+            <a:r>
+              <a:rPr lang="en-US" sz="1600" b="1" dirty="0" err="1" smtClean="0">
+                <a:solidFill>
+                  <a:schemeClr val="bg1"/>
+                </a:solidFill>
+                <a:latin typeface="Courier New" pitchFamily="49" charset="0"/>
+                <a:cs typeface="Courier New" pitchFamily="49" charset="0"/>
+              </a:rPr>
+              <a:t>System.IDisposable</a:t>
             </a:r>
             <a:endParaRPr lang="en-US" sz="1600" b="1" dirty="0">
               <a:solidFill>

</xml_diff>

<commit_message>
Fixed example with interfaces
</commit_message>
<xml_diff>
--- a/Presentation/lesson-02.pptx
+++ b/Presentation/lesson-02.pptx
@@ -310,7 +310,7 @@
           <a:p>
             <a:fld id="{8E6E6A2A-E9D3-4A0D-B04A-ABDD367A1E08}" type="datetimeFigureOut">
               <a:rPr lang="ru-RU" smtClean="0"/>
-              <a:t>26.08.2012</a:t>
+              <a:t>25.10.2012</a:t>
             </a:fld>
             <a:endParaRPr lang="ru-RU"/>
           </a:p>
@@ -480,7 +480,7 @@
           <a:p>
             <a:fld id="{8E6E6A2A-E9D3-4A0D-B04A-ABDD367A1E08}" type="datetimeFigureOut">
               <a:rPr lang="ru-RU" smtClean="0"/>
-              <a:t>26.08.2012</a:t>
+              <a:t>25.10.2012</a:t>
             </a:fld>
             <a:endParaRPr lang="ru-RU"/>
           </a:p>
@@ -660,7 +660,7 @@
           <a:p>
             <a:fld id="{8E6E6A2A-E9D3-4A0D-B04A-ABDD367A1E08}" type="datetimeFigureOut">
               <a:rPr lang="ru-RU" smtClean="0"/>
-              <a:t>26.08.2012</a:t>
+              <a:t>25.10.2012</a:t>
             </a:fld>
             <a:endParaRPr lang="ru-RU"/>
           </a:p>
@@ -830,7 +830,7 @@
           <a:p>
             <a:fld id="{8E6E6A2A-E9D3-4A0D-B04A-ABDD367A1E08}" type="datetimeFigureOut">
               <a:rPr lang="ru-RU" smtClean="0"/>
-              <a:t>26.08.2012</a:t>
+              <a:t>25.10.2012</a:t>
             </a:fld>
             <a:endParaRPr lang="ru-RU"/>
           </a:p>
@@ -1076,7 +1076,7 @@
           <a:p>
             <a:fld id="{8E6E6A2A-E9D3-4A0D-B04A-ABDD367A1E08}" type="datetimeFigureOut">
               <a:rPr lang="ru-RU" smtClean="0"/>
-              <a:t>26.08.2012</a:t>
+              <a:t>25.10.2012</a:t>
             </a:fld>
             <a:endParaRPr lang="ru-RU"/>
           </a:p>
@@ -1364,7 +1364,7 @@
           <a:p>
             <a:fld id="{8E6E6A2A-E9D3-4A0D-B04A-ABDD367A1E08}" type="datetimeFigureOut">
               <a:rPr lang="ru-RU" smtClean="0"/>
-              <a:t>26.08.2012</a:t>
+              <a:t>25.10.2012</a:t>
             </a:fld>
             <a:endParaRPr lang="ru-RU"/>
           </a:p>
@@ -1786,7 +1786,7 @@
           <a:p>
             <a:fld id="{8E6E6A2A-E9D3-4A0D-B04A-ABDD367A1E08}" type="datetimeFigureOut">
               <a:rPr lang="ru-RU" smtClean="0"/>
-              <a:t>26.08.2012</a:t>
+              <a:t>25.10.2012</a:t>
             </a:fld>
             <a:endParaRPr lang="ru-RU"/>
           </a:p>
@@ -1904,7 +1904,7 @@
           <a:p>
             <a:fld id="{8E6E6A2A-E9D3-4A0D-B04A-ABDD367A1E08}" type="datetimeFigureOut">
               <a:rPr lang="ru-RU" smtClean="0"/>
-              <a:t>26.08.2012</a:t>
+              <a:t>25.10.2012</a:t>
             </a:fld>
             <a:endParaRPr lang="ru-RU"/>
           </a:p>
@@ -1999,7 +1999,7 @@
           <a:p>
             <a:fld id="{8E6E6A2A-E9D3-4A0D-B04A-ABDD367A1E08}" type="datetimeFigureOut">
               <a:rPr lang="ru-RU" smtClean="0"/>
-              <a:t>26.08.2012</a:t>
+              <a:t>25.10.2012</a:t>
             </a:fld>
             <a:endParaRPr lang="ru-RU"/>
           </a:p>
@@ -2276,7 +2276,7 @@
           <a:p>
             <a:fld id="{8E6E6A2A-E9D3-4A0D-B04A-ABDD367A1E08}" type="datetimeFigureOut">
               <a:rPr lang="ru-RU" smtClean="0"/>
-              <a:t>26.08.2012</a:t>
+              <a:t>25.10.2012</a:t>
             </a:fld>
             <a:endParaRPr lang="ru-RU"/>
           </a:p>
@@ -2529,7 +2529,7 @@
           <a:p>
             <a:fld id="{8E6E6A2A-E9D3-4A0D-B04A-ABDD367A1E08}" type="datetimeFigureOut">
               <a:rPr lang="ru-RU" smtClean="0"/>
-              <a:t>26.08.2012</a:t>
+              <a:t>25.10.2012</a:t>
             </a:fld>
             <a:endParaRPr lang="ru-RU"/>
           </a:p>
@@ -2742,7 +2742,7 @@
           <a:p>
             <a:fld id="{8E6E6A2A-E9D3-4A0D-B04A-ABDD367A1E08}" type="datetimeFigureOut">
               <a:rPr lang="ru-RU" smtClean="0"/>
-              <a:t>26.08.2012</a:t>
+              <a:t>25.10.2012</a:t>
             </a:fld>
             <a:endParaRPr lang="ru-RU"/>
           </a:p>
@@ -9860,8 +9860,8 @@
         </p:nvSpPr>
         <p:spPr bwMode="auto">
           <a:xfrm>
-            <a:off x="152400" y="533400"/>
-            <a:ext cx="8839200" cy="6186488"/>
+            <a:off x="152400" y="394990"/>
+            <a:ext cx="8839200" cy="6463308"/>
           </a:xfrm>
           <a:prstGeom prst="rect">
             <a:avLst/>
@@ -9889,1202 +9889,1209 @@
               <a:defRPr/>
             </a:pPr>
             <a:r>
+              <a:rPr lang="en-US" sz="900" dirty="0">
+                <a:solidFill>
+                  <a:schemeClr val="bg1"/>
+                </a:solidFill>
+                <a:ea typeface="Calibri" pitchFamily="34" charset="0"/>
+                <a:cs typeface="Courier New" pitchFamily="49" charset="0"/>
+              </a:rPr>
+              <a:t>interface </a:t>
+            </a:r>
+            <a:r>
+              <a:rPr lang="en-US" sz="900" dirty="0" err="1">
+                <a:solidFill>
+                  <a:schemeClr val="bg1"/>
+                </a:solidFill>
+                <a:ea typeface="Calibri" pitchFamily="34" charset="0"/>
+                <a:cs typeface="Courier New" pitchFamily="49" charset="0"/>
+              </a:rPr>
+              <a:t>IPrintable</a:t>
+            </a:r>
+            <a:endParaRPr lang="en-US" sz="900" dirty="0">
+              <a:solidFill>
+                <a:schemeClr val="bg1"/>
+              </a:solidFill>
+              <a:ea typeface="Calibri" pitchFamily="34" charset="0"/>
+              <a:cs typeface="Courier New" pitchFamily="49" charset="0"/>
+            </a:endParaRPr>
+          </a:p>
+          <a:p>
+            <a:pPr eaLnBrk="0" hangingPunct="0">
+              <a:defRPr/>
+            </a:pPr>
+            <a:r>
+              <a:rPr lang="en-US" sz="900" dirty="0">
+                <a:solidFill>
+                  <a:schemeClr val="bg1"/>
+                </a:solidFill>
+                <a:ea typeface="Calibri" pitchFamily="34" charset="0"/>
+                <a:cs typeface="Courier New" pitchFamily="49" charset="0"/>
+              </a:rPr>
+              <a:t>{</a:t>
+            </a:r>
+          </a:p>
+          <a:p>
+            <a:pPr eaLnBrk="0" hangingPunct="0">
+              <a:defRPr/>
+            </a:pPr>
+            <a:r>
+              <a:rPr lang="en-US" sz="900" dirty="0">
+                <a:solidFill>
+                  <a:schemeClr val="bg1"/>
+                </a:solidFill>
+                <a:ea typeface="Calibri" pitchFamily="34" charset="0"/>
+                <a:cs typeface="Courier New" pitchFamily="49" charset="0"/>
+              </a:rPr>
+              <a:t>    void Print();</a:t>
+            </a:r>
+          </a:p>
+          <a:p>
+            <a:pPr eaLnBrk="0" hangingPunct="0">
+              <a:defRPr/>
+            </a:pPr>
+            <a:r>
+              <a:rPr lang="en-US" sz="900" dirty="0">
+                <a:solidFill>
+                  <a:schemeClr val="bg1"/>
+                </a:solidFill>
+                <a:ea typeface="Calibri" pitchFamily="34" charset="0"/>
+                <a:cs typeface="Courier New" pitchFamily="49" charset="0"/>
+              </a:rPr>
+              <a:t>}</a:t>
+            </a:r>
+          </a:p>
+          <a:p>
+            <a:pPr eaLnBrk="0" hangingPunct="0">
+              <a:defRPr/>
+            </a:pPr>
+            <a:r>
+              <a:rPr lang="en-US" sz="900" dirty="0">
+                <a:solidFill>
+                  <a:schemeClr val="bg1"/>
+                </a:solidFill>
+                <a:ea typeface="Calibri" pitchFamily="34" charset="0"/>
+                <a:cs typeface="Courier New" pitchFamily="49" charset="0"/>
+              </a:rPr>
+              <a:t>class Point : </a:t>
+            </a:r>
+            <a:r>
+              <a:rPr lang="en-US" sz="900" dirty="0" err="1">
+                <a:solidFill>
+                  <a:schemeClr val="bg1"/>
+                </a:solidFill>
+                <a:ea typeface="Calibri" pitchFamily="34" charset="0"/>
+                <a:cs typeface="Courier New" pitchFamily="49" charset="0"/>
+              </a:rPr>
+              <a:t>IPrintable</a:t>
+            </a:r>
+            <a:endParaRPr lang="en-US" sz="900" dirty="0">
+              <a:solidFill>
+                <a:schemeClr val="bg1"/>
+              </a:solidFill>
+              <a:ea typeface="Calibri" pitchFamily="34" charset="0"/>
+              <a:cs typeface="Courier New" pitchFamily="49" charset="0"/>
+            </a:endParaRPr>
+          </a:p>
+          <a:p>
+            <a:pPr eaLnBrk="0" hangingPunct="0">
+              <a:defRPr/>
+            </a:pPr>
+            <a:r>
+              <a:rPr lang="en-US" sz="900" dirty="0">
+                <a:solidFill>
+                  <a:schemeClr val="bg1"/>
+                </a:solidFill>
+                <a:ea typeface="Calibri" pitchFamily="34" charset="0"/>
+                <a:cs typeface="Courier New" pitchFamily="49" charset="0"/>
+              </a:rPr>
+              <a:t>{</a:t>
+            </a:r>
+          </a:p>
+          <a:p>
+            <a:pPr eaLnBrk="0" hangingPunct="0">
+              <a:defRPr/>
+            </a:pPr>
+            <a:r>
+              <a:rPr lang="en-US" sz="900" dirty="0">
+                <a:solidFill>
+                  <a:schemeClr val="bg1"/>
+                </a:solidFill>
+                <a:ea typeface="Calibri" pitchFamily="34" charset="0"/>
+                <a:cs typeface="Courier New" pitchFamily="49" charset="0"/>
+              </a:rPr>
+              <a:t>    public </a:t>
+            </a:r>
+            <a:r>
+              <a:rPr lang="en-US" sz="900" dirty="0" err="1">
+                <a:solidFill>
+                  <a:schemeClr val="bg1"/>
+                </a:solidFill>
+                <a:ea typeface="Calibri" pitchFamily="34" charset="0"/>
+                <a:cs typeface="Courier New" pitchFamily="49" charset="0"/>
+              </a:rPr>
+              <a:t>int</a:t>
+            </a:r>
+            <a:r>
+              <a:rPr lang="en-US" sz="900" dirty="0">
+                <a:solidFill>
+                  <a:schemeClr val="bg1"/>
+                </a:solidFill>
+                <a:ea typeface="Calibri" pitchFamily="34" charset="0"/>
+                <a:cs typeface="Courier New" pitchFamily="49" charset="0"/>
+              </a:rPr>
+              <a:t> X { get; private set; }</a:t>
+            </a:r>
+          </a:p>
+          <a:p>
+            <a:pPr eaLnBrk="0" hangingPunct="0">
+              <a:defRPr/>
+            </a:pPr>
+            <a:r>
+              <a:rPr lang="en-US" sz="900" dirty="0">
+                <a:solidFill>
+                  <a:schemeClr val="bg1"/>
+                </a:solidFill>
+                <a:ea typeface="Calibri" pitchFamily="34" charset="0"/>
+                <a:cs typeface="Courier New" pitchFamily="49" charset="0"/>
+              </a:rPr>
+              <a:t>    public </a:t>
+            </a:r>
+            <a:r>
+              <a:rPr lang="en-US" sz="900" dirty="0" err="1">
+                <a:solidFill>
+                  <a:schemeClr val="bg1"/>
+                </a:solidFill>
+                <a:ea typeface="Calibri" pitchFamily="34" charset="0"/>
+                <a:cs typeface="Courier New" pitchFamily="49" charset="0"/>
+              </a:rPr>
+              <a:t>int</a:t>
+            </a:r>
+            <a:r>
+              <a:rPr lang="en-US" sz="900" dirty="0">
+                <a:solidFill>
+                  <a:schemeClr val="bg1"/>
+                </a:solidFill>
+                <a:ea typeface="Calibri" pitchFamily="34" charset="0"/>
+                <a:cs typeface="Courier New" pitchFamily="49" charset="0"/>
+              </a:rPr>
+              <a:t> Y { get; private set; }</a:t>
+            </a:r>
+          </a:p>
+          <a:p>
+            <a:pPr eaLnBrk="0" hangingPunct="0">
+              <a:defRPr/>
+            </a:pPr>
+            <a:r>
+              <a:rPr lang="en-US" sz="900" dirty="0">
+                <a:solidFill>
+                  <a:schemeClr val="bg1"/>
+                </a:solidFill>
+                <a:ea typeface="Calibri" pitchFamily="34" charset="0"/>
+                <a:cs typeface="Courier New" pitchFamily="49" charset="0"/>
+              </a:rPr>
+              <a:t>    public Point(</a:t>
+            </a:r>
+            <a:r>
+              <a:rPr lang="en-US" sz="900" dirty="0" err="1">
+                <a:solidFill>
+                  <a:schemeClr val="bg1"/>
+                </a:solidFill>
+                <a:ea typeface="Calibri" pitchFamily="34" charset="0"/>
+                <a:cs typeface="Courier New" pitchFamily="49" charset="0"/>
+              </a:rPr>
+              <a:t>int</a:t>
+            </a:r>
+            <a:r>
+              <a:rPr lang="en-US" sz="900" dirty="0">
+                <a:solidFill>
+                  <a:schemeClr val="bg1"/>
+                </a:solidFill>
+                <a:ea typeface="Calibri" pitchFamily="34" charset="0"/>
+                <a:cs typeface="Courier New" pitchFamily="49" charset="0"/>
+              </a:rPr>
+              <a:t> x, </a:t>
+            </a:r>
+            <a:r>
+              <a:rPr lang="en-US" sz="900" dirty="0" err="1">
+                <a:solidFill>
+                  <a:schemeClr val="bg1"/>
+                </a:solidFill>
+                <a:ea typeface="Calibri" pitchFamily="34" charset="0"/>
+                <a:cs typeface="Courier New" pitchFamily="49" charset="0"/>
+              </a:rPr>
+              <a:t>int</a:t>
+            </a:r>
+            <a:r>
+              <a:rPr lang="en-US" sz="900" dirty="0">
+                <a:solidFill>
+                  <a:schemeClr val="bg1"/>
+                </a:solidFill>
+                <a:ea typeface="Calibri" pitchFamily="34" charset="0"/>
+                <a:cs typeface="Courier New" pitchFamily="49" charset="0"/>
+              </a:rPr>
+              <a:t> y) { X = x; Y = y; }</a:t>
+            </a:r>
+          </a:p>
+          <a:p>
+            <a:pPr eaLnBrk="0" hangingPunct="0">
+              <a:defRPr/>
+            </a:pPr>
+            <a:endParaRPr lang="en-US" sz="900" dirty="0">
+              <a:solidFill>
+                <a:schemeClr val="bg1"/>
+              </a:solidFill>
+              <a:ea typeface="Calibri" pitchFamily="34" charset="0"/>
+              <a:cs typeface="Courier New" pitchFamily="49" charset="0"/>
+            </a:endParaRPr>
+          </a:p>
+          <a:p>
+            <a:pPr eaLnBrk="0" hangingPunct="0">
+              <a:defRPr/>
+            </a:pPr>
+            <a:r>
+              <a:rPr lang="en-US" sz="900" dirty="0">
+                <a:solidFill>
+                  <a:schemeClr val="bg1"/>
+                </a:solidFill>
+                <a:ea typeface="Calibri" pitchFamily="34" charset="0"/>
+                <a:cs typeface="Courier New" pitchFamily="49" charset="0"/>
+              </a:rPr>
+              <a:t>    public virtual void Print() // </a:t>
+            </a:r>
+            <a:r>
               <a:rPr lang="be-BY" sz="900" dirty="0">
                 <a:solidFill>
                   <a:schemeClr val="bg1"/>
                 </a:solidFill>
-                <a:latin typeface="Courier New" pitchFamily="49" charset="0"/>
-                <a:ea typeface="Calibri" pitchFamily="34" charset="0"/>
-                <a:cs typeface="Courier New" pitchFamily="49" charset="0"/>
-              </a:rPr>
-              <a:t>    interface </a:t>
-            </a:r>
-            <a:r>
-              <a:rPr lang="be-BY" sz="900" dirty="0" smtClean="0">
-                <a:solidFill>
-                  <a:schemeClr val="bg1"/>
-                </a:solidFill>
-                <a:latin typeface="Courier New" pitchFamily="49" charset="0"/>
-                <a:ea typeface="Calibri" pitchFamily="34" charset="0"/>
-                <a:cs typeface="Courier New" pitchFamily="49" charset="0"/>
-              </a:rPr>
-              <a:t>IPri</a:t>
-            </a:r>
+                <a:ea typeface="Calibri" pitchFamily="34" charset="0"/>
+                <a:cs typeface="Courier New" pitchFamily="49" charset="0"/>
+              </a:rPr>
+              <a:t>Обязательная реализация функции!</a:t>
+            </a:r>
+          </a:p>
+          <a:p>
+            <a:pPr eaLnBrk="0" hangingPunct="0">
+              <a:defRPr/>
+            </a:pPr>
+            <a:r>
+              <a:rPr lang="be-BY" sz="900" dirty="0">
+                <a:solidFill>
+                  <a:schemeClr val="bg1"/>
+                </a:solidFill>
+                <a:ea typeface="Calibri" pitchFamily="34" charset="0"/>
+                <a:cs typeface="Courier New" pitchFamily="49" charset="0"/>
+              </a:rPr>
+              <a:t>    {</a:t>
+            </a:r>
+          </a:p>
+          <a:p>
+            <a:pPr eaLnBrk="0" hangingPunct="0">
+              <a:defRPr/>
+            </a:pPr>
+            <a:r>
+              <a:rPr lang="be-BY" sz="900" dirty="0">
+                <a:solidFill>
+                  <a:schemeClr val="bg1"/>
+                </a:solidFill>
+                <a:ea typeface="Calibri" pitchFamily="34" charset="0"/>
+                <a:cs typeface="Courier New" pitchFamily="49" charset="0"/>
+              </a:rPr>
+              <a:t>        </a:t>
+            </a:r>
+            <a:r>
+              <a:rPr lang="en-US" sz="900" dirty="0" err="1">
+                <a:solidFill>
+                  <a:schemeClr val="bg1"/>
+                </a:solidFill>
+                <a:ea typeface="Calibri" pitchFamily="34" charset="0"/>
+                <a:cs typeface="Courier New" pitchFamily="49" charset="0"/>
+              </a:rPr>
+              <a:t>Console.WriteLine</a:t>
+            </a:r>
+            <a:r>
+              <a:rPr lang="en-US" sz="900" dirty="0">
+                <a:solidFill>
+                  <a:schemeClr val="bg1"/>
+                </a:solidFill>
+                <a:ea typeface="Calibri" pitchFamily="34" charset="0"/>
+                <a:cs typeface="Courier New" pitchFamily="49" charset="0"/>
+              </a:rPr>
+              <a:t>("I'm Point at X={0};Y={1}",X,Y);</a:t>
+            </a:r>
+          </a:p>
+          <a:p>
+            <a:pPr eaLnBrk="0" hangingPunct="0">
+              <a:defRPr/>
+            </a:pPr>
+            <a:r>
+              <a:rPr lang="en-US" sz="900" dirty="0">
+                <a:solidFill>
+                  <a:schemeClr val="bg1"/>
+                </a:solidFill>
+                <a:ea typeface="Calibri" pitchFamily="34" charset="0"/>
+                <a:cs typeface="Courier New" pitchFamily="49" charset="0"/>
+              </a:rPr>
+              <a:t>    }</a:t>
+            </a:r>
+          </a:p>
+          <a:p>
+            <a:pPr eaLnBrk="0" hangingPunct="0">
+              <a:defRPr/>
+            </a:pPr>
+            <a:r>
+              <a:rPr lang="en-US" sz="900" dirty="0">
+                <a:solidFill>
+                  <a:schemeClr val="bg1"/>
+                </a:solidFill>
+                <a:ea typeface="Calibri" pitchFamily="34" charset="0"/>
+                <a:cs typeface="Courier New" pitchFamily="49" charset="0"/>
+              </a:rPr>
+              <a:t>}</a:t>
+            </a:r>
+          </a:p>
+          <a:p>
+            <a:pPr eaLnBrk="0" hangingPunct="0">
+              <a:defRPr/>
+            </a:pPr>
+            <a:r>
+              <a:rPr lang="en-US" sz="900" dirty="0">
+                <a:solidFill>
+                  <a:schemeClr val="bg1"/>
+                </a:solidFill>
+                <a:ea typeface="Calibri" pitchFamily="34" charset="0"/>
+                <a:cs typeface="Courier New" pitchFamily="49" charset="0"/>
+              </a:rPr>
+              <a:t>class Arc : Point</a:t>
+            </a:r>
+          </a:p>
+          <a:p>
+            <a:pPr eaLnBrk="0" hangingPunct="0">
+              <a:defRPr/>
+            </a:pPr>
+            <a:r>
+              <a:rPr lang="en-US" sz="900" dirty="0">
+                <a:solidFill>
+                  <a:schemeClr val="bg1"/>
+                </a:solidFill>
+                <a:ea typeface="Calibri" pitchFamily="34" charset="0"/>
+                <a:cs typeface="Courier New" pitchFamily="49" charset="0"/>
+              </a:rPr>
+              <a:t>{</a:t>
+            </a:r>
+          </a:p>
+          <a:p>
+            <a:pPr eaLnBrk="0" hangingPunct="0">
+              <a:defRPr/>
+            </a:pPr>
+            <a:r>
+              <a:rPr lang="en-US" sz="900" dirty="0">
+                <a:solidFill>
+                  <a:schemeClr val="bg1"/>
+                </a:solidFill>
+                <a:ea typeface="Calibri" pitchFamily="34" charset="0"/>
+                <a:cs typeface="Courier New" pitchFamily="49" charset="0"/>
+              </a:rPr>
+              <a:t>    private double _radius;</a:t>
+            </a:r>
+          </a:p>
+          <a:p>
+            <a:pPr eaLnBrk="0" hangingPunct="0">
+              <a:defRPr/>
+            </a:pPr>
+            <a:r>
+              <a:rPr lang="en-US" sz="900" dirty="0">
+                <a:solidFill>
+                  <a:schemeClr val="bg1"/>
+                </a:solidFill>
+                <a:ea typeface="Calibri" pitchFamily="34" charset="0"/>
+                <a:cs typeface="Courier New" pitchFamily="49" charset="0"/>
+              </a:rPr>
+              <a:t>    public Arc(</a:t>
+            </a:r>
+            <a:r>
+              <a:rPr lang="en-US" sz="900" dirty="0" err="1">
+                <a:solidFill>
+                  <a:schemeClr val="bg1"/>
+                </a:solidFill>
+                <a:ea typeface="Calibri" pitchFamily="34" charset="0"/>
+                <a:cs typeface="Courier New" pitchFamily="49" charset="0"/>
+              </a:rPr>
+              <a:t>int</a:t>
+            </a:r>
+            <a:r>
+              <a:rPr lang="en-US" sz="900" dirty="0">
+                <a:solidFill>
+                  <a:schemeClr val="bg1"/>
+                </a:solidFill>
+                <a:ea typeface="Calibri" pitchFamily="34" charset="0"/>
+                <a:cs typeface="Courier New" pitchFamily="49" charset="0"/>
+              </a:rPr>
+              <a:t> x, </a:t>
+            </a:r>
+            <a:r>
+              <a:rPr lang="en-US" sz="900" dirty="0" err="1">
+                <a:solidFill>
+                  <a:schemeClr val="bg1"/>
+                </a:solidFill>
+                <a:ea typeface="Calibri" pitchFamily="34" charset="0"/>
+                <a:cs typeface="Courier New" pitchFamily="49" charset="0"/>
+              </a:rPr>
+              <a:t>int</a:t>
+            </a:r>
+            <a:r>
+              <a:rPr lang="en-US" sz="900" dirty="0">
+                <a:solidFill>
+                  <a:schemeClr val="bg1"/>
+                </a:solidFill>
+                <a:ea typeface="Calibri" pitchFamily="34" charset="0"/>
+                <a:cs typeface="Courier New" pitchFamily="49" charset="0"/>
+              </a:rPr>
+              <a:t> y, double radius) : base(x, y) { _radius = radius; }</a:t>
+            </a:r>
+          </a:p>
+          <a:p>
+            <a:pPr eaLnBrk="0" hangingPunct="0">
+              <a:defRPr/>
+            </a:pPr>
+            <a:r>
+              <a:rPr lang="en-US" sz="900" dirty="0">
+                <a:solidFill>
+                  <a:schemeClr val="bg1"/>
+                </a:solidFill>
+                <a:ea typeface="Calibri" pitchFamily="34" charset="0"/>
+                <a:cs typeface="Courier New" pitchFamily="49" charset="0"/>
+              </a:rPr>
+              <a:t>    public override void Print()</a:t>
+            </a:r>
+          </a:p>
+          <a:p>
+            <a:pPr eaLnBrk="0" hangingPunct="0">
+              <a:defRPr/>
+            </a:pPr>
+            <a:r>
+              <a:rPr lang="en-US" sz="900" dirty="0">
+                <a:solidFill>
+                  <a:schemeClr val="bg1"/>
+                </a:solidFill>
+                <a:ea typeface="Calibri" pitchFamily="34" charset="0"/>
+                <a:cs typeface="Courier New" pitchFamily="49" charset="0"/>
+              </a:rPr>
+              <a:t>    {</a:t>
+            </a:r>
+          </a:p>
+          <a:p>
+            <a:pPr eaLnBrk="0" hangingPunct="0">
+              <a:defRPr/>
+            </a:pPr>
+            <a:r>
+              <a:rPr lang="en-US" sz="900" dirty="0">
+                <a:solidFill>
+                  <a:schemeClr val="bg1"/>
+                </a:solidFill>
+                <a:ea typeface="Calibri" pitchFamily="34" charset="0"/>
+                <a:cs typeface="Courier New" pitchFamily="49" charset="0"/>
+              </a:rPr>
+              <a:t>        </a:t>
+            </a:r>
+            <a:r>
+              <a:rPr lang="en-US" sz="900" dirty="0" err="1">
+                <a:solidFill>
+                  <a:schemeClr val="bg1"/>
+                </a:solidFill>
+                <a:ea typeface="Calibri" pitchFamily="34" charset="0"/>
+                <a:cs typeface="Courier New" pitchFamily="49" charset="0"/>
+              </a:rPr>
+              <a:t>Console.WriteLine</a:t>
+            </a:r>
+            <a:r>
+              <a:rPr lang="en-US" sz="900" dirty="0">
+                <a:solidFill>
+                  <a:schemeClr val="bg1"/>
+                </a:solidFill>
+                <a:ea typeface="Calibri" pitchFamily="34" charset="0"/>
+                <a:cs typeface="Courier New" pitchFamily="49" charset="0"/>
+              </a:rPr>
+              <a:t>("I'm Arc with Radius {0} at point {1}; {2}", _radius, </a:t>
+            </a:r>
+            <a:r>
+              <a:rPr lang="en-US" sz="900" dirty="0" err="1">
+                <a:solidFill>
+                  <a:schemeClr val="bg1"/>
+                </a:solidFill>
+                <a:ea typeface="Calibri" pitchFamily="34" charset="0"/>
+                <a:cs typeface="Courier New" pitchFamily="49" charset="0"/>
+              </a:rPr>
+              <a:t>base.X</a:t>
+            </a:r>
+            <a:r>
+              <a:rPr lang="en-US" sz="900" dirty="0">
+                <a:solidFill>
+                  <a:schemeClr val="bg1"/>
+                </a:solidFill>
+                <a:ea typeface="Calibri" pitchFamily="34" charset="0"/>
+                <a:cs typeface="Courier New" pitchFamily="49" charset="0"/>
+              </a:rPr>
+              <a:t>, </a:t>
+            </a:r>
+            <a:r>
+              <a:rPr lang="en-US" sz="900" dirty="0" err="1">
+                <a:solidFill>
+                  <a:schemeClr val="bg1"/>
+                </a:solidFill>
+                <a:ea typeface="Calibri" pitchFamily="34" charset="0"/>
+                <a:cs typeface="Courier New" pitchFamily="49" charset="0"/>
+              </a:rPr>
+              <a:t>base.Y</a:t>
+            </a:r>
+            <a:r>
+              <a:rPr lang="en-US" sz="900" dirty="0">
+                <a:solidFill>
+                  <a:schemeClr val="bg1"/>
+                </a:solidFill>
+                <a:ea typeface="Calibri" pitchFamily="34" charset="0"/>
+                <a:cs typeface="Courier New" pitchFamily="49" charset="0"/>
+              </a:rPr>
+              <a:t>);</a:t>
+            </a:r>
+          </a:p>
+          <a:p>
+            <a:pPr eaLnBrk="0" hangingPunct="0">
+              <a:defRPr/>
+            </a:pPr>
+            <a:r>
+              <a:rPr lang="en-US" sz="900" dirty="0">
+                <a:solidFill>
+                  <a:schemeClr val="bg1"/>
+                </a:solidFill>
+                <a:ea typeface="Calibri" pitchFamily="34" charset="0"/>
+                <a:cs typeface="Courier New" pitchFamily="49" charset="0"/>
+              </a:rPr>
+              <a:t>    }</a:t>
+            </a:r>
+          </a:p>
+          <a:p>
+            <a:pPr eaLnBrk="0" hangingPunct="0">
+              <a:defRPr/>
+            </a:pPr>
+            <a:r>
+              <a:rPr lang="en-US" sz="900" dirty="0">
+                <a:solidFill>
+                  <a:schemeClr val="bg1"/>
+                </a:solidFill>
+                <a:ea typeface="Calibri" pitchFamily="34" charset="0"/>
+                <a:cs typeface="Courier New" pitchFamily="49" charset="0"/>
+              </a:rPr>
+              <a:t>}</a:t>
+            </a:r>
+          </a:p>
+          <a:p>
+            <a:pPr eaLnBrk="0" hangingPunct="0">
+              <a:defRPr/>
+            </a:pPr>
+            <a:r>
+              <a:rPr lang="en-US" sz="900" dirty="0">
+                <a:solidFill>
+                  <a:schemeClr val="bg1"/>
+                </a:solidFill>
+                <a:ea typeface="Calibri" pitchFamily="34" charset="0"/>
+                <a:cs typeface="Courier New" pitchFamily="49" charset="0"/>
+              </a:rPr>
+              <a:t>class Point3D : </a:t>
+            </a:r>
+            <a:r>
+              <a:rPr lang="en-US" sz="900" dirty="0" err="1">
+                <a:solidFill>
+                  <a:schemeClr val="bg1"/>
+                </a:solidFill>
+                <a:ea typeface="Calibri" pitchFamily="34" charset="0"/>
+                <a:cs typeface="Courier New" pitchFamily="49" charset="0"/>
+              </a:rPr>
+              <a:t>IPrintable</a:t>
+            </a:r>
+            <a:endParaRPr lang="en-US" sz="900" dirty="0">
+              <a:solidFill>
+                <a:schemeClr val="bg1"/>
+              </a:solidFill>
+              <a:ea typeface="Calibri" pitchFamily="34" charset="0"/>
+              <a:cs typeface="Courier New" pitchFamily="49" charset="0"/>
+            </a:endParaRPr>
+          </a:p>
+          <a:p>
+            <a:pPr eaLnBrk="0" hangingPunct="0">
+              <a:defRPr/>
+            </a:pPr>
+            <a:r>
+              <a:rPr lang="en-US" sz="900" dirty="0">
+                <a:solidFill>
+                  <a:schemeClr val="bg1"/>
+                </a:solidFill>
+                <a:ea typeface="Calibri" pitchFamily="34" charset="0"/>
+                <a:cs typeface="Courier New" pitchFamily="49" charset="0"/>
+              </a:rPr>
+              <a:t>{</a:t>
+            </a:r>
+          </a:p>
+          <a:p>
+            <a:pPr eaLnBrk="0" hangingPunct="0">
+              <a:defRPr/>
+            </a:pPr>
+            <a:r>
+              <a:rPr lang="en-US" sz="900" dirty="0">
+                <a:solidFill>
+                  <a:schemeClr val="bg1"/>
+                </a:solidFill>
+                <a:ea typeface="Calibri" pitchFamily="34" charset="0"/>
+                <a:cs typeface="Courier New" pitchFamily="49" charset="0"/>
+              </a:rPr>
+              <a:t>    </a:t>
+            </a:r>
+            <a:r>
+              <a:rPr lang="en-US" sz="900" dirty="0" err="1">
+                <a:solidFill>
+                  <a:schemeClr val="bg1"/>
+                </a:solidFill>
+                <a:ea typeface="Calibri" pitchFamily="34" charset="0"/>
+                <a:cs typeface="Courier New" pitchFamily="49" charset="0"/>
+              </a:rPr>
+              <a:t>int</a:t>
+            </a:r>
+            <a:r>
+              <a:rPr lang="en-US" sz="900" dirty="0">
+                <a:solidFill>
+                  <a:schemeClr val="bg1"/>
+                </a:solidFill>
+                <a:ea typeface="Calibri" pitchFamily="34" charset="0"/>
+                <a:cs typeface="Courier New" pitchFamily="49" charset="0"/>
+              </a:rPr>
+              <a:t> _x, _y, _z;</a:t>
+            </a:r>
+          </a:p>
+          <a:p>
+            <a:pPr eaLnBrk="0" hangingPunct="0">
+              <a:defRPr/>
+            </a:pPr>
+            <a:r>
+              <a:rPr lang="en-US" sz="900" dirty="0">
+                <a:solidFill>
+                  <a:schemeClr val="bg1"/>
+                </a:solidFill>
+                <a:ea typeface="Calibri" pitchFamily="34" charset="0"/>
+                <a:cs typeface="Courier New" pitchFamily="49" charset="0"/>
+              </a:rPr>
+              <a:t>    public Point3D(</a:t>
+            </a:r>
+            <a:r>
+              <a:rPr lang="en-US" sz="900" dirty="0" err="1">
+                <a:solidFill>
+                  <a:schemeClr val="bg1"/>
+                </a:solidFill>
+                <a:ea typeface="Calibri" pitchFamily="34" charset="0"/>
+                <a:cs typeface="Courier New" pitchFamily="49" charset="0"/>
+              </a:rPr>
+              <a:t>int</a:t>
+            </a:r>
+            <a:r>
+              <a:rPr lang="en-US" sz="900" dirty="0">
+                <a:solidFill>
+                  <a:schemeClr val="bg1"/>
+                </a:solidFill>
+                <a:ea typeface="Calibri" pitchFamily="34" charset="0"/>
+                <a:cs typeface="Courier New" pitchFamily="49" charset="0"/>
+              </a:rPr>
+              <a:t> x, </a:t>
+            </a:r>
+            <a:r>
+              <a:rPr lang="en-US" sz="900" dirty="0" err="1">
+                <a:solidFill>
+                  <a:schemeClr val="bg1"/>
+                </a:solidFill>
+                <a:ea typeface="Calibri" pitchFamily="34" charset="0"/>
+                <a:cs typeface="Courier New" pitchFamily="49" charset="0"/>
+              </a:rPr>
+              <a:t>int</a:t>
+            </a:r>
+            <a:r>
+              <a:rPr lang="en-US" sz="900" dirty="0">
+                <a:solidFill>
+                  <a:schemeClr val="bg1"/>
+                </a:solidFill>
+                <a:ea typeface="Calibri" pitchFamily="34" charset="0"/>
+                <a:cs typeface="Courier New" pitchFamily="49" charset="0"/>
+              </a:rPr>
+              <a:t> y, </a:t>
+            </a:r>
+            <a:r>
+              <a:rPr lang="en-US" sz="900" dirty="0" err="1">
+                <a:solidFill>
+                  <a:schemeClr val="bg1"/>
+                </a:solidFill>
+                <a:ea typeface="Calibri" pitchFamily="34" charset="0"/>
+                <a:cs typeface="Courier New" pitchFamily="49" charset="0"/>
+              </a:rPr>
+              <a:t>int</a:t>
+            </a:r>
+            <a:r>
+              <a:rPr lang="en-US" sz="900" dirty="0">
+                <a:solidFill>
+                  <a:schemeClr val="bg1"/>
+                </a:solidFill>
+                <a:ea typeface="Calibri" pitchFamily="34" charset="0"/>
+                <a:cs typeface="Courier New" pitchFamily="49" charset="0"/>
+              </a:rPr>
+              <a:t> z) { _x = x; _y = y; _z = z; }</a:t>
+            </a:r>
+          </a:p>
+          <a:p>
+            <a:pPr eaLnBrk="0" hangingPunct="0">
+              <a:defRPr/>
+            </a:pPr>
+            <a:endParaRPr lang="en-US" sz="900" dirty="0">
+              <a:solidFill>
+                <a:schemeClr val="bg1"/>
+              </a:solidFill>
+              <a:ea typeface="Calibri" pitchFamily="34" charset="0"/>
+              <a:cs typeface="Courier New" pitchFamily="49" charset="0"/>
+            </a:endParaRPr>
+          </a:p>
+          <a:p>
+            <a:pPr eaLnBrk="0" hangingPunct="0">
+              <a:defRPr/>
+            </a:pPr>
+            <a:r>
+              <a:rPr lang="en-US" sz="900" dirty="0">
+                <a:solidFill>
+                  <a:schemeClr val="bg1"/>
+                </a:solidFill>
+                <a:ea typeface="Calibri" pitchFamily="34" charset="0"/>
+                <a:cs typeface="Courier New" pitchFamily="49" charset="0"/>
+              </a:rPr>
+              <a:t>    public void Print()</a:t>
+            </a:r>
+          </a:p>
+          <a:p>
+            <a:pPr eaLnBrk="0" hangingPunct="0">
+              <a:defRPr/>
+            </a:pPr>
+            <a:r>
+              <a:rPr lang="en-US" sz="900" dirty="0">
+                <a:solidFill>
+                  <a:schemeClr val="bg1"/>
+                </a:solidFill>
+                <a:ea typeface="Calibri" pitchFamily="34" charset="0"/>
+                <a:cs typeface="Courier New" pitchFamily="49" charset="0"/>
+              </a:rPr>
+              <a:t>    {</a:t>
+            </a:r>
+          </a:p>
+          <a:p>
+            <a:pPr eaLnBrk="0" hangingPunct="0">
+              <a:defRPr/>
+            </a:pPr>
+            <a:r>
+              <a:rPr lang="en-US" sz="900" dirty="0">
+                <a:solidFill>
+                  <a:schemeClr val="bg1"/>
+                </a:solidFill>
+                <a:ea typeface="Calibri" pitchFamily="34" charset="0"/>
+                <a:cs typeface="Courier New" pitchFamily="49" charset="0"/>
+              </a:rPr>
+              <a:t>        </a:t>
+            </a:r>
+            <a:r>
+              <a:rPr lang="en-US" sz="900" dirty="0" err="1">
+                <a:solidFill>
+                  <a:schemeClr val="bg1"/>
+                </a:solidFill>
+                <a:ea typeface="Calibri" pitchFamily="34" charset="0"/>
+                <a:cs typeface="Courier New" pitchFamily="49" charset="0"/>
+              </a:rPr>
+              <a:t>Console.WriteLine</a:t>
+            </a:r>
+            <a:r>
+              <a:rPr lang="en-US" sz="900" dirty="0">
+                <a:solidFill>
+                  <a:schemeClr val="bg1"/>
+                </a:solidFill>
+                <a:ea typeface="Calibri" pitchFamily="34" charset="0"/>
+                <a:cs typeface="Courier New" pitchFamily="49" charset="0"/>
+              </a:rPr>
+              <a:t>("I'm Point 3D at X={0};Y={1};Z={2}", _x, _y, _z);</a:t>
+            </a:r>
+          </a:p>
+          <a:p>
+            <a:pPr eaLnBrk="0" hangingPunct="0">
+              <a:defRPr/>
+            </a:pPr>
+            <a:r>
+              <a:rPr lang="en-US" sz="900" dirty="0">
+                <a:solidFill>
+                  <a:schemeClr val="bg1"/>
+                </a:solidFill>
+                <a:ea typeface="Calibri" pitchFamily="34" charset="0"/>
+                <a:cs typeface="Courier New" pitchFamily="49" charset="0"/>
+              </a:rPr>
+              <a:t>    }</a:t>
+            </a:r>
+          </a:p>
+          <a:p>
+            <a:pPr eaLnBrk="0" hangingPunct="0">
+              <a:defRPr/>
+            </a:pPr>
+            <a:r>
+              <a:rPr lang="en-US" sz="900" dirty="0">
+                <a:solidFill>
+                  <a:schemeClr val="bg1"/>
+                </a:solidFill>
+                <a:ea typeface="Calibri" pitchFamily="34" charset="0"/>
+                <a:cs typeface="Courier New" pitchFamily="49" charset="0"/>
+              </a:rPr>
+              <a:t>}</a:t>
+            </a:r>
+          </a:p>
+          <a:p>
+            <a:pPr eaLnBrk="0" hangingPunct="0">
+              <a:defRPr/>
+            </a:pPr>
+            <a:r>
+              <a:rPr lang="en-US" sz="900" dirty="0">
+                <a:solidFill>
+                  <a:schemeClr val="bg1"/>
+                </a:solidFill>
+                <a:ea typeface="Calibri" pitchFamily="34" charset="0"/>
+                <a:cs typeface="Courier New" pitchFamily="49" charset="0"/>
+              </a:rPr>
+              <a:t>class Program</a:t>
+            </a:r>
+          </a:p>
+          <a:p>
+            <a:pPr eaLnBrk="0" hangingPunct="0">
+              <a:defRPr/>
+            </a:pPr>
+            <a:r>
+              <a:rPr lang="en-US" sz="900" dirty="0">
+                <a:solidFill>
+                  <a:schemeClr val="bg1"/>
+                </a:solidFill>
+                <a:ea typeface="Calibri" pitchFamily="34" charset="0"/>
+                <a:cs typeface="Courier New" pitchFamily="49" charset="0"/>
+              </a:rPr>
+              <a:t>{</a:t>
+            </a:r>
+          </a:p>
+          <a:p>
+            <a:pPr eaLnBrk="0" hangingPunct="0">
+              <a:defRPr/>
+            </a:pPr>
+            <a:r>
+              <a:rPr lang="en-US" sz="900" dirty="0">
+                <a:solidFill>
+                  <a:schemeClr val="bg1"/>
+                </a:solidFill>
+                <a:ea typeface="Calibri" pitchFamily="34" charset="0"/>
+                <a:cs typeface="Courier New" pitchFamily="49" charset="0"/>
+              </a:rPr>
+              <a:t>    static void Printer(</a:t>
+            </a:r>
+            <a:r>
+              <a:rPr lang="en-US" sz="900" dirty="0" err="1">
+                <a:solidFill>
+                  <a:schemeClr val="bg1"/>
+                </a:solidFill>
+                <a:ea typeface="Calibri" pitchFamily="34" charset="0"/>
+                <a:cs typeface="Courier New" pitchFamily="49" charset="0"/>
+              </a:rPr>
+              <a:t>params</a:t>
+            </a:r>
+            <a:r>
+              <a:rPr lang="en-US" sz="900" dirty="0">
+                <a:solidFill>
+                  <a:schemeClr val="bg1"/>
+                </a:solidFill>
+                <a:ea typeface="Calibri" pitchFamily="34" charset="0"/>
+                <a:cs typeface="Courier New" pitchFamily="49" charset="0"/>
+              </a:rPr>
+              <a:t> </a:t>
+            </a:r>
+            <a:r>
+              <a:rPr lang="en-US" sz="900" dirty="0" err="1">
+                <a:solidFill>
+                  <a:schemeClr val="bg1"/>
+                </a:solidFill>
+                <a:ea typeface="Calibri" pitchFamily="34" charset="0"/>
+                <a:cs typeface="Courier New" pitchFamily="49" charset="0"/>
+              </a:rPr>
+              <a:t>IPrintable</a:t>
+            </a:r>
+            <a:r>
+              <a:rPr lang="en-US" sz="900" dirty="0">
+                <a:solidFill>
+                  <a:schemeClr val="bg1"/>
+                </a:solidFill>
+                <a:ea typeface="Calibri" pitchFamily="34" charset="0"/>
+                <a:cs typeface="Courier New" pitchFamily="49" charset="0"/>
+              </a:rPr>
+              <a:t>[] </a:t>
+            </a:r>
+            <a:r>
+              <a:rPr lang="en-US" sz="900" dirty="0" err="1">
+                <a:solidFill>
+                  <a:schemeClr val="bg1"/>
+                </a:solidFill>
+                <a:ea typeface="Calibri" pitchFamily="34" charset="0"/>
+                <a:cs typeface="Courier New" pitchFamily="49" charset="0"/>
+              </a:rPr>
+              <a:t>vals</a:t>
+            </a:r>
+            <a:r>
+              <a:rPr lang="en-US" sz="900" dirty="0">
+                <a:solidFill>
+                  <a:schemeClr val="bg1"/>
+                </a:solidFill>
+                <a:ea typeface="Calibri" pitchFamily="34" charset="0"/>
+                <a:cs typeface="Courier New" pitchFamily="49" charset="0"/>
+              </a:rPr>
+              <a:t>)</a:t>
+            </a:r>
+          </a:p>
+          <a:p>
+            <a:pPr eaLnBrk="0" hangingPunct="0">
+              <a:defRPr/>
+            </a:pPr>
+            <a:r>
+              <a:rPr lang="en-US" sz="900" dirty="0">
+                <a:solidFill>
+                  <a:schemeClr val="bg1"/>
+                </a:solidFill>
+                <a:ea typeface="Calibri" pitchFamily="34" charset="0"/>
+                <a:cs typeface="Courier New" pitchFamily="49" charset="0"/>
+              </a:rPr>
+              <a:t>    {</a:t>
+            </a:r>
+          </a:p>
+          <a:p>
+            <a:pPr eaLnBrk="0" hangingPunct="0">
+              <a:defRPr/>
+            </a:pPr>
+            <a:r>
+              <a:rPr lang="en-US" sz="900" dirty="0">
+                <a:solidFill>
+                  <a:schemeClr val="bg1"/>
+                </a:solidFill>
+                <a:ea typeface="Calibri" pitchFamily="34" charset="0"/>
+                <a:cs typeface="Courier New" pitchFamily="49" charset="0"/>
+              </a:rPr>
+              <a:t>        </a:t>
+            </a:r>
+            <a:r>
+              <a:rPr lang="en-US" sz="900" dirty="0" err="1">
+                <a:solidFill>
+                  <a:schemeClr val="bg1"/>
+                </a:solidFill>
+                <a:ea typeface="Calibri" pitchFamily="34" charset="0"/>
+                <a:cs typeface="Courier New" pitchFamily="49" charset="0"/>
+              </a:rPr>
+              <a:t>foreach</a:t>
+            </a:r>
+            <a:r>
+              <a:rPr lang="en-US" sz="900" dirty="0">
+                <a:solidFill>
+                  <a:schemeClr val="bg1"/>
+                </a:solidFill>
+                <a:ea typeface="Calibri" pitchFamily="34" charset="0"/>
+                <a:cs typeface="Courier New" pitchFamily="49" charset="0"/>
+              </a:rPr>
+              <a:t> (</a:t>
+            </a:r>
+            <a:r>
+              <a:rPr lang="en-US" sz="900" dirty="0" err="1">
+                <a:solidFill>
+                  <a:schemeClr val="bg1"/>
+                </a:solidFill>
+                <a:ea typeface="Calibri" pitchFamily="34" charset="0"/>
+                <a:cs typeface="Courier New" pitchFamily="49" charset="0"/>
+              </a:rPr>
+              <a:t>IPrintable</a:t>
+            </a:r>
+            <a:r>
+              <a:rPr lang="en-US" sz="900" dirty="0">
+                <a:solidFill>
+                  <a:schemeClr val="bg1"/>
+                </a:solidFill>
+                <a:ea typeface="Calibri" pitchFamily="34" charset="0"/>
+                <a:cs typeface="Courier New" pitchFamily="49" charset="0"/>
+              </a:rPr>
+              <a:t> </a:t>
+            </a:r>
+            <a:r>
+              <a:rPr lang="en-US" sz="900" dirty="0" err="1">
+                <a:solidFill>
+                  <a:schemeClr val="bg1"/>
+                </a:solidFill>
+                <a:ea typeface="Calibri" pitchFamily="34" charset="0"/>
+                <a:cs typeface="Courier New" pitchFamily="49" charset="0"/>
+              </a:rPr>
+              <a:t>obj</a:t>
+            </a:r>
+            <a:r>
+              <a:rPr lang="en-US" sz="900" dirty="0">
+                <a:solidFill>
+                  <a:schemeClr val="bg1"/>
+                </a:solidFill>
+                <a:ea typeface="Calibri" pitchFamily="34" charset="0"/>
+                <a:cs typeface="Courier New" pitchFamily="49" charset="0"/>
+              </a:rPr>
+              <a:t> in </a:t>
+            </a:r>
+            <a:r>
+              <a:rPr lang="en-US" sz="900" dirty="0" err="1">
+                <a:solidFill>
+                  <a:schemeClr val="bg1"/>
+                </a:solidFill>
+                <a:ea typeface="Calibri" pitchFamily="34" charset="0"/>
+                <a:cs typeface="Courier New" pitchFamily="49" charset="0"/>
+              </a:rPr>
+              <a:t>vals</a:t>
+            </a:r>
+            <a:r>
+              <a:rPr lang="en-US" sz="900" dirty="0">
+                <a:solidFill>
+                  <a:schemeClr val="bg1"/>
+                </a:solidFill>
+                <a:ea typeface="Calibri" pitchFamily="34" charset="0"/>
+                <a:cs typeface="Courier New" pitchFamily="49" charset="0"/>
+              </a:rPr>
+              <a:t>) </a:t>
+            </a:r>
+            <a:r>
+              <a:rPr lang="en-US" sz="900" dirty="0" err="1">
+                <a:solidFill>
+                  <a:schemeClr val="bg1"/>
+                </a:solidFill>
+                <a:ea typeface="Calibri" pitchFamily="34" charset="0"/>
+                <a:cs typeface="Courier New" pitchFamily="49" charset="0"/>
+              </a:rPr>
+              <a:t>obj.Print</a:t>
+            </a:r>
+            <a:r>
+              <a:rPr lang="en-US" sz="900" dirty="0">
+                <a:solidFill>
+                  <a:schemeClr val="bg1"/>
+                </a:solidFill>
+                <a:ea typeface="Calibri" pitchFamily="34" charset="0"/>
+                <a:cs typeface="Courier New" pitchFamily="49" charset="0"/>
+              </a:rPr>
+              <a:t>();</a:t>
+            </a:r>
+          </a:p>
+          <a:p>
+            <a:pPr eaLnBrk="0" hangingPunct="0">
+              <a:defRPr/>
+            </a:pPr>
+            <a:r>
+              <a:rPr lang="en-US" sz="900" dirty="0">
+                <a:solidFill>
+                  <a:schemeClr val="bg1"/>
+                </a:solidFill>
+                <a:ea typeface="Calibri" pitchFamily="34" charset="0"/>
+                <a:cs typeface="Courier New" pitchFamily="49" charset="0"/>
+              </a:rPr>
+              <a:t>    }</a:t>
+            </a:r>
+          </a:p>
+          <a:p>
+            <a:pPr eaLnBrk="0" hangingPunct="0">
+              <a:defRPr/>
+            </a:pPr>
+            <a:r>
+              <a:rPr lang="en-US" sz="900" dirty="0">
+                <a:solidFill>
+                  <a:schemeClr val="bg1"/>
+                </a:solidFill>
+                <a:ea typeface="Calibri" pitchFamily="34" charset="0"/>
+                <a:cs typeface="Courier New" pitchFamily="49" charset="0"/>
+              </a:rPr>
+              <a:t>    static void Main(string[] </a:t>
+            </a:r>
+            <a:r>
+              <a:rPr lang="en-US" sz="900" dirty="0" err="1">
+                <a:solidFill>
+                  <a:schemeClr val="bg1"/>
+                </a:solidFill>
+                <a:ea typeface="Calibri" pitchFamily="34" charset="0"/>
+                <a:cs typeface="Courier New" pitchFamily="49" charset="0"/>
+              </a:rPr>
+              <a:t>args</a:t>
+            </a:r>
+            <a:r>
+              <a:rPr lang="en-US" sz="900" dirty="0">
+                <a:solidFill>
+                  <a:schemeClr val="bg1"/>
+                </a:solidFill>
+                <a:ea typeface="Calibri" pitchFamily="34" charset="0"/>
+                <a:cs typeface="Courier New" pitchFamily="49" charset="0"/>
+              </a:rPr>
+              <a:t>)</a:t>
+            </a:r>
+          </a:p>
+          <a:p>
+            <a:pPr eaLnBrk="0" hangingPunct="0">
+              <a:defRPr/>
+            </a:pPr>
+            <a:r>
+              <a:rPr lang="en-US" sz="900" dirty="0">
+                <a:solidFill>
+                  <a:schemeClr val="bg1"/>
+                </a:solidFill>
+                <a:ea typeface="Calibri" pitchFamily="34" charset="0"/>
+                <a:cs typeface="Courier New" pitchFamily="49" charset="0"/>
+              </a:rPr>
+              <a:t>    {</a:t>
+            </a:r>
+          </a:p>
+          <a:p>
+            <a:pPr eaLnBrk="0" hangingPunct="0">
+              <a:defRPr/>
+            </a:pPr>
+            <a:r>
+              <a:rPr lang="en-US" sz="900" dirty="0">
+                <a:solidFill>
+                  <a:schemeClr val="bg1"/>
+                </a:solidFill>
+                <a:ea typeface="Calibri" pitchFamily="34" charset="0"/>
+                <a:cs typeface="Courier New" pitchFamily="49" charset="0"/>
+              </a:rPr>
+              <a:t>        Printer(new Point(1,2),new Arc(10,20,30),new Point3D(100,200,300));</a:t>
+            </a:r>
+          </a:p>
+          <a:p>
+            <a:pPr eaLnBrk="0" hangingPunct="0">
+              <a:defRPr/>
+            </a:pPr>
+            <a:r>
+              <a:rPr lang="en-US" sz="900" dirty="0">
+                <a:solidFill>
+                  <a:schemeClr val="bg1"/>
+                </a:solidFill>
+                <a:ea typeface="Calibri" pitchFamily="34" charset="0"/>
+                <a:cs typeface="Courier New" pitchFamily="49" charset="0"/>
+              </a:rPr>
+              <a:t>    }</a:t>
+            </a:r>
+          </a:p>
+          <a:p>
+            <a:pPr eaLnBrk="0" hangingPunct="0">
+              <a:defRPr/>
+            </a:pPr>
             <a:r>
               <a:rPr lang="en-US" sz="900" dirty="0" smtClean="0">
                 <a:solidFill>
                   <a:schemeClr val="bg1"/>
                 </a:solidFill>
-                <a:latin typeface="Courier New" pitchFamily="49" charset="0"/>
-                <a:ea typeface="Calibri" pitchFamily="34" charset="0"/>
-                <a:cs typeface="Courier New" pitchFamily="49" charset="0"/>
-              </a:rPr>
-              <a:t>n</a:t>
-            </a:r>
-            <a:r>
-              <a:rPr lang="be-BY" sz="900" dirty="0" smtClean="0">
-                <a:solidFill>
-                  <a:schemeClr val="bg1"/>
-                </a:solidFill>
-                <a:latin typeface="Courier New" pitchFamily="49" charset="0"/>
-                <a:ea typeface="Calibri" pitchFamily="34" charset="0"/>
-                <a:cs typeface="Courier New" pitchFamily="49" charset="0"/>
-              </a:rPr>
-              <a:t>table</a:t>
-            </a:r>
-            <a:endParaRPr lang="be-BY" sz="900" dirty="0">
-              <a:solidFill>
-                <a:schemeClr val="bg1"/>
-              </a:solidFill>
-              <a:ea typeface="Calibri" pitchFamily="34" charset="0"/>
-              <a:cs typeface="Courier New" pitchFamily="49" charset="0"/>
-            </a:endParaRPr>
-          </a:p>
-          <a:p>
-            <a:pPr eaLnBrk="0" hangingPunct="0">
-              <a:defRPr/>
-            </a:pPr>
-            <a:r>
-              <a:rPr lang="be-BY" sz="900" dirty="0">
-                <a:solidFill>
-                  <a:schemeClr val="bg1"/>
-                </a:solidFill>
-                <a:latin typeface="Courier New" pitchFamily="49" charset="0"/>
-                <a:ea typeface="Calibri" pitchFamily="34" charset="0"/>
-                <a:cs typeface="Courier New" pitchFamily="49" charset="0"/>
-              </a:rPr>
-              <a:t>    {</a:t>
-            </a:r>
-            <a:endParaRPr lang="be-BY" sz="900" dirty="0">
-              <a:solidFill>
-                <a:schemeClr val="bg1"/>
-              </a:solidFill>
-              <a:ea typeface="Calibri" pitchFamily="34" charset="0"/>
-              <a:cs typeface="Courier New" pitchFamily="49" charset="0"/>
-            </a:endParaRPr>
-          </a:p>
-          <a:p>
-            <a:pPr eaLnBrk="0" hangingPunct="0">
-              <a:defRPr/>
-            </a:pPr>
-            <a:r>
-              <a:rPr lang="be-BY" sz="900" dirty="0">
-                <a:solidFill>
-                  <a:schemeClr val="bg1"/>
-                </a:solidFill>
-                <a:latin typeface="Courier New" pitchFamily="49" charset="0"/>
-                <a:ea typeface="Calibri" pitchFamily="34" charset="0"/>
-                <a:cs typeface="Courier New" pitchFamily="49" charset="0"/>
-              </a:rPr>
-              <a:t>        void Print();</a:t>
-            </a:r>
-            <a:endParaRPr lang="be-BY" sz="900" dirty="0">
-              <a:solidFill>
-                <a:schemeClr val="bg1"/>
-              </a:solidFill>
-              <a:ea typeface="Calibri" pitchFamily="34" charset="0"/>
-              <a:cs typeface="Courier New" pitchFamily="49" charset="0"/>
-            </a:endParaRPr>
-          </a:p>
-          <a:p>
-            <a:pPr eaLnBrk="0" hangingPunct="0">
-              <a:defRPr/>
-            </a:pPr>
-            <a:r>
-              <a:rPr lang="be-BY" sz="900" dirty="0">
-                <a:solidFill>
-                  <a:schemeClr val="bg1"/>
-                </a:solidFill>
-                <a:latin typeface="Courier New" pitchFamily="49" charset="0"/>
-                <a:ea typeface="Calibri" pitchFamily="34" charset="0"/>
-                <a:cs typeface="Courier New" pitchFamily="49" charset="0"/>
-              </a:rPr>
-              <a:t>    }</a:t>
-            </a:r>
-            <a:endParaRPr lang="be-BY" sz="900" dirty="0">
-              <a:solidFill>
-                <a:schemeClr val="bg1"/>
-              </a:solidFill>
-              <a:ea typeface="Calibri" pitchFamily="34" charset="0"/>
-              <a:cs typeface="Courier New" pitchFamily="49" charset="0"/>
-            </a:endParaRPr>
-          </a:p>
-          <a:p>
-            <a:pPr eaLnBrk="0" hangingPunct="0">
-              <a:defRPr/>
-            </a:pPr>
-            <a:r>
-              <a:rPr lang="be-BY" sz="900" dirty="0">
-                <a:solidFill>
-                  <a:schemeClr val="bg1"/>
-                </a:solidFill>
-                <a:latin typeface="Courier New" pitchFamily="49" charset="0"/>
-                <a:ea typeface="Calibri" pitchFamily="34" charset="0"/>
-                <a:cs typeface="Courier New" pitchFamily="49" charset="0"/>
-              </a:rPr>
-              <a:t>    class Point : </a:t>
-            </a:r>
-            <a:r>
-              <a:rPr lang="be-BY" sz="900" dirty="0" smtClean="0">
-                <a:solidFill>
-                  <a:schemeClr val="bg1"/>
-                </a:solidFill>
-                <a:latin typeface="Courier New" pitchFamily="49" charset="0"/>
-                <a:ea typeface="Calibri" pitchFamily="34" charset="0"/>
-                <a:cs typeface="Courier New" pitchFamily="49" charset="0"/>
-              </a:rPr>
-              <a:t>IPri</a:t>
-            </a:r>
-            <a:r>
-              <a:rPr lang="en-US" sz="900" dirty="0" smtClean="0">
-                <a:solidFill>
-                  <a:schemeClr val="bg1"/>
-                </a:solidFill>
-                <a:latin typeface="Courier New" pitchFamily="49" charset="0"/>
-                <a:ea typeface="Calibri" pitchFamily="34" charset="0"/>
-                <a:cs typeface="Courier New" pitchFamily="49" charset="0"/>
-              </a:rPr>
-              <a:t>n</a:t>
-            </a:r>
-            <a:r>
-              <a:rPr lang="be-BY" sz="900" dirty="0" smtClean="0">
-                <a:solidFill>
-                  <a:schemeClr val="bg1"/>
-                </a:solidFill>
-                <a:latin typeface="Courier New" pitchFamily="49" charset="0"/>
-                <a:ea typeface="Calibri" pitchFamily="34" charset="0"/>
-                <a:cs typeface="Courier New" pitchFamily="49" charset="0"/>
-              </a:rPr>
-              <a:t>table</a:t>
-            </a:r>
-            <a:endParaRPr lang="be-BY" sz="900" dirty="0">
-              <a:solidFill>
-                <a:schemeClr val="bg1"/>
-              </a:solidFill>
-              <a:ea typeface="Calibri" pitchFamily="34" charset="0"/>
-              <a:cs typeface="Courier New" pitchFamily="49" charset="0"/>
-            </a:endParaRPr>
-          </a:p>
-          <a:p>
-            <a:pPr eaLnBrk="0" hangingPunct="0">
-              <a:defRPr/>
-            </a:pPr>
-            <a:r>
-              <a:rPr lang="be-BY" sz="900" dirty="0">
-                <a:solidFill>
-                  <a:schemeClr val="bg1"/>
-                </a:solidFill>
-                <a:latin typeface="Courier New" pitchFamily="49" charset="0"/>
-                <a:ea typeface="Calibri" pitchFamily="34" charset="0"/>
-                <a:cs typeface="Courier New" pitchFamily="49" charset="0"/>
-              </a:rPr>
-              <a:t>    {</a:t>
-            </a:r>
-            <a:endParaRPr lang="be-BY" sz="900" dirty="0">
-              <a:solidFill>
-                <a:schemeClr val="bg1"/>
-              </a:solidFill>
-              <a:ea typeface="Calibri" pitchFamily="34" charset="0"/>
-              <a:cs typeface="Courier New" pitchFamily="49" charset="0"/>
-            </a:endParaRPr>
-          </a:p>
-          <a:p>
-            <a:pPr eaLnBrk="0" hangingPunct="0">
-              <a:defRPr/>
-            </a:pPr>
-            <a:r>
-              <a:rPr lang="be-BY" sz="900" dirty="0">
-                <a:solidFill>
-                  <a:schemeClr val="bg1"/>
-                </a:solidFill>
-                <a:latin typeface="Courier New" pitchFamily="49" charset="0"/>
-                <a:ea typeface="Calibri" pitchFamily="34" charset="0"/>
-                <a:cs typeface="Courier New" pitchFamily="49" charset="0"/>
-              </a:rPr>
-              <a:t>        private int x;</a:t>
-            </a:r>
-            <a:endParaRPr lang="be-BY" sz="900" dirty="0">
-              <a:solidFill>
-                <a:schemeClr val="bg1"/>
-              </a:solidFill>
-              <a:ea typeface="Calibri" pitchFamily="34" charset="0"/>
-              <a:cs typeface="Courier New" pitchFamily="49" charset="0"/>
-            </a:endParaRPr>
-          </a:p>
-          <a:p>
-            <a:pPr eaLnBrk="0" hangingPunct="0">
-              <a:defRPr/>
-            </a:pPr>
-            <a:r>
-              <a:rPr lang="be-BY" sz="900" dirty="0">
-                <a:solidFill>
-                  <a:schemeClr val="bg1"/>
-                </a:solidFill>
-                <a:latin typeface="Courier New" pitchFamily="49" charset="0"/>
-                <a:ea typeface="Calibri" pitchFamily="34" charset="0"/>
-                <a:cs typeface="Courier New" pitchFamily="49" charset="0"/>
-              </a:rPr>
-              <a:t>        private int y;</a:t>
-            </a:r>
-            <a:endParaRPr lang="be-BY" sz="900" dirty="0">
-              <a:solidFill>
-                <a:schemeClr val="bg1"/>
-              </a:solidFill>
-              <a:ea typeface="Calibri" pitchFamily="34" charset="0"/>
-              <a:cs typeface="Courier New" pitchFamily="49" charset="0"/>
-            </a:endParaRPr>
-          </a:p>
-          <a:p>
-            <a:pPr eaLnBrk="0" hangingPunct="0">
-              <a:defRPr/>
-            </a:pPr>
-            <a:r>
-              <a:rPr lang="be-BY" sz="900" dirty="0">
-                <a:solidFill>
-                  <a:schemeClr val="bg1"/>
-                </a:solidFill>
-                <a:latin typeface="Courier New" pitchFamily="49" charset="0"/>
-                <a:ea typeface="Calibri" pitchFamily="34" charset="0"/>
-                <a:cs typeface="Courier New" pitchFamily="49" charset="0"/>
-              </a:rPr>
-              <a:t>        </a:t>
-            </a:r>
-            <a:r>
-              <a:rPr lang="en-US" sz="900" dirty="0">
-                <a:solidFill>
-                  <a:schemeClr val="bg1"/>
-                </a:solidFill>
-                <a:latin typeface="Courier New" pitchFamily="49" charset="0"/>
-                <a:ea typeface="Calibri" pitchFamily="34" charset="0"/>
-                <a:cs typeface="Courier New" pitchFamily="49" charset="0"/>
-              </a:rPr>
-              <a:t>. . . . . . . . . . . . . . . . . . . . . . . . . . . . . . .</a:t>
-            </a:r>
-            <a:endParaRPr lang="be-BY" sz="900" dirty="0">
-              <a:solidFill>
-                <a:schemeClr val="bg1"/>
-              </a:solidFill>
-              <a:ea typeface="Calibri" pitchFamily="34" charset="0"/>
-              <a:cs typeface="Courier New" pitchFamily="49" charset="0"/>
-            </a:endParaRPr>
-          </a:p>
-          <a:p>
-            <a:pPr eaLnBrk="0" hangingPunct="0">
-              <a:defRPr/>
-            </a:pPr>
-            <a:r>
-              <a:rPr lang="be-BY" sz="900" dirty="0">
-                <a:solidFill>
-                  <a:schemeClr val="bg1"/>
-                </a:solidFill>
-                <a:latin typeface="Courier New" pitchFamily="49" charset="0"/>
-                <a:ea typeface="Calibri" pitchFamily="34" charset="0"/>
-                <a:cs typeface="Courier New" pitchFamily="49" charset="0"/>
-              </a:rPr>
-              <a:t>        public virtual void Print()     //Обязательная реализация функции!</a:t>
-            </a:r>
-            <a:endParaRPr lang="be-BY" sz="900" dirty="0">
-              <a:solidFill>
-                <a:schemeClr val="bg1"/>
-              </a:solidFill>
-              <a:ea typeface="Calibri" pitchFamily="34" charset="0"/>
-              <a:cs typeface="Courier New" pitchFamily="49" charset="0"/>
-            </a:endParaRPr>
-          </a:p>
-          <a:p>
-            <a:pPr eaLnBrk="0" hangingPunct="0">
-              <a:defRPr/>
-            </a:pPr>
-            <a:r>
-              <a:rPr lang="be-BY" sz="900" dirty="0">
-                <a:solidFill>
-                  <a:schemeClr val="bg1"/>
-                </a:solidFill>
-                <a:latin typeface="Courier New" pitchFamily="49" charset="0"/>
-                <a:ea typeface="Calibri" pitchFamily="34" charset="0"/>
-                <a:cs typeface="Courier New" pitchFamily="49" charset="0"/>
-              </a:rPr>
-              <a:t>        {</a:t>
-            </a:r>
-            <a:endParaRPr lang="be-BY" sz="900" dirty="0">
-              <a:solidFill>
-                <a:schemeClr val="bg1"/>
-              </a:solidFill>
-              <a:ea typeface="Calibri" pitchFamily="34" charset="0"/>
-              <a:cs typeface="Courier New" pitchFamily="49" charset="0"/>
-            </a:endParaRPr>
-          </a:p>
-          <a:p>
-            <a:pPr eaLnBrk="0" hangingPunct="0">
-              <a:defRPr/>
-            </a:pPr>
-            <a:r>
-              <a:rPr lang="be-BY" sz="900" dirty="0">
-                <a:solidFill>
-                  <a:schemeClr val="bg1"/>
-                </a:solidFill>
-                <a:latin typeface="Courier New" pitchFamily="49" charset="0"/>
-                <a:ea typeface="Calibri" pitchFamily="34" charset="0"/>
-                <a:cs typeface="Courier New" pitchFamily="49" charset="0"/>
-              </a:rPr>
-              <a:t>            Console.WriteLine("I'm Point at X={0};Y={1}",x,y);</a:t>
-            </a:r>
-            <a:endParaRPr lang="be-BY" sz="900" dirty="0">
-              <a:solidFill>
-                <a:schemeClr val="bg1"/>
-              </a:solidFill>
-              <a:ea typeface="Calibri" pitchFamily="34" charset="0"/>
-              <a:cs typeface="Courier New" pitchFamily="49" charset="0"/>
-            </a:endParaRPr>
-          </a:p>
-          <a:p>
-            <a:pPr eaLnBrk="0" hangingPunct="0">
-              <a:defRPr/>
-            </a:pPr>
-            <a:r>
-              <a:rPr lang="be-BY" sz="900" dirty="0">
-                <a:solidFill>
-                  <a:schemeClr val="bg1"/>
-                </a:solidFill>
-                <a:latin typeface="Courier New" pitchFamily="49" charset="0"/>
-                <a:ea typeface="Calibri" pitchFamily="34" charset="0"/>
-                <a:cs typeface="Courier New" pitchFamily="49" charset="0"/>
-              </a:rPr>
-              <a:t>        }</a:t>
-            </a:r>
-            <a:endParaRPr lang="be-BY" sz="900" dirty="0">
-              <a:solidFill>
-                <a:schemeClr val="bg1"/>
-              </a:solidFill>
-              <a:ea typeface="Calibri" pitchFamily="34" charset="0"/>
-              <a:cs typeface="Courier New" pitchFamily="49" charset="0"/>
-            </a:endParaRPr>
-          </a:p>
-          <a:p>
-            <a:pPr eaLnBrk="0" hangingPunct="0">
-              <a:defRPr/>
-            </a:pPr>
-            <a:r>
-              <a:rPr lang="be-BY" sz="900" dirty="0">
-                <a:solidFill>
-                  <a:schemeClr val="bg1"/>
-                </a:solidFill>
-                <a:latin typeface="Courier New" pitchFamily="49" charset="0"/>
-                <a:ea typeface="Calibri" pitchFamily="34" charset="0"/>
-                <a:cs typeface="Courier New" pitchFamily="49" charset="0"/>
-              </a:rPr>
-              <a:t>    }</a:t>
-            </a:r>
-            <a:endParaRPr lang="be-BY" sz="900" dirty="0">
-              <a:solidFill>
-                <a:schemeClr val="bg1"/>
-              </a:solidFill>
-              <a:ea typeface="Calibri" pitchFamily="34" charset="0"/>
-              <a:cs typeface="Courier New" pitchFamily="49" charset="0"/>
-            </a:endParaRPr>
-          </a:p>
-          <a:p>
-            <a:pPr eaLnBrk="0" hangingPunct="0">
-              <a:defRPr/>
-            </a:pPr>
-            <a:r>
-              <a:rPr lang="be-BY" sz="900" dirty="0">
-                <a:solidFill>
-                  <a:schemeClr val="bg1"/>
-                </a:solidFill>
-                <a:latin typeface="Courier New" pitchFamily="49" charset="0"/>
-                <a:ea typeface="Calibri" pitchFamily="34" charset="0"/>
-                <a:cs typeface="Courier New" pitchFamily="49" charset="0"/>
-              </a:rPr>
-              <a:t>    class Arc : Point</a:t>
-            </a:r>
-            <a:endParaRPr lang="be-BY" sz="900" dirty="0">
-              <a:solidFill>
-                <a:schemeClr val="bg1"/>
-              </a:solidFill>
-              <a:ea typeface="Calibri" pitchFamily="34" charset="0"/>
-              <a:cs typeface="Courier New" pitchFamily="49" charset="0"/>
-            </a:endParaRPr>
-          </a:p>
-          <a:p>
-            <a:pPr eaLnBrk="0" hangingPunct="0">
-              <a:defRPr/>
-            </a:pPr>
-            <a:r>
-              <a:rPr lang="be-BY" sz="900" dirty="0">
-                <a:solidFill>
-                  <a:schemeClr val="bg1"/>
-                </a:solidFill>
-                <a:latin typeface="Courier New" pitchFamily="49" charset="0"/>
-                <a:ea typeface="Calibri" pitchFamily="34" charset="0"/>
-                <a:cs typeface="Courier New" pitchFamily="49" charset="0"/>
-              </a:rPr>
-              <a:t>    {</a:t>
-            </a:r>
-            <a:endParaRPr lang="be-BY" sz="900" dirty="0">
-              <a:solidFill>
-                <a:schemeClr val="bg1"/>
-              </a:solidFill>
-              <a:ea typeface="Calibri" pitchFamily="34" charset="0"/>
-              <a:cs typeface="Courier New" pitchFamily="49" charset="0"/>
-            </a:endParaRPr>
-          </a:p>
-          <a:p>
-            <a:pPr eaLnBrk="0" hangingPunct="0">
-              <a:defRPr/>
-            </a:pPr>
-            <a:r>
-              <a:rPr lang="be-BY" sz="900" dirty="0">
-                <a:solidFill>
-                  <a:schemeClr val="bg1"/>
-                </a:solidFill>
-                <a:latin typeface="Courier New" pitchFamily="49" charset="0"/>
-                <a:ea typeface="Calibri" pitchFamily="34" charset="0"/>
-                <a:cs typeface="Courier New" pitchFamily="49" charset="0"/>
-              </a:rPr>
-              <a:t>        private double rad;</a:t>
-            </a:r>
-            <a:endParaRPr lang="be-BY" sz="900" dirty="0">
-              <a:solidFill>
-                <a:schemeClr val="bg1"/>
-              </a:solidFill>
-              <a:ea typeface="Calibri" pitchFamily="34" charset="0"/>
-              <a:cs typeface="Courier New" pitchFamily="49" charset="0"/>
-            </a:endParaRPr>
-          </a:p>
-          <a:p>
-            <a:pPr eaLnBrk="0" hangingPunct="0">
-              <a:defRPr/>
-            </a:pPr>
-            <a:r>
-              <a:rPr lang="be-BY" sz="900" dirty="0">
-                <a:solidFill>
-                  <a:schemeClr val="bg1"/>
-                </a:solidFill>
-                <a:latin typeface="Courier New" pitchFamily="49" charset="0"/>
-                <a:ea typeface="Calibri" pitchFamily="34" charset="0"/>
-                <a:cs typeface="Courier New" pitchFamily="49" charset="0"/>
-              </a:rPr>
-              <a:t>        . . . . . . . . . . . . . . . . . . . . . . . . . . . . . . .</a:t>
-            </a:r>
-            <a:endParaRPr lang="be-BY" sz="900" dirty="0">
-              <a:solidFill>
-                <a:schemeClr val="bg1"/>
-              </a:solidFill>
-              <a:ea typeface="Calibri" pitchFamily="34" charset="0"/>
-              <a:cs typeface="Courier New" pitchFamily="49" charset="0"/>
-            </a:endParaRPr>
-          </a:p>
-          <a:p>
-            <a:pPr eaLnBrk="0" hangingPunct="0">
-              <a:defRPr/>
-            </a:pPr>
-            <a:r>
-              <a:rPr lang="be-BY" sz="900" dirty="0">
-                <a:solidFill>
-                  <a:schemeClr val="bg1"/>
-                </a:solidFill>
-                <a:latin typeface="Courier New" pitchFamily="49" charset="0"/>
-                <a:ea typeface="Calibri" pitchFamily="34" charset="0"/>
-                <a:cs typeface="Courier New" pitchFamily="49" charset="0"/>
-              </a:rPr>
-              <a:t>        public override void Print()</a:t>
-            </a:r>
-            <a:endParaRPr lang="be-BY" sz="900" dirty="0">
-              <a:solidFill>
-                <a:schemeClr val="bg1"/>
-              </a:solidFill>
-              <a:ea typeface="Calibri" pitchFamily="34" charset="0"/>
-              <a:cs typeface="Courier New" pitchFamily="49" charset="0"/>
-            </a:endParaRPr>
-          </a:p>
-          <a:p>
-            <a:pPr eaLnBrk="0" hangingPunct="0">
-              <a:defRPr/>
-            </a:pPr>
-            <a:r>
-              <a:rPr lang="be-BY" sz="900" dirty="0">
-                <a:solidFill>
-                  <a:schemeClr val="bg1"/>
-                </a:solidFill>
-                <a:latin typeface="Courier New" pitchFamily="49" charset="0"/>
-                <a:ea typeface="Calibri" pitchFamily="34" charset="0"/>
-                <a:cs typeface="Courier New" pitchFamily="49" charset="0"/>
-              </a:rPr>
-              <a:t>        {</a:t>
-            </a:r>
-            <a:endParaRPr lang="be-BY" sz="900" dirty="0">
-              <a:solidFill>
-                <a:schemeClr val="bg1"/>
-              </a:solidFill>
-              <a:ea typeface="Calibri" pitchFamily="34" charset="0"/>
-              <a:cs typeface="Courier New" pitchFamily="49" charset="0"/>
-            </a:endParaRPr>
-          </a:p>
-          <a:p>
-            <a:pPr eaLnBrk="0" hangingPunct="0">
-              <a:defRPr/>
-            </a:pPr>
-            <a:r>
-              <a:rPr lang="be-BY" sz="900" dirty="0">
-                <a:solidFill>
-                  <a:schemeClr val="bg1"/>
-                </a:solidFill>
-                <a:latin typeface="Courier New" pitchFamily="49" charset="0"/>
-                <a:ea typeface="Calibri" pitchFamily="34" charset="0"/>
-                <a:cs typeface="Courier New" pitchFamily="49" charset="0"/>
-              </a:rPr>
-              <a:t>            Console.WriteLine("I'm Arc with Radius {0} at point {1}; {2}", rad, this.X, this.Y);</a:t>
-            </a:r>
-            <a:endParaRPr lang="be-BY" sz="900" dirty="0">
-              <a:solidFill>
-                <a:schemeClr val="bg1"/>
-              </a:solidFill>
-              <a:ea typeface="Calibri" pitchFamily="34" charset="0"/>
-              <a:cs typeface="Courier New" pitchFamily="49" charset="0"/>
-            </a:endParaRPr>
-          </a:p>
-          <a:p>
-            <a:pPr eaLnBrk="0" hangingPunct="0">
-              <a:defRPr/>
-            </a:pPr>
-            <a:r>
-              <a:rPr lang="be-BY" sz="900" dirty="0">
-                <a:solidFill>
-                  <a:schemeClr val="bg1"/>
-                </a:solidFill>
-                <a:latin typeface="Courier New" pitchFamily="49" charset="0"/>
-                <a:ea typeface="Calibri" pitchFamily="34" charset="0"/>
-                <a:cs typeface="Courier New" pitchFamily="49" charset="0"/>
-              </a:rPr>
-              <a:t>        }</a:t>
-            </a:r>
-            <a:endParaRPr lang="be-BY" sz="900" dirty="0">
-              <a:solidFill>
-                <a:schemeClr val="bg1"/>
-              </a:solidFill>
-              <a:ea typeface="Calibri" pitchFamily="34" charset="0"/>
-              <a:cs typeface="Courier New" pitchFamily="49" charset="0"/>
-            </a:endParaRPr>
-          </a:p>
-          <a:p>
-            <a:pPr eaLnBrk="0" hangingPunct="0">
-              <a:defRPr/>
-            </a:pPr>
-            <a:r>
-              <a:rPr lang="be-BY" sz="900" dirty="0">
-                <a:solidFill>
-                  <a:schemeClr val="bg1"/>
-                </a:solidFill>
-                <a:latin typeface="Courier New" pitchFamily="49" charset="0"/>
-                <a:ea typeface="Calibri" pitchFamily="34" charset="0"/>
-                <a:cs typeface="Courier New" pitchFamily="49" charset="0"/>
-              </a:rPr>
-              <a:t>    }</a:t>
-            </a:r>
-            <a:endParaRPr lang="be-BY" sz="900" dirty="0">
-              <a:solidFill>
-                <a:schemeClr val="bg1"/>
-              </a:solidFill>
-              <a:ea typeface="Calibri" pitchFamily="34" charset="0"/>
-              <a:cs typeface="Courier New" pitchFamily="49" charset="0"/>
-            </a:endParaRPr>
-          </a:p>
-          <a:p>
-            <a:pPr eaLnBrk="0" hangingPunct="0">
-              <a:defRPr/>
-            </a:pPr>
-            <a:r>
-              <a:rPr lang="be-BY" sz="900" dirty="0">
-                <a:solidFill>
-                  <a:schemeClr val="bg1"/>
-                </a:solidFill>
-                <a:latin typeface="Courier New" pitchFamily="49" charset="0"/>
-                <a:ea typeface="Calibri" pitchFamily="34" charset="0"/>
-                <a:cs typeface="Courier New" pitchFamily="49" charset="0"/>
-              </a:rPr>
-              <a:t>    class Point3D : </a:t>
-            </a:r>
-            <a:r>
-              <a:rPr lang="be-BY" sz="900" dirty="0" smtClean="0">
-                <a:solidFill>
-                  <a:schemeClr val="bg1"/>
-                </a:solidFill>
-                <a:latin typeface="Courier New" pitchFamily="49" charset="0"/>
-                <a:ea typeface="Calibri" pitchFamily="34" charset="0"/>
-                <a:cs typeface="Courier New" pitchFamily="49" charset="0"/>
-              </a:rPr>
-              <a:t>IPri</a:t>
-            </a:r>
-            <a:r>
-              <a:rPr lang="en-US" sz="900" dirty="0" smtClean="0">
-                <a:solidFill>
-                  <a:schemeClr val="bg1"/>
-                </a:solidFill>
-                <a:latin typeface="Courier New" pitchFamily="49" charset="0"/>
-                <a:ea typeface="Calibri" pitchFamily="34" charset="0"/>
-                <a:cs typeface="Courier New" pitchFamily="49" charset="0"/>
-              </a:rPr>
-              <a:t>n</a:t>
-            </a:r>
-            <a:r>
-              <a:rPr lang="be-BY" sz="900" dirty="0" smtClean="0">
-                <a:solidFill>
-                  <a:schemeClr val="bg1"/>
-                </a:solidFill>
-                <a:latin typeface="Courier New" pitchFamily="49" charset="0"/>
-                <a:ea typeface="Calibri" pitchFamily="34" charset="0"/>
-                <a:cs typeface="Courier New" pitchFamily="49" charset="0"/>
-              </a:rPr>
-              <a:t>table</a:t>
-            </a:r>
-            <a:endParaRPr lang="be-BY" sz="900" dirty="0">
-              <a:solidFill>
-                <a:schemeClr val="bg1"/>
-              </a:solidFill>
-              <a:ea typeface="Calibri" pitchFamily="34" charset="0"/>
-              <a:cs typeface="Courier New" pitchFamily="49" charset="0"/>
-            </a:endParaRPr>
-          </a:p>
-          <a:p>
-            <a:pPr eaLnBrk="0" hangingPunct="0">
-              <a:defRPr/>
-            </a:pPr>
-            <a:r>
-              <a:rPr lang="be-BY" sz="900" dirty="0">
-                <a:solidFill>
-                  <a:schemeClr val="bg1"/>
-                </a:solidFill>
-                <a:latin typeface="Courier New" pitchFamily="49" charset="0"/>
-                <a:ea typeface="Calibri" pitchFamily="34" charset="0"/>
-                <a:cs typeface="Courier New" pitchFamily="49" charset="0"/>
-              </a:rPr>
-              <a:t>    {</a:t>
-            </a:r>
-            <a:endParaRPr lang="be-BY" sz="900" dirty="0">
-              <a:solidFill>
-                <a:schemeClr val="bg1"/>
-              </a:solidFill>
-              <a:ea typeface="Calibri" pitchFamily="34" charset="0"/>
-              <a:cs typeface="Courier New" pitchFamily="49" charset="0"/>
-            </a:endParaRPr>
-          </a:p>
-          <a:p>
-            <a:pPr eaLnBrk="0" hangingPunct="0">
-              <a:defRPr/>
-            </a:pPr>
-            <a:r>
-              <a:rPr lang="be-BY" sz="900" dirty="0">
-                <a:solidFill>
-                  <a:schemeClr val="bg1"/>
-                </a:solidFill>
-                <a:latin typeface="Courier New" pitchFamily="49" charset="0"/>
-                <a:ea typeface="Calibri" pitchFamily="34" charset="0"/>
-                <a:cs typeface="Courier New" pitchFamily="49" charset="0"/>
-              </a:rPr>
-              <a:t>        int x, y, z;</a:t>
-            </a:r>
-            <a:endParaRPr lang="be-BY" sz="900" dirty="0">
-              <a:solidFill>
-                <a:schemeClr val="bg1"/>
-              </a:solidFill>
-              <a:ea typeface="Calibri" pitchFamily="34" charset="0"/>
-              <a:cs typeface="Courier New" pitchFamily="49" charset="0"/>
-            </a:endParaRPr>
-          </a:p>
-          <a:p>
-            <a:pPr eaLnBrk="0" hangingPunct="0">
-              <a:defRPr/>
-            </a:pPr>
-            <a:r>
-              <a:rPr lang="be-BY" sz="900" dirty="0">
-                <a:solidFill>
-                  <a:schemeClr val="bg1"/>
-                </a:solidFill>
-                <a:latin typeface="Courier New" pitchFamily="49" charset="0"/>
-                <a:ea typeface="Calibri" pitchFamily="34" charset="0"/>
-                <a:cs typeface="Courier New" pitchFamily="49" charset="0"/>
-              </a:rPr>
-              <a:t>        . . . . . . . . . . . . . . . . . . . . . . . . . . . . . . . .</a:t>
-            </a:r>
-            <a:endParaRPr lang="be-BY" sz="900" dirty="0">
-              <a:solidFill>
-                <a:schemeClr val="bg1"/>
-              </a:solidFill>
-              <a:ea typeface="Calibri" pitchFamily="34" charset="0"/>
-              <a:cs typeface="Courier New" pitchFamily="49" charset="0"/>
-            </a:endParaRPr>
-          </a:p>
-          <a:p>
-            <a:pPr eaLnBrk="0" hangingPunct="0">
-              <a:defRPr/>
-            </a:pPr>
-            <a:r>
-              <a:rPr lang="be-BY" sz="900" dirty="0">
-                <a:solidFill>
-                  <a:schemeClr val="bg1"/>
-                </a:solidFill>
-                <a:latin typeface="Courier New" pitchFamily="49" charset="0"/>
-                <a:ea typeface="Calibri" pitchFamily="34" charset="0"/>
-                <a:cs typeface="Courier New" pitchFamily="49" charset="0"/>
-              </a:rPr>
-              <a:t>        public void Print()</a:t>
-            </a:r>
-            <a:endParaRPr lang="be-BY" sz="900" dirty="0">
-              <a:solidFill>
-                <a:schemeClr val="bg1"/>
-              </a:solidFill>
-              <a:ea typeface="Calibri" pitchFamily="34" charset="0"/>
-              <a:cs typeface="Courier New" pitchFamily="49" charset="0"/>
-            </a:endParaRPr>
-          </a:p>
-          <a:p>
-            <a:pPr eaLnBrk="0" hangingPunct="0">
-              <a:defRPr/>
-            </a:pPr>
-            <a:r>
-              <a:rPr lang="be-BY" sz="900" dirty="0">
-                <a:solidFill>
-                  <a:schemeClr val="bg1"/>
-                </a:solidFill>
-                <a:latin typeface="Courier New" pitchFamily="49" charset="0"/>
-                <a:ea typeface="Calibri" pitchFamily="34" charset="0"/>
-                <a:cs typeface="Courier New" pitchFamily="49" charset="0"/>
-              </a:rPr>
-              <a:t>        {</a:t>
-            </a:r>
-            <a:endParaRPr lang="be-BY" sz="900" dirty="0">
-              <a:solidFill>
-                <a:schemeClr val="bg1"/>
-              </a:solidFill>
-              <a:ea typeface="Calibri" pitchFamily="34" charset="0"/>
-              <a:cs typeface="Courier New" pitchFamily="49" charset="0"/>
-            </a:endParaRPr>
-          </a:p>
-          <a:p>
-            <a:pPr eaLnBrk="0" hangingPunct="0">
-              <a:defRPr/>
-            </a:pPr>
-            <a:r>
-              <a:rPr lang="be-BY" sz="900" dirty="0">
-                <a:solidFill>
-                  <a:schemeClr val="bg1"/>
-                </a:solidFill>
-                <a:latin typeface="Courier New" pitchFamily="49" charset="0"/>
-                <a:ea typeface="Calibri" pitchFamily="34" charset="0"/>
-                <a:cs typeface="Courier New" pitchFamily="49" charset="0"/>
-              </a:rPr>
-              <a:t>            Console.WriteLine("I'm Point 3D at X={0};Y={1};Z={2}", x, y, z);</a:t>
-            </a:r>
-            <a:endParaRPr lang="be-BY" sz="900" dirty="0">
-              <a:solidFill>
-                <a:schemeClr val="bg1"/>
-              </a:solidFill>
-              <a:ea typeface="Calibri" pitchFamily="34" charset="0"/>
-              <a:cs typeface="Courier New" pitchFamily="49" charset="0"/>
-            </a:endParaRPr>
-          </a:p>
-          <a:p>
-            <a:pPr eaLnBrk="0" hangingPunct="0">
-              <a:defRPr/>
-            </a:pPr>
-            <a:r>
-              <a:rPr lang="be-BY" sz="900" dirty="0">
-                <a:solidFill>
-                  <a:schemeClr val="bg1"/>
-                </a:solidFill>
-                <a:latin typeface="Courier New" pitchFamily="49" charset="0"/>
-                <a:ea typeface="Calibri" pitchFamily="34" charset="0"/>
-                <a:cs typeface="Courier New" pitchFamily="49" charset="0"/>
-              </a:rPr>
-              <a:t>        }</a:t>
-            </a:r>
-            <a:endParaRPr lang="be-BY" sz="900" dirty="0">
-              <a:solidFill>
-                <a:schemeClr val="bg1"/>
-              </a:solidFill>
-              <a:ea typeface="Calibri" pitchFamily="34" charset="0"/>
-              <a:cs typeface="Courier New" pitchFamily="49" charset="0"/>
-            </a:endParaRPr>
-          </a:p>
-          <a:p>
-            <a:pPr eaLnBrk="0" hangingPunct="0">
-              <a:defRPr/>
-            </a:pPr>
-            <a:r>
-              <a:rPr lang="be-BY" sz="900" dirty="0">
-                <a:solidFill>
-                  <a:schemeClr val="bg1"/>
-                </a:solidFill>
-                <a:latin typeface="Courier New" pitchFamily="49" charset="0"/>
-                <a:ea typeface="Calibri" pitchFamily="34" charset="0"/>
-                <a:cs typeface="Courier New" pitchFamily="49" charset="0"/>
-              </a:rPr>
-              <a:t>    }</a:t>
-            </a:r>
-            <a:endParaRPr lang="be-BY" sz="900" dirty="0">
-              <a:solidFill>
-                <a:schemeClr val="bg1"/>
-              </a:solidFill>
-              <a:ea typeface="Calibri" pitchFamily="34" charset="0"/>
-              <a:cs typeface="Courier New" pitchFamily="49" charset="0"/>
-            </a:endParaRPr>
-          </a:p>
-          <a:p>
-            <a:pPr eaLnBrk="0" hangingPunct="0">
-              <a:defRPr/>
-            </a:pPr>
-            <a:r>
-              <a:rPr lang="be-BY" sz="900" dirty="0">
-                <a:solidFill>
-                  <a:schemeClr val="bg1"/>
-                </a:solidFill>
-                <a:latin typeface="Courier New" pitchFamily="49" charset="0"/>
-                <a:ea typeface="Calibri" pitchFamily="34" charset="0"/>
-                <a:cs typeface="Courier New" pitchFamily="49" charset="0"/>
-              </a:rPr>
-              <a:t>    class Program</a:t>
-            </a:r>
-            <a:endParaRPr lang="be-BY" sz="900" dirty="0">
-              <a:solidFill>
-                <a:schemeClr val="bg1"/>
-              </a:solidFill>
-              <a:ea typeface="Calibri" pitchFamily="34" charset="0"/>
-              <a:cs typeface="Courier New" pitchFamily="49" charset="0"/>
-            </a:endParaRPr>
-          </a:p>
-          <a:p>
-            <a:pPr eaLnBrk="0" hangingPunct="0">
-              <a:defRPr/>
-            </a:pPr>
-            <a:r>
-              <a:rPr lang="be-BY" sz="900" dirty="0">
-                <a:solidFill>
-                  <a:schemeClr val="bg1"/>
-                </a:solidFill>
-                <a:latin typeface="Courier New" pitchFamily="49" charset="0"/>
-                <a:ea typeface="Calibri" pitchFamily="34" charset="0"/>
-                <a:cs typeface="Courier New" pitchFamily="49" charset="0"/>
-              </a:rPr>
-              <a:t>    {</a:t>
-            </a:r>
-            <a:endParaRPr lang="be-BY" sz="900" dirty="0">
-              <a:solidFill>
-                <a:schemeClr val="bg1"/>
-              </a:solidFill>
-              <a:ea typeface="Calibri" pitchFamily="34" charset="0"/>
-              <a:cs typeface="Courier New" pitchFamily="49" charset="0"/>
-            </a:endParaRPr>
-          </a:p>
-          <a:p>
-            <a:pPr eaLnBrk="0" hangingPunct="0">
-              <a:defRPr/>
-            </a:pPr>
-            <a:r>
-              <a:rPr lang="be-BY" sz="900" dirty="0">
-                <a:solidFill>
-                  <a:schemeClr val="bg1"/>
-                </a:solidFill>
-                <a:latin typeface="Courier New" pitchFamily="49" charset="0"/>
-                <a:ea typeface="Calibri" pitchFamily="34" charset="0"/>
-                <a:cs typeface="Courier New" pitchFamily="49" charset="0"/>
-              </a:rPr>
-              <a:t>        static void Printer(params </a:t>
-            </a:r>
-            <a:r>
-              <a:rPr lang="be-BY" sz="900" dirty="0" smtClean="0">
-                <a:solidFill>
-                  <a:schemeClr val="bg1"/>
-                </a:solidFill>
-                <a:latin typeface="Courier New" pitchFamily="49" charset="0"/>
-                <a:ea typeface="Calibri" pitchFamily="34" charset="0"/>
-                <a:cs typeface="Courier New" pitchFamily="49" charset="0"/>
-              </a:rPr>
-              <a:t>IPri</a:t>
-            </a:r>
-            <a:r>
-              <a:rPr lang="en-US" sz="900" dirty="0" smtClean="0">
-                <a:solidFill>
-                  <a:schemeClr val="bg1"/>
-                </a:solidFill>
-                <a:latin typeface="Courier New" pitchFamily="49" charset="0"/>
-                <a:ea typeface="Calibri" pitchFamily="34" charset="0"/>
-                <a:cs typeface="Courier New" pitchFamily="49" charset="0"/>
-              </a:rPr>
-              <a:t>n</a:t>
-            </a:r>
-            <a:r>
-              <a:rPr lang="be-BY" sz="900" dirty="0" smtClean="0">
-                <a:solidFill>
-                  <a:schemeClr val="bg1"/>
-                </a:solidFill>
-                <a:latin typeface="Courier New" pitchFamily="49" charset="0"/>
-                <a:ea typeface="Calibri" pitchFamily="34" charset="0"/>
-                <a:cs typeface="Courier New" pitchFamily="49" charset="0"/>
-              </a:rPr>
-              <a:t>table</a:t>
-            </a:r>
-            <a:r>
-              <a:rPr lang="be-BY" sz="900" dirty="0">
-                <a:solidFill>
-                  <a:schemeClr val="bg1"/>
-                </a:solidFill>
-                <a:latin typeface="Courier New" pitchFamily="49" charset="0"/>
-                <a:ea typeface="Calibri" pitchFamily="34" charset="0"/>
-                <a:cs typeface="Courier New" pitchFamily="49" charset="0"/>
-              </a:rPr>
-              <a:t>[] vals)</a:t>
-            </a:r>
-            <a:endParaRPr lang="be-BY" sz="900" dirty="0">
-              <a:solidFill>
-                <a:schemeClr val="bg1"/>
-              </a:solidFill>
-              <a:ea typeface="Calibri" pitchFamily="34" charset="0"/>
-              <a:cs typeface="Courier New" pitchFamily="49" charset="0"/>
-            </a:endParaRPr>
-          </a:p>
-          <a:p>
-            <a:pPr eaLnBrk="0" hangingPunct="0">
-              <a:defRPr/>
-            </a:pPr>
-            <a:r>
-              <a:rPr lang="be-BY" sz="900" dirty="0">
-                <a:solidFill>
-                  <a:schemeClr val="bg1"/>
-                </a:solidFill>
-                <a:latin typeface="Courier New" pitchFamily="49" charset="0"/>
-                <a:ea typeface="Calibri" pitchFamily="34" charset="0"/>
-                <a:cs typeface="Courier New" pitchFamily="49" charset="0"/>
-              </a:rPr>
-              <a:t>        {</a:t>
-            </a:r>
-            <a:endParaRPr lang="be-BY" sz="900" dirty="0">
-              <a:solidFill>
-                <a:schemeClr val="bg1"/>
-              </a:solidFill>
-              <a:ea typeface="Calibri" pitchFamily="34" charset="0"/>
-              <a:cs typeface="Courier New" pitchFamily="49" charset="0"/>
-            </a:endParaRPr>
-          </a:p>
-          <a:p>
-            <a:pPr eaLnBrk="0" hangingPunct="0">
-              <a:defRPr/>
-            </a:pPr>
-            <a:r>
-              <a:rPr lang="be-BY" sz="900" dirty="0">
-                <a:solidFill>
-                  <a:schemeClr val="bg1"/>
-                </a:solidFill>
-                <a:latin typeface="Courier New" pitchFamily="49" charset="0"/>
-                <a:ea typeface="Calibri" pitchFamily="34" charset="0"/>
-                <a:cs typeface="Courier New" pitchFamily="49" charset="0"/>
-              </a:rPr>
-              <a:t>            foreach (</a:t>
-            </a:r>
-            <a:r>
-              <a:rPr lang="be-BY" sz="900" dirty="0" smtClean="0">
-                <a:solidFill>
-                  <a:schemeClr val="bg1"/>
-                </a:solidFill>
-                <a:latin typeface="Courier New" pitchFamily="49" charset="0"/>
-                <a:ea typeface="Calibri" pitchFamily="34" charset="0"/>
-                <a:cs typeface="Courier New" pitchFamily="49" charset="0"/>
-              </a:rPr>
-              <a:t>IPri</a:t>
-            </a:r>
-            <a:r>
-              <a:rPr lang="en-US" sz="900" dirty="0" smtClean="0">
-                <a:solidFill>
-                  <a:schemeClr val="bg1"/>
-                </a:solidFill>
-                <a:latin typeface="Courier New" pitchFamily="49" charset="0"/>
-                <a:ea typeface="Calibri" pitchFamily="34" charset="0"/>
-                <a:cs typeface="Courier New" pitchFamily="49" charset="0"/>
-              </a:rPr>
-              <a:t>n</a:t>
-            </a:r>
-            <a:r>
-              <a:rPr lang="be-BY" sz="900" dirty="0" smtClean="0">
-                <a:solidFill>
-                  <a:schemeClr val="bg1"/>
-                </a:solidFill>
-                <a:latin typeface="Courier New" pitchFamily="49" charset="0"/>
-                <a:ea typeface="Calibri" pitchFamily="34" charset="0"/>
-                <a:cs typeface="Courier New" pitchFamily="49" charset="0"/>
-              </a:rPr>
-              <a:t>table </a:t>
-            </a:r>
-            <a:r>
-              <a:rPr lang="be-BY" sz="900" dirty="0">
-                <a:solidFill>
-                  <a:schemeClr val="bg1"/>
-                </a:solidFill>
-                <a:latin typeface="Courier New" pitchFamily="49" charset="0"/>
-                <a:ea typeface="Calibri" pitchFamily="34" charset="0"/>
-                <a:cs typeface="Courier New" pitchFamily="49" charset="0"/>
-              </a:rPr>
-              <a:t>obj in vals)</a:t>
-            </a:r>
-            <a:endParaRPr lang="be-BY" sz="900" dirty="0">
-              <a:solidFill>
-                <a:schemeClr val="bg1"/>
-              </a:solidFill>
-              <a:ea typeface="Calibri" pitchFamily="34" charset="0"/>
-              <a:cs typeface="Courier New" pitchFamily="49" charset="0"/>
-            </a:endParaRPr>
-          </a:p>
-          <a:p>
-            <a:pPr eaLnBrk="0" hangingPunct="0">
-              <a:defRPr/>
-            </a:pPr>
-            <a:r>
-              <a:rPr lang="be-BY" sz="900" dirty="0">
-                <a:solidFill>
-                  <a:schemeClr val="bg1"/>
-                </a:solidFill>
-                <a:latin typeface="Courier New" pitchFamily="49" charset="0"/>
-                <a:ea typeface="Calibri" pitchFamily="34" charset="0"/>
-                <a:cs typeface="Courier New" pitchFamily="49" charset="0"/>
-              </a:rPr>
-              <a:t>                obj.Print();</a:t>
-            </a:r>
-            <a:endParaRPr lang="be-BY" sz="900" dirty="0">
-              <a:solidFill>
-                <a:schemeClr val="bg1"/>
-              </a:solidFill>
-              <a:ea typeface="Calibri" pitchFamily="34" charset="0"/>
-              <a:cs typeface="Courier New" pitchFamily="49" charset="0"/>
-            </a:endParaRPr>
-          </a:p>
-          <a:p>
-            <a:pPr eaLnBrk="0" hangingPunct="0">
-              <a:defRPr/>
-            </a:pPr>
-            <a:r>
-              <a:rPr lang="be-BY" sz="900" dirty="0">
-                <a:solidFill>
-                  <a:schemeClr val="bg1"/>
-                </a:solidFill>
-                <a:latin typeface="Courier New" pitchFamily="49" charset="0"/>
-                <a:ea typeface="Calibri" pitchFamily="34" charset="0"/>
-                <a:cs typeface="Courier New" pitchFamily="49" charset="0"/>
-              </a:rPr>
-              <a:t>        }</a:t>
-            </a:r>
-            <a:endParaRPr lang="be-BY" sz="900" dirty="0">
-              <a:solidFill>
-                <a:schemeClr val="bg1"/>
-              </a:solidFill>
-              <a:ea typeface="Calibri" pitchFamily="34" charset="0"/>
-              <a:cs typeface="Courier New" pitchFamily="49" charset="0"/>
-            </a:endParaRPr>
-          </a:p>
-          <a:p>
-            <a:pPr eaLnBrk="0" hangingPunct="0">
-              <a:defRPr/>
-            </a:pPr>
-            <a:r>
-              <a:rPr lang="be-BY" sz="900" dirty="0">
-                <a:solidFill>
-                  <a:schemeClr val="bg1"/>
-                </a:solidFill>
-                <a:latin typeface="Courier New" pitchFamily="49" charset="0"/>
-                <a:ea typeface="Calibri" pitchFamily="34" charset="0"/>
-                <a:cs typeface="Courier New" pitchFamily="49" charset="0"/>
-              </a:rPr>
-              <a:t>        static void Main(string[] args)</a:t>
-            </a:r>
-            <a:endParaRPr lang="be-BY" sz="900" dirty="0">
-              <a:solidFill>
-                <a:schemeClr val="bg1"/>
-              </a:solidFill>
-              <a:ea typeface="Calibri" pitchFamily="34" charset="0"/>
-              <a:cs typeface="Courier New" pitchFamily="49" charset="0"/>
-            </a:endParaRPr>
-          </a:p>
-          <a:p>
-            <a:pPr eaLnBrk="0" hangingPunct="0">
-              <a:defRPr/>
-            </a:pPr>
-            <a:r>
-              <a:rPr lang="be-BY" sz="900" dirty="0">
-                <a:solidFill>
-                  <a:schemeClr val="bg1"/>
-                </a:solidFill>
-                <a:latin typeface="Courier New" pitchFamily="49" charset="0"/>
-                <a:ea typeface="Calibri" pitchFamily="34" charset="0"/>
-                <a:cs typeface="Courier New" pitchFamily="49" charset="0"/>
-              </a:rPr>
-              <a:t>        {</a:t>
-            </a:r>
-            <a:endParaRPr lang="be-BY" sz="900" dirty="0">
-              <a:solidFill>
-                <a:schemeClr val="bg1"/>
-              </a:solidFill>
-              <a:ea typeface="Calibri" pitchFamily="34" charset="0"/>
-              <a:cs typeface="Courier New" pitchFamily="49" charset="0"/>
-            </a:endParaRPr>
-          </a:p>
-          <a:p>
-            <a:pPr eaLnBrk="0" hangingPunct="0">
-              <a:defRPr/>
-            </a:pPr>
-            <a:r>
-              <a:rPr lang="be-BY" sz="900" dirty="0">
-                <a:solidFill>
-                  <a:schemeClr val="bg1"/>
-                </a:solidFill>
-                <a:latin typeface="Courier New" pitchFamily="49" charset="0"/>
-                <a:ea typeface="Calibri" pitchFamily="34" charset="0"/>
-                <a:cs typeface="Courier New" pitchFamily="49" charset="0"/>
-              </a:rPr>
-              <a:t>            Printer(new Point(1,2),new Arc(10,20,30),new Point3D(100,200,300));</a:t>
-            </a:r>
-            <a:endParaRPr lang="be-BY" sz="900" dirty="0">
-              <a:solidFill>
-                <a:schemeClr val="bg1"/>
-              </a:solidFill>
-              <a:ea typeface="Calibri" pitchFamily="34" charset="0"/>
-              <a:cs typeface="Courier New" pitchFamily="49" charset="0"/>
-            </a:endParaRPr>
-          </a:p>
-          <a:p>
-            <a:pPr eaLnBrk="0" hangingPunct="0">
-              <a:defRPr/>
-            </a:pPr>
-            <a:r>
-              <a:rPr lang="be-BY" sz="900" dirty="0">
-                <a:solidFill>
-                  <a:schemeClr val="bg1"/>
-                </a:solidFill>
-                <a:latin typeface="Courier New" pitchFamily="49" charset="0"/>
-                <a:ea typeface="Calibri" pitchFamily="34" charset="0"/>
-                <a:cs typeface="Courier New" pitchFamily="49" charset="0"/>
-              </a:rPr>
-              <a:t>        }</a:t>
-            </a:r>
-            <a:endParaRPr lang="be-BY" sz="900" dirty="0">
-              <a:solidFill>
-                <a:schemeClr val="bg1"/>
-              </a:solidFill>
-              <a:ea typeface="Calibri" pitchFamily="34" charset="0"/>
-              <a:cs typeface="Courier New" pitchFamily="49" charset="0"/>
-            </a:endParaRPr>
-          </a:p>
-          <a:p>
-            <a:pPr eaLnBrk="0" hangingPunct="0">
-              <a:defRPr/>
-            </a:pPr>
-            <a:r>
-              <a:rPr lang="be-BY" sz="900" dirty="0">
-                <a:solidFill>
-                  <a:schemeClr val="bg1"/>
-                </a:solidFill>
-                <a:latin typeface="Courier New" pitchFamily="49" charset="0"/>
-                <a:ea typeface="Calibri" pitchFamily="34" charset="0"/>
-                <a:cs typeface="Courier New" pitchFamily="49" charset="0"/>
-              </a:rPr>
-              <a:t>    }</a:t>
+                <a:ea typeface="Calibri" pitchFamily="34" charset="0"/>
+                <a:cs typeface="Courier New" pitchFamily="49" charset="0"/>
+              </a:rPr>
+              <a:t>}</a:t>
             </a:r>
             <a:endParaRPr lang="be-BY" sz="900" dirty="0">
               <a:solidFill>

</xml_diff>

<commit_message>
Removed vk link from front slide
</commit_message>
<xml_diff>
--- a/Presentation/lesson-02.pptx
+++ b/Presentation/lesson-02.pptx
@@ -311,7 +311,7 @@
           <a:p>
             <a:fld id="{8E6E6A2A-E9D3-4A0D-B04A-ABDD367A1E08}" type="datetimeFigureOut">
               <a:rPr lang="ru-RU" smtClean="0"/>
-              <a:t>02.11.2012</a:t>
+              <a:t>06.11.2012</a:t>
             </a:fld>
             <a:endParaRPr lang="ru-RU"/>
           </a:p>
@@ -481,7 +481,7 @@
           <a:p>
             <a:fld id="{8E6E6A2A-E9D3-4A0D-B04A-ABDD367A1E08}" type="datetimeFigureOut">
               <a:rPr lang="ru-RU" smtClean="0"/>
-              <a:t>02.11.2012</a:t>
+              <a:t>06.11.2012</a:t>
             </a:fld>
             <a:endParaRPr lang="ru-RU"/>
           </a:p>
@@ -661,7 +661,7 @@
           <a:p>
             <a:fld id="{8E6E6A2A-E9D3-4A0D-B04A-ABDD367A1E08}" type="datetimeFigureOut">
               <a:rPr lang="ru-RU" smtClean="0"/>
-              <a:t>02.11.2012</a:t>
+              <a:t>06.11.2012</a:t>
             </a:fld>
             <a:endParaRPr lang="ru-RU"/>
           </a:p>
@@ -831,7 +831,7 @@
           <a:p>
             <a:fld id="{8E6E6A2A-E9D3-4A0D-B04A-ABDD367A1E08}" type="datetimeFigureOut">
               <a:rPr lang="ru-RU" smtClean="0"/>
-              <a:t>02.11.2012</a:t>
+              <a:t>06.11.2012</a:t>
             </a:fld>
             <a:endParaRPr lang="ru-RU"/>
           </a:p>
@@ -1077,7 +1077,7 @@
           <a:p>
             <a:fld id="{8E6E6A2A-E9D3-4A0D-B04A-ABDD367A1E08}" type="datetimeFigureOut">
               <a:rPr lang="ru-RU" smtClean="0"/>
-              <a:t>02.11.2012</a:t>
+              <a:t>06.11.2012</a:t>
             </a:fld>
             <a:endParaRPr lang="ru-RU"/>
           </a:p>
@@ -1365,7 +1365,7 @@
           <a:p>
             <a:fld id="{8E6E6A2A-E9D3-4A0D-B04A-ABDD367A1E08}" type="datetimeFigureOut">
               <a:rPr lang="ru-RU" smtClean="0"/>
-              <a:t>02.11.2012</a:t>
+              <a:t>06.11.2012</a:t>
             </a:fld>
             <a:endParaRPr lang="ru-RU"/>
           </a:p>
@@ -1787,7 +1787,7 @@
           <a:p>
             <a:fld id="{8E6E6A2A-E9D3-4A0D-B04A-ABDD367A1E08}" type="datetimeFigureOut">
               <a:rPr lang="ru-RU" smtClean="0"/>
-              <a:t>02.11.2012</a:t>
+              <a:t>06.11.2012</a:t>
             </a:fld>
             <a:endParaRPr lang="ru-RU"/>
           </a:p>
@@ -1905,7 +1905,7 @@
           <a:p>
             <a:fld id="{8E6E6A2A-E9D3-4A0D-B04A-ABDD367A1E08}" type="datetimeFigureOut">
               <a:rPr lang="ru-RU" smtClean="0"/>
-              <a:t>02.11.2012</a:t>
+              <a:t>06.11.2012</a:t>
             </a:fld>
             <a:endParaRPr lang="ru-RU"/>
           </a:p>
@@ -2000,7 +2000,7 @@
           <a:p>
             <a:fld id="{8E6E6A2A-E9D3-4A0D-B04A-ABDD367A1E08}" type="datetimeFigureOut">
               <a:rPr lang="ru-RU" smtClean="0"/>
-              <a:t>02.11.2012</a:t>
+              <a:t>06.11.2012</a:t>
             </a:fld>
             <a:endParaRPr lang="ru-RU"/>
           </a:p>
@@ -2277,7 +2277,7 @@
           <a:p>
             <a:fld id="{8E6E6A2A-E9D3-4A0D-B04A-ABDD367A1E08}" type="datetimeFigureOut">
               <a:rPr lang="ru-RU" smtClean="0"/>
-              <a:t>02.11.2012</a:t>
+              <a:t>06.11.2012</a:t>
             </a:fld>
             <a:endParaRPr lang="ru-RU"/>
           </a:p>
@@ -2530,7 +2530,7 @@
           <a:p>
             <a:fld id="{8E6E6A2A-E9D3-4A0D-B04A-ABDD367A1E08}" type="datetimeFigureOut">
               <a:rPr lang="ru-RU" smtClean="0"/>
-              <a:t>02.11.2012</a:t>
+              <a:t>06.11.2012</a:t>
             </a:fld>
             <a:endParaRPr lang="ru-RU"/>
           </a:p>
@@ -2743,7 +2743,7 @@
           <a:p>
             <a:fld id="{8E6E6A2A-E9D3-4A0D-B04A-ABDD367A1E08}" type="datetimeFigureOut">
               <a:rPr lang="ru-RU" smtClean="0"/>
-              <a:t>02.11.2012</a:t>
+              <a:t>06.11.2012</a:t>
             </a:fld>
             <a:endParaRPr lang="ru-RU"/>
           </a:p>
@@ -3289,40 +3289,6 @@
           </a:p>
         </p:txBody>
       </p:sp>
-      <p:sp>
-        <p:nvSpPr>
-          <p:cNvPr id="5" name="TextBox 4"/>
-          <p:cNvSpPr txBox="1"/>
-          <p:nvPr/>
-        </p:nvSpPr>
-        <p:spPr>
-          <a:xfrm>
-            <a:off x="3120449" y="5589240"/>
-            <a:ext cx="2903102" cy="369332"/>
-          </a:xfrm>
-          <a:prstGeom prst="rect">
-            <a:avLst/>
-          </a:prstGeom>
-          <a:noFill/>
-        </p:spPr>
-        <p:txBody>
-          <a:bodyPr wrap="none" rtlCol="0">
-            <a:spAutoFit/>
-          </a:bodyPr>
-          <a:lstStyle/>
-          <a:p>
-            <a:r>
-              <a:rPr lang="en-US" dirty="0">
-                <a:solidFill>
-                  <a:schemeClr val="bg1"/>
-                </a:solidFill>
-              </a:rPr>
-              <a:t>http://vk.com/club33848893</a:t>
-            </a:r>
-            <a:endParaRPr lang="en-US" dirty="0"/>
-          </a:p>
-        </p:txBody>
-      </p:sp>
     </p:spTree>
     <p:extLst>
       <p:ext uri="{BB962C8B-B14F-4D97-AF65-F5344CB8AC3E}">

</xml_diff>

<commit_message>
Added info about generic collections
</commit_message>
<xml_diff>
--- a/Presentation/lesson-02.pptx
+++ b/Presentation/lesson-02.pptx
@@ -27,8 +27,9 @@
     <p:sldId id="276" r:id="rId21"/>
     <p:sldId id="277" r:id="rId22"/>
     <p:sldId id="278" r:id="rId23"/>
-    <p:sldId id="281" r:id="rId24"/>
-    <p:sldId id="279" r:id="rId25"/>
+    <p:sldId id="282" r:id="rId24"/>
+    <p:sldId id="281" r:id="rId25"/>
+    <p:sldId id="279" r:id="rId26"/>
   </p:sldIdLst>
   <p:sldSz cx="9144000" cy="6858000" type="screen4x3"/>
   <p:notesSz cx="6858000" cy="9144000"/>
@@ -311,7 +312,7 @@
           <a:p>
             <a:fld id="{8E6E6A2A-E9D3-4A0D-B04A-ABDD367A1E08}" type="datetimeFigureOut">
               <a:rPr lang="ru-RU" smtClean="0"/>
-              <a:t>06.11.2012</a:t>
+              <a:t>22.02.2013</a:t>
             </a:fld>
             <a:endParaRPr lang="ru-RU"/>
           </a:p>
@@ -481,7 +482,7 @@
           <a:p>
             <a:fld id="{8E6E6A2A-E9D3-4A0D-B04A-ABDD367A1E08}" type="datetimeFigureOut">
               <a:rPr lang="ru-RU" smtClean="0"/>
-              <a:t>06.11.2012</a:t>
+              <a:t>22.02.2013</a:t>
             </a:fld>
             <a:endParaRPr lang="ru-RU"/>
           </a:p>
@@ -661,7 +662,7 @@
           <a:p>
             <a:fld id="{8E6E6A2A-E9D3-4A0D-B04A-ABDD367A1E08}" type="datetimeFigureOut">
               <a:rPr lang="ru-RU" smtClean="0"/>
-              <a:t>06.11.2012</a:t>
+              <a:t>22.02.2013</a:t>
             </a:fld>
             <a:endParaRPr lang="ru-RU"/>
           </a:p>
@@ -831,7 +832,7 @@
           <a:p>
             <a:fld id="{8E6E6A2A-E9D3-4A0D-B04A-ABDD367A1E08}" type="datetimeFigureOut">
               <a:rPr lang="ru-RU" smtClean="0"/>
-              <a:t>06.11.2012</a:t>
+              <a:t>22.02.2013</a:t>
             </a:fld>
             <a:endParaRPr lang="ru-RU"/>
           </a:p>
@@ -1077,7 +1078,7 @@
           <a:p>
             <a:fld id="{8E6E6A2A-E9D3-4A0D-B04A-ABDD367A1E08}" type="datetimeFigureOut">
               <a:rPr lang="ru-RU" smtClean="0"/>
-              <a:t>06.11.2012</a:t>
+              <a:t>22.02.2013</a:t>
             </a:fld>
             <a:endParaRPr lang="ru-RU"/>
           </a:p>
@@ -1365,7 +1366,7 @@
           <a:p>
             <a:fld id="{8E6E6A2A-E9D3-4A0D-B04A-ABDD367A1E08}" type="datetimeFigureOut">
               <a:rPr lang="ru-RU" smtClean="0"/>
-              <a:t>06.11.2012</a:t>
+              <a:t>22.02.2013</a:t>
             </a:fld>
             <a:endParaRPr lang="ru-RU"/>
           </a:p>
@@ -1787,7 +1788,7 @@
           <a:p>
             <a:fld id="{8E6E6A2A-E9D3-4A0D-B04A-ABDD367A1E08}" type="datetimeFigureOut">
               <a:rPr lang="ru-RU" smtClean="0"/>
-              <a:t>06.11.2012</a:t>
+              <a:t>22.02.2013</a:t>
             </a:fld>
             <a:endParaRPr lang="ru-RU"/>
           </a:p>
@@ -1905,7 +1906,7 @@
           <a:p>
             <a:fld id="{8E6E6A2A-E9D3-4A0D-B04A-ABDD367A1E08}" type="datetimeFigureOut">
               <a:rPr lang="ru-RU" smtClean="0"/>
-              <a:t>06.11.2012</a:t>
+              <a:t>22.02.2013</a:t>
             </a:fld>
             <a:endParaRPr lang="ru-RU"/>
           </a:p>
@@ -2000,7 +2001,7 @@
           <a:p>
             <a:fld id="{8E6E6A2A-E9D3-4A0D-B04A-ABDD367A1E08}" type="datetimeFigureOut">
               <a:rPr lang="ru-RU" smtClean="0"/>
-              <a:t>06.11.2012</a:t>
+              <a:t>22.02.2013</a:t>
             </a:fld>
             <a:endParaRPr lang="ru-RU"/>
           </a:p>
@@ -2277,7 +2278,7 @@
           <a:p>
             <a:fld id="{8E6E6A2A-E9D3-4A0D-B04A-ABDD367A1E08}" type="datetimeFigureOut">
               <a:rPr lang="ru-RU" smtClean="0"/>
-              <a:t>06.11.2012</a:t>
+              <a:t>22.02.2013</a:t>
             </a:fld>
             <a:endParaRPr lang="ru-RU"/>
           </a:p>
@@ -2530,7 +2531,7 @@
           <a:p>
             <a:fld id="{8E6E6A2A-E9D3-4A0D-B04A-ABDD367A1E08}" type="datetimeFigureOut">
               <a:rPr lang="ru-RU" smtClean="0"/>
-              <a:t>06.11.2012</a:t>
+              <a:t>22.02.2013</a:t>
             </a:fld>
             <a:endParaRPr lang="ru-RU"/>
           </a:p>
@@ -2743,7 +2744,7 @@
           <a:p>
             <a:fld id="{8E6E6A2A-E9D3-4A0D-B04A-ABDD367A1E08}" type="datetimeFigureOut">
               <a:rPr lang="ru-RU" smtClean="0"/>
-              <a:t>06.11.2012</a:t>
+              <a:t>22.02.2013</a:t>
             </a:fld>
             <a:endParaRPr lang="ru-RU"/>
           </a:p>
@@ -15814,13 +15815,40 @@
               </a:tabLst>
             </a:pPr>
             <a:r>
-              <a:rPr lang="ru-RU" sz="2400" b="1" dirty="0">
+              <a:rPr lang="ru-RU" sz="2400" b="1" dirty="0" smtClean="0">
                 <a:solidFill>
                   <a:schemeClr val="bg1"/>
                 </a:solidFill>
                 <a:cs typeface="Times New Roman" pitchFamily="18" charset="0"/>
               </a:rPr>
               <a:t>Коллекции</a:t>
+            </a:r>
+            <a:r>
+              <a:rPr lang="en-US" sz="2400" b="1" dirty="0" smtClean="0">
+                <a:solidFill>
+                  <a:schemeClr val="bg1"/>
+                </a:solidFill>
+                <a:cs typeface="Times New Roman" pitchFamily="18" charset="0"/>
+              </a:rPr>
+              <a:t> – </a:t>
+            </a:r>
+            <a:r>
+              <a:rPr lang="en-US" sz="2400" b="1" dirty="0" err="1" smtClean="0">
+                <a:solidFill>
+                  <a:schemeClr val="bg1"/>
+                </a:solidFill>
+                <a:cs typeface="Times New Roman" pitchFamily="18" charset="0"/>
+              </a:rPr>
+              <a:t>System.Collection</a:t>
+            </a:r>
+            <a:r>
+              <a:rPr lang="en-US" sz="2400" b="1" dirty="0" err="1" smtClean="0">
+                <a:solidFill>
+                  <a:schemeClr val="bg1"/>
+                </a:solidFill>
+                <a:cs typeface="Times New Roman" pitchFamily="18" charset="0"/>
+              </a:rPr>
+              <a:t>s.Generic</a:t>
             </a:r>
             <a:endParaRPr lang="en-US" sz="1200" dirty="0">
               <a:solidFill>
@@ -15831,1167 +15859,470 @@
           </a:p>
         </p:txBody>
       </p:sp>
+      <p:graphicFrame>
+        <p:nvGraphicFramePr>
+          <p:cNvPr id="2" name="Table 1"/>
+          <p:cNvGraphicFramePr>
+            <a:graphicFrameLocks noGrp="1"/>
+          </p:cNvGraphicFramePr>
+          <p:nvPr>
+            <p:extLst>
+              <p:ext uri="{D42A27DB-BD31-4B8C-83A1-F6EECF244321}">
+                <p14:modId xmlns:p14="http://schemas.microsoft.com/office/powerpoint/2010/main" val="1635990916"/>
+              </p:ext>
+            </p:extLst>
+          </p:nvPr>
+        </p:nvGraphicFramePr>
+        <p:xfrm>
+          <a:off x="460276" y="836712"/>
+          <a:ext cx="8223448" cy="4150360"/>
+        </p:xfrm>
+        <a:graphic>
+          <a:graphicData uri="http://schemas.openxmlformats.org/drawingml/2006/table">
+            <a:tbl>
+              <a:tblPr firstRow="1" bandRow="1">
+                <a:tableStyleId>{5C22544A-7EE6-4342-B048-85BDC9FD1C3A}</a:tableStyleId>
+              </a:tblPr>
+              <a:tblGrid>
+                <a:gridCol w="3247628"/>
+                <a:gridCol w="4975820"/>
+              </a:tblGrid>
+              <a:tr h="370840">
+                <a:tc>
+                  <a:txBody>
+                    <a:bodyPr/>
+                    <a:lstStyle/>
+                    <a:p>
+                      <a:pPr algn="l"/>
+                      <a:r>
+                        <a:rPr lang="ru-RU" dirty="0" smtClean="0"/>
+                        <a:t>Класс</a:t>
+                      </a:r>
+                      <a:endParaRPr lang="en-US" dirty="0"/>
+                    </a:p>
+                  </a:txBody>
+                  <a:tcPr/>
+                </a:tc>
+                <a:tc>
+                  <a:txBody>
+                    <a:bodyPr/>
+                    <a:lstStyle/>
+                    <a:p>
+                      <a:pPr algn="l"/>
+                      <a:r>
+                        <a:rPr lang="ru-RU" dirty="0" smtClean="0"/>
+                        <a:t>Описание</a:t>
+                      </a:r>
+                      <a:endParaRPr lang="en-US" dirty="0"/>
+                    </a:p>
+                  </a:txBody>
+                  <a:tcPr/>
+                </a:tc>
+              </a:tr>
+              <a:tr h="370840">
+                <a:tc>
+                  <a:txBody>
+                    <a:bodyPr/>
+                    <a:lstStyle/>
+                    <a:p>
+                      <a:pPr algn="l"/>
+                      <a:r>
+                        <a:rPr lang="en-US" dirty="0" smtClean="0"/>
+                        <a:t>List&lt;T&gt;</a:t>
+                      </a:r>
+                      <a:endParaRPr lang="en-US" dirty="0"/>
+                    </a:p>
+                  </a:txBody>
+                  <a:tcPr/>
+                </a:tc>
+                <a:tc>
+                  <a:txBody>
+                    <a:bodyPr/>
+                    <a:lstStyle/>
+                    <a:p>
+                      <a:pPr algn="l"/>
+                      <a:r>
+                        <a:rPr lang="ru-RU" dirty="0" smtClean="0"/>
+                        <a:t>Список</a:t>
+                      </a:r>
+                      <a:r>
+                        <a:rPr lang="ru-RU" baseline="0" dirty="0" smtClean="0"/>
+                        <a:t> с доступом по индексу.</a:t>
+                      </a:r>
+                      <a:endParaRPr lang="en-US" dirty="0"/>
+                    </a:p>
+                  </a:txBody>
+                  <a:tcPr/>
+                </a:tc>
+              </a:tr>
+              <a:tr h="370840">
+                <a:tc>
+                  <a:txBody>
+                    <a:bodyPr/>
+                    <a:lstStyle/>
+                    <a:p>
+                      <a:pPr algn="l"/>
+                      <a:r>
+                        <a:rPr lang="en-US" dirty="0" smtClean="0"/>
+                        <a:t>Queue&lt;T&gt;</a:t>
+                      </a:r>
+                      <a:endParaRPr lang="en-US" dirty="0"/>
+                    </a:p>
+                  </a:txBody>
+                  <a:tcPr/>
+                </a:tc>
+                <a:tc>
+                  <a:txBody>
+                    <a:bodyPr/>
+                    <a:lstStyle/>
+                    <a:p>
+                      <a:pPr algn="l"/>
+                      <a:r>
+                        <a:rPr lang="ru-RU" dirty="0" smtClean="0"/>
+                        <a:t>Очередь</a:t>
+                      </a:r>
+                      <a:endParaRPr lang="en-US" dirty="0"/>
+                    </a:p>
+                  </a:txBody>
+                  <a:tcPr/>
+                </a:tc>
+              </a:tr>
+              <a:tr h="370840">
+                <a:tc>
+                  <a:txBody>
+                    <a:bodyPr/>
+                    <a:lstStyle/>
+                    <a:p>
+                      <a:pPr algn="l"/>
+                      <a:r>
+                        <a:rPr lang="en-US" dirty="0" smtClean="0"/>
+                        <a:t>Dictionary&lt;</a:t>
+                      </a:r>
+                      <a:r>
+                        <a:rPr lang="en-US" dirty="0" err="1" smtClean="0"/>
+                        <a:t>TKey</a:t>
+                      </a:r>
+                      <a:r>
+                        <a:rPr lang="en-US" dirty="0" smtClean="0"/>
+                        <a:t>, </a:t>
+                      </a:r>
+                      <a:r>
+                        <a:rPr lang="en-US" dirty="0" err="1" smtClean="0"/>
+                        <a:t>TValue</a:t>
+                      </a:r>
+                      <a:r>
+                        <a:rPr lang="en-US" dirty="0" smtClean="0"/>
+                        <a:t>&gt;</a:t>
+                      </a:r>
+                      <a:endParaRPr lang="en-US" dirty="0"/>
+                    </a:p>
+                  </a:txBody>
+                  <a:tcPr/>
+                </a:tc>
+                <a:tc>
+                  <a:txBody>
+                    <a:bodyPr/>
+                    <a:lstStyle/>
+                    <a:p>
+                      <a:pPr algn="l"/>
+                      <a:r>
+                        <a:rPr lang="ru-RU" dirty="0" smtClean="0"/>
+                        <a:t>Коллекция элементов с доступом</a:t>
+                      </a:r>
+                      <a:r>
+                        <a:rPr lang="ru-RU" baseline="0" dirty="0" smtClean="0"/>
+                        <a:t> по ключу</a:t>
+                      </a:r>
+                      <a:endParaRPr lang="en-US" dirty="0"/>
+                    </a:p>
+                  </a:txBody>
+                  <a:tcPr/>
+                </a:tc>
+              </a:tr>
+              <a:tr h="370840">
+                <a:tc>
+                  <a:txBody>
+                    <a:bodyPr/>
+                    <a:lstStyle/>
+                    <a:p>
+                      <a:pPr algn="l"/>
+                      <a:r>
+                        <a:rPr lang="en-US" dirty="0" err="1" smtClean="0"/>
+                        <a:t>HashSet</a:t>
+                      </a:r>
+                      <a:r>
+                        <a:rPr lang="en-US" dirty="0" smtClean="0"/>
+                        <a:t>&lt;T&gt;</a:t>
+                      </a:r>
+                      <a:endParaRPr lang="en-US" dirty="0"/>
+                    </a:p>
+                  </a:txBody>
+                  <a:tcPr/>
+                </a:tc>
+                <a:tc>
+                  <a:txBody>
+                    <a:bodyPr/>
+                    <a:lstStyle/>
+                    <a:p>
+                      <a:pPr algn="l"/>
+                      <a:r>
+                        <a:rPr lang="ru-RU" dirty="0" smtClean="0"/>
+                        <a:t>Множество элементов. Каждый элемент является уникальным.</a:t>
+                      </a:r>
+                      <a:r>
+                        <a:rPr lang="ru-RU" baseline="0" dirty="0" smtClean="0"/>
+                        <a:t> Порядок элементов не определен.</a:t>
+                      </a:r>
+                      <a:endParaRPr lang="en-US" dirty="0"/>
+                    </a:p>
+                  </a:txBody>
+                  <a:tcPr/>
+                </a:tc>
+              </a:tr>
+              <a:tr h="370840">
+                <a:tc>
+                  <a:txBody>
+                    <a:bodyPr/>
+                    <a:lstStyle/>
+                    <a:p>
+                      <a:pPr algn="l"/>
+                      <a:r>
+                        <a:rPr lang="en-US" dirty="0" err="1" smtClean="0"/>
+                        <a:t>LinkedList</a:t>
+                      </a:r>
+                      <a:r>
+                        <a:rPr lang="en-US" dirty="0" smtClean="0"/>
+                        <a:t>&lt;T&gt;</a:t>
+                      </a:r>
+                      <a:endParaRPr lang="en-US" dirty="0"/>
+                    </a:p>
+                  </a:txBody>
+                  <a:tcPr/>
+                </a:tc>
+                <a:tc>
+                  <a:txBody>
+                    <a:bodyPr/>
+                    <a:lstStyle/>
+                    <a:p>
+                      <a:pPr algn="l"/>
+                      <a:r>
+                        <a:rPr lang="ru-RU" dirty="0" smtClean="0"/>
+                        <a:t>Связанный список.</a:t>
+                      </a:r>
+                      <a:endParaRPr lang="en-US" dirty="0"/>
+                    </a:p>
+                  </a:txBody>
+                  <a:tcPr/>
+                </a:tc>
+              </a:tr>
+              <a:tr h="370840">
+                <a:tc>
+                  <a:txBody>
+                    <a:bodyPr/>
+                    <a:lstStyle/>
+                    <a:p>
+                      <a:pPr algn="l"/>
+                      <a:r>
+                        <a:rPr lang="en-US" dirty="0" smtClean="0"/>
+                        <a:t>Stack&lt;T&gt;</a:t>
+                      </a:r>
+                      <a:endParaRPr lang="en-US" dirty="0"/>
+                    </a:p>
+                  </a:txBody>
+                  <a:tcPr/>
+                </a:tc>
+                <a:tc>
+                  <a:txBody>
+                    <a:bodyPr/>
+                    <a:lstStyle/>
+                    <a:p>
+                      <a:pPr algn="l"/>
+                      <a:r>
+                        <a:rPr lang="ru-RU" dirty="0" smtClean="0"/>
+                        <a:t>Стек</a:t>
+                      </a:r>
+                      <a:endParaRPr lang="en-US" dirty="0"/>
+                    </a:p>
+                  </a:txBody>
+                  <a:tcPr/>
+                </a:tc>
+              </a:tr>
+              <a:tr h="370840">
+                <a:tc>
+                  <a:txBody>
+                    <a:bodyPr/>
+                    <a:lstStyle/>
+                    <a:p>
+                      <a:pPr algn="l"/>
+                      <a:r>
+                        <a:rPr lang="en-US" dirty="0" err="1" smtClean="0"/>
+                        <a:t>SortedDictionary</a:t>
+                      </a:r>
+                      <a:r>
+                        <a:rPr lang="en-US" dirty="0" smtClean="0"/>
+                        <a:t>&lt;</a:t>
+                      </a:r>
+                      <a:r>
+                        <a:rPr lang="en-US" dirty="0" err="1" smtClean="0"/>
+                        <a:t>TKey</a:t>
+                      </a:r>
+                      <a:r>
+                        <a:rPr lang="en-US" dirty="0" smtClean="0"/>
+                        <a:t>, </a:t>
+                      </a:r>
+                      <a:r>
+                        <a:rPr lang="en-US" dirty="0" err="1" smtClean="0"/>
+                        <a:t>TValue</a:t>
+                      </a:r>
+                      <a:r>
+                        <a:rPr lang="en-US" dirty="0" smtClean="0"/>
+                        <a:t>&gt;</a:t>
+                      </a:r>
+                    </a:p>
+                  </a:txBody>
+                  <a:tcPr/>
+                </a:tc>
+                <a:tc>
+                  <a:txBody>
+                    <a:bodyPr/>
+                    <a:lstStyle/>
+                    <a:p>
+                      <a:pPr algn="l"/>
+                      <a:r>
+                        <a:rPr lang="ru-RU" dirty="0" smtClean="0"/>
+                        <a:t>Коллекция элементов с доступом</a:t>
+                      </a:r>
+                      <a:r>
+                        <a:rPr lang="ru-RU" baseline="0" dirty="0" smtClean="0"/>
+                        <a:t> по ключу</a:t>
+                      </a:r>
+                      <a:r>
+                        <a:rPr lang="en-US" baseline="0" dirty="0" smtClean="0"/>
+                        <a:t>. </a:t>
+                      </a:r>
+                      <a:r>
+                        <a:rPr lang="ru-RU" baseline="0" dirty="0" smtClean="0"/>
+                        <a:t>Элементы сортируются по значения ключа.</a:t>
+                      </a:r>
+                      <a:endParaRPr lang="en-US" dirty="0"/>
+                    </a:p>
+                  </a:txBody>
+                  <a:tcPr/>
+                </a:tc>
+              </a:tr>
+              <a:tr h="370840">
+                <a:tc>
+                  <a:txBody>
+                    <a:bodyPr/>
+                    <a:lstStyle/>
+                    <a:p>
+                      <a:pPr algn="l"/>
+                      <a:r>
+                        <a:rPr lang="en-US" dirty="0" err="1" smtClean="0"/>
+                        <a:t>SortedSet</a:t>
+                      </a:r>
+                      <a:r>
+                        <a:rPr lang="en-US" dirty="0" smtClean="0"/>
+                        <a:t>&lt;T&gt;</a:t>
+                      </a:r>
+                    </a:p>
+                  </a:txBody>
+                  <a:tcPr/>
+                </a:tc>
+                <a:tc>
+                  <a:txBody>
+                    <a:bodyPr/>
+                    <a:lstStyle/>
+                    <a:p>
+                      <a:pPr algn="l"/>
+                      <a:r>
+                        <a:rPr lang="ru-RU" dirty="0" smtClean="0"/>
+                        <a:t>Сортированное множество.</a:t>
+                      </a:r>
+                      <a:endParaRPr lang="en-US" dirty="0"/>
+                    </a:p>
+                  </a:txBody>
+                  <a:tcPr/>
+                </a:tc>
+              </a:tr>
+            </a:tbl>
+          </a:graphicData>
+        </a:graphic>
+      </p:graphicFrame>
       <p:sp>
         <p:nvSpPr>
-          <p:cNvPr id="32769" name="Rectangle 1"/>
-          <p:cNvSpPr>
-            <a:spLocks noChangeArrowheads="1"/>
-          </p:cNvSpPr>
+          <p:cNvPr id="4" name="TextBox 3"/>
+          <p:cNvSpPr txBox="1"/>
           <p:nvPr/>
         </p:nvSpPr>
-        <p:spPr bwMode="auto">
+        <p:spPr>
           <a:xfrm>
-            <a:off x="152400" y="381000"/>
-            <a:ext cx="8839200" cy="6402388"/>
+            <a:off x="467544" y="5879013"/>
+            <a:ext cx="8219256" cy="646331"/>
           </a:xfrm>
           <a:prstGeom prst="rect">
             <a:avLst/>
           </a:prstGeom>
           <a:noFill/>
-          <a:ln w="9525">
-            <a:solidFill>
-              <a:schemeClr val="bg1">
-                <a:lumMod val="65000"/>
-              </a:schemeClr>
-            </a:solidFill>
-            <a:miter lim="800000"/>
-            <a:headEnd/>
-            <a:tailEnd/>
-          </a:ln>
-          <a:effectLst/>
         </p:spPr>
         <p:txBody>
-          <a:bodyPr anchor="ctr">
+          <a:bodyPr wrap="square" rtlCol="0">
             <a:spAutoFit/>
           </a:bodyPr>
           <a:lstStyle/>
           <a:p>
-            <a:pPr eaLnBrk="0" hangingPunct="0">
-              <a:defRPr/>
-            </a:pPr>
-            <a:r>
-              <a:rPr lang="be-BY" sz="1000" dirty="0">
-                <a:solidFill>
-                  <a:schemeClr val="bg1"/>
-                </a:solidFill>
-                <a:latin typeface="Courier New" pitchFamily="49" charset="0"/>
-                <a:ea typeface="Calibri" pitchFamily="34" charset="0"/>
-                <a:cs typeface="Courier New" pitchFamily="49" charset="0"/>
-              </a:rPr>
-              <a:t>using System.Collections;		//</a:t>
-            </a:r>
-            <a:r>
-              <a:rPr lang="ru-RU" sz="1000" dirty="0">
-                <a:solidFill>
-                  <a:schemeClr val="bg1"/>
-                </a:solidFill>
-                <a:latin typeface="Courier New" pitchFamily="49" charset="0"/>
-                <a:ea typeface="Calibri" pitchFamily="34" charset="0"/>
-                <a:cs typeface="Courier New" pitchFamily="49" charset="0"/>
-              </a:rPr>
-              <a:t>Обязательно использование пространства имен</a:t>
-            </a:r>
-            <a:endParaRPr lang="be-BY" sz="1000" dirty="0">
-              <a:solidFill>
-                <a:schemeClr val="bg1"/>
-              </a:solidFill>
-              <a:latin typeface="Courier New" pitchFamily="49" charset="0"/>
-              <a:ea typeface="Calibri" pitchFamily="34" charset="0"/>
-              <a:cs typeface="Courier New" pitchFamily="49" charset="0"/>
-            </a:endParaRPr>
-          </a:p>
-          <a:p>
-            <a:pPr eaLnBrk="0" hangingPunct="0">
-              <a:defRPr/>
-            </a:pPr>
-            <a:endParaRPr lang="be-BY" sz="1000" dirty="0">
-              <a:solidFill>
-                <a:schemeClr val="bg1"/>
-              </a:solidFill>
-              <a:ea typeface="Calibri" pitchFamily="34" charset="0"/>
-              <a:cs typeface="Courier New" pitchFamily="49" charset="0"/>
-            </a:endParaRPr>
-          </a:p>
-          <a:p>
-            <a:pPr eaLnBrk="0" hangingPunct="0">
-              <a:defRPr/>
-            </a:pPr>
-            <a:r>
-              <a:rPr lang="be-BY" sz="1000" dirty="0">
-                <a:solidFill>
-                  <a:schemeClr val="bg1"/>
-                </a:solidFill>
-                <a:latin typeface="Courier New" pitchFamily="49" charset="0"/>
-                <a:ea typeface="Calibri" pitchFamily="34" charset="0"/>
-                <a:cs typeface="Courier New" pitchFamily="49" charset="0"/>
-              </a:rPr>
-              <a:t>    class Program</a:t>
-            </a:r>
-            <a:endParaRPr lang="be-BY" sz="1000" dirty="0">
-              <a:solidFill>
-                <a:schemeClr val="bg1"/>
-              </a:solidFill>
-              <a:ea typeface="Calibri" pitchFamily="34" charset="0"/>
-              <a:cs typeface="Courier New" pitchFamily="49" charset="0"/>
-            </a:endParaRPr>
-          </a:p>
-          <a:p>
-            <a:pPr eaLnBrk="0" hangingPunct="0">
-              <a:defRPr/>
-            </a:pPr>
-            <a:r>
-              <a:rPr lang="be-BY" sz="1000" dirty="0">
-                <a:solidFill>
-                  <a:schemeClr val="bg1"/>
-                </a:solidFill>
-                <a:latin typeface="Courier New" pitchFamily="49" charset="0"/>
-                <a:ea typeface="Calibri" pitchFamily="34" charset="0"/>
-                <a:cs typeface="Courier New" pitchFamily="49" charset="0"/>
-              </a:rPr>
-              <a:t>    {</a:t>
-            </a:r>
-            <a:endParaRPr lang="be-BY" sz="1000" dirty="0">
-              <a:solidFill>
-                <a:schemeClr val="bg1"/>
-              </a:solidFill>
-              <a:ea typeface="Calibri" pitchFamily="34" charset="0"/>
-              <a:cs typeface="Courier New" pitchFamily="49" charset="0"/>
-            </a:endParaRPr>
-          </a:p>
-          <a:p>
-            <a:pPr eaLnBrk="0" hangingPunct="0">
-              <a:defRPr/>
-            </a:pPr>
-            <a:r>
-              <a:rPr lang="be-BY" sz="1000" dirty="0">
-                <a:solidFill>
-                  <a:schemeClr val="bg1"/>
-                </a:solidFill>
-                <a:latin typeface="Courier New" pitchFamily="49" charset="0"/>
-                <a:ea typeface="Calibri" pitchFamily="34" charset="0"/>
-                <a:cs typeface="Courier New" pitchFamily="49" charset="0"/>
-              </a:rPr>
-              <a:t>        static void Main(string[] args)</a:t>
-            </a:r>
-            <a:endParaRPr lang="be-BY" sz="1000" dirty="0">
-              <a:solidFill>
-                <a:schemeClr val="bg1"/>
-              </a:solidFill>
-              <a:ea typeface="Calibri" pitchFamily="34" charset="0"/>
-              <a:cs typeface="Courier New" pitchFamily="49" charset="0"/>
-            </a:endParaRPr>
-          </a:p>
-          <a:p>
-            <a:pPr eaLnBrk="0" hangingPunct="0">
-              <a:defRPr/>
-            </a:pPr>
-            <a:r>
-              <a:rPr lang="be-BY" sz="1000" dirty="0">
-                <a:solidFill>
-                  <a:schemeClr val="bg1"/>
-                </a:solidFill>
-                <a:latin typeface="Courier New" pitchFamily="49" charset="0"/>
-                <a:ea typeface="Calibri" pitchFamily="34" charset="0"/>
-                <a:cs typeface="Courier New" pitchFamily="49" charset="0"/>
-              </a:rPr>
-              <a:t>        {</a:t>
-            </a:r>
-            <a:endParaRPr lang="be-BY" sz="1000" dirty="0">
-              <a:solidFill>
-                <a:schemeClr val="bg1"/>
-              </a:solidFill>
-              <a:ea typeface="Calibri" pitchFamily="34" charset="0"/>
-              <a:cs typeface="Courier New" pitchFamily="49" charset="0"/>
-            </a:endParaRPr>
-          </a:p>
-          <a:p>
-            <a:pPr eaLnBrk="0" hangingPunct="0">
-              <a:defRPr/>
-            </a:pPr>
-            <a:r>
-              <a:rPr lang="be-BY" sz="1000" dirty="0">
-                <a:solidFill>
-                  <a:schemeClr val="bg1"/>
-                </a:solidFill>
-                <a:latin typeface="Courier New" pitchFamily="49" charset="0"/>
-                <a:ea typeface="Calibri" pitchFamily="34" charset="0"/>
-                <a:cs typeface="Courier New" pitchFamily="49" charset="0"/>
-              </a:rPr>
-              <a:t>            Console.WriteLine("Array List : ");	//Безразмерный масив. В него можно помещать любой объект.</a:t>
-            </a:r>
-            <a:endParaRPr lang="be-BY" sz="1000" dirty="0">
-              <a:solidFill>
-                <a:schemeClr val="bg1"/>
-              </a:solidFill>
-              <a:ea typeface="Calibri" pitchFamily="34" charset="0"/>
-              <a:cs typeface="Courier New" pitchFamily="49" charset="0"/>
-            </a:endParaRPr>
-          </a:p>
-          <a:p>
-            <a:pPr eaLnBrk="0" hangingPunct="0">
-              <a:defRPr/>
-            </a:pPr>
-            <a:r>
-              <a:rPr lang="be-BY" sz="1000" dirty="0">
-                <a:solidFill>
-                  <a:schemeClr val="bg1"/>
-                </a:solidFill>
-                <a:latin typeface="Courier New" pitchFamily="49" charset="0"/>
-                <a:ea typeface="Calibri" pitchFamily="34" charset="0"/>
-                <a:cs typeface="Courier New" pitchFamily="49" charset="0"/>
-              </a:rPr>
-              <a:t>            ArrayList arrayList = new ArrayList();</a:t>
-            </a:r>
-            <a:endParaRPr lang="be-BY" sz="1000" dirty="0">
-              <a:solidFill>
-                <a:schemeClr val="bg1"/>
-              </a:solidFill>
-              <a:ea typeface="Calibri" pitchFamily="34" charset="0"/>
-              <a:cs typeface="Courier New" pitchFamily="49" charset="0"/>
-            </a:endParaRPr>
-          </a:p>
-          <a:p>
-            <a:pPr eaLnBrk="0" hangingPunct="0">
-              <a:defRPr/>
-            </a:pPr>
-            <a:r>
-              <a:rPr lang="be-BY" sz="1000" dirty="0">
-                <a:solidFill>
-                  <a:schemeClr val="bg1"/>
-                </a:solidFill>
-                <a:latin typeface="Courier New" pitchFamily="49" charset="0"/>
-                <a:ea typeface="Calibri" pitchFamily="34" charset="0"/>
-                <a:cs typeface="Courier New" pitchFamily="49" charset="0"/>
-              </a:rPr>
-              <a:t>            arrayList.Add(30.5);</a:t>
-            </a:r>
-            <a:endParaRPr lang="be-BY" sz="1000" dirty="0">
-              <a:solidFill>
-                <a:schemeClr val="bg1"/>
-              </a:solidFill>
-              <a:ea typeface="Calibri" pitchFamily="34" charset="0"/>
-              <a:cs typeface="Courier New" pitchFamily="49" charset="0"/>
-            </a:endParaRPr>
-          </a:p>
-          <a:p>
-            <a:pPr eaLnBrk="0" hangingPunct="0">
-              <a:defRPr/>
-            </a:pPr>
-            <a:r>
-              <a:rPr lang="be-BY" sz="1000" dirty="0">
-                <a:solidFill>
-                  <a:schemeClr val="bg1"/>
-                </a:solidFill>
-                <a:latin typeface="Courier New" pitchFamily="49" charset="0"/>
-                <a:ea typeface="Calibri" pitchFamily="34" charset="0"/>
-                <a:cs typeface="Courier New" pitchFamily="49" charset="0"/>
-              </a:rPr>
-              <a:t>            arrayList.Add(23.6);</a:t>
-            </a:r>
-            <a:endParaRPr lang="be-BY" sz="1000" dirty="0">
-              <a:solidFill>
-                <a:schemeClr val="bg1"/>
-              </a:solidFill>
-              <a:ea typeface="Calibri" pitchFamily="34" charset="0"/>
-              <a:cs typeface="Courier New" pitchFamily="49" charset="0"/>
-            </a:endParaRPr>
-          </a:p>
-          <a:p>
-            <a:pPr eaLnBrk="0" hangingPunct="0">
-              <a:defRPr/>
-            </a:pPr>
-            <a:r>
-              <a:rPr lang="be-BY" sz="1000" dirty="0">
-                <a:solidFill>
-                  <a:schemeClr val="bg1"/>
-                </a:solidFill>
-                <a:latin typeface="Courier New" pitchFamily="49" charset="0"/>
-                <a:ea typeface="Calibri" pitchFamily="34" charset="0"/>
-                <a:cs typeface="Courier New" pitchFamily="49" charset="0"/>
-              </a:rPr>
-              <a:t>            arrayList.Add(40);</a:t>
-            </a:r>
-            <a:endParaRPr lang="be-BY" sz="1000" dirty="0">
-              <a:solidFill>
-                <a:schemeClr val="bg1"/>
-              </a:solidFill>
-              <a:ea typeface="Calibri" pitchFamily="34" charset="0"/>
-              <a:cs typeface="Courier New" pitchFamily="49" charset="0"/>
-            </a:endParaRPr>
-          </a:p>
-          <a:p>
-            <a:pPr eaLnBrk="0" hangingPunct="0">
-              <a:defRPr/>
-            </a:pPr>
-            <a:r>
-              <a:rPr lang="be-BY" sz="1000" dirty="0">
-                <a:solidFill>
-                  <a:schemeClr val="bg1"/>
-                </a:solidFill>
-                <a:latin typeface="Courier New" pitchFamily="49" charset="0"/>
-                <a:ea typeface="Calibri" pitchFamily="34" charset="0"/>
-                <a:cs typeface="Courier New" pitchFamily="49" charset="0"/>
-              </a:rPr>
-              <a:t>            foreach (object val in arrayList)</a:t>
-            </a:r>
-            <a:endParaRPr lang="be-BY" sz="1000" dirty="0">
-              <a:solidFill>
-                <a:schemeClr val="bg1"/>
-              </a:solidFill>
-              <a:ea typeface="Calibri" pitchFamily="34" charset="0"/>
-              <a:cs typeface="Courier New" pitchFamily="49" charset="0"/>
-            </a:endParaRPr>
-          </a:p>
-          <a:p>
-            <a:pPr eaLnBrk="0" hangingPunct="0">
-              <a:defRPr/>
-            </a:pPr>
-            <a:r>
-              <a:rPr lang="be-BY" sz="1000" dirty="0">
-                <a:solidFill>
-                  <a:schemeClr val="bg1"/>
-                </a:solidFill>
-                <a:latin typeface="Courier New" pitchFamily="49" charset="0"/>
-                <a:ea typeface="Calibri" pitchFamily="34" charset="0"/>
-                <a:cs typeface="Courier New" pitchFamily="49" charset="0"/>
-              </a:rPr>
-              <a:t>                Console.WriteLine(val);</a:t>
-            </a:r>
-          </a:p>
-          <a:p>
-            <a:pPr eaLnBrk="0" hangingPunct="0">
-              <a:defRPr/>
-            </a:pPr>
-            <a:endParaRPr lang="be-BY" sz="1000" dirty="0">
-              <a:solidFill>
-                <a:schemeClr val="bg1"/>
-              </a:solidFill>
-              <a:ea typeface="Calibri" pitchFamily="34" charset="0"/>
-              <a:cs typeface="Courier New" pitchFamily="49" charset="0"/>
-            </a:endParaRPr>
-          </a:p>
-          <a:p>
-            <a:pPr eaLnBrk="0" hangingPunct="0">
-              <a:defRPr/>
-            </a:pPr>
-            <a:r>
-              <a:rPr lang="be-BY" sz="1000" dirty="0">
-                <a:solidFill>
-                  <a:schemeClr val="bg1"/>
-                </a:solidFill>
-                <a:latin typeface="Courier New" pitchFamily="49" charset="0"/>
-                <a:ea typeface="Calibri" pitchFamily="34" charset="0"/>
-                <a:cs typeface="Courier New" pitchFamily="49" charset="0"/>
-              </a:rPr>
-              <a:t>            Console.WriteLine("\nQueue : "); 	//Очередь – работает по принципу </a:t>
-            </a:r>
-            <a:r>
-              <a:rPr lang="en-US" sz="1000" dirty="0">
-                <a:solidFill>
-                  <a:schemeClr val="bg1"/>
-                </a:solidFill>
-                <a:latin typeface="Courier New" pitchFamily="49" charset="0"/>
-                <a:ea typeface="Calibri" pitchFamily="34" charset="0"/>
-                <a:cs typeface="Courier New" pitchFamily="49" charset="0"/>
-              </a:rPr>
-              <a:t>FILO ( first input last output )</a:t>
-            </a:r>
-            <a:endParaRPr lang="be-BY" sz="1000" dirty="0">
-              <a:solidFill>
-                <a:schemeClr val="bg1"/>
-              </a:solidFill>
-              <a:ea typeface="Calibri" pitchFamily="34" charset="0"/>
-              <a:cs typeface="Courier New" pitchFamily="49" charset="0"/>
-            </a:endParaRPr>
-          </a:p>
-          <a:p>
-            <a:pPr eaLnBrk="0" hangingPunct="0">
-              <a:defRPr/>
-            </a:pPr>
-            <a:r>
-              <a:rPr lang="be-BY" sz="1000" dirty="0">
-                <a:solidFill>
-                  <a:schemeClr val="bg1"/>
-                </a:solidFill>
-                <a:latin typeface="Courier New" pitchFamily="49" charset="0"/>
-                <a:ea typeface="Calibri" pitchFamily="34" charset="0"/>
-                <a:cs typeface="Courier New" pitchFamily="49" charset="0"/>
-              </a:rPr>
-              <a:t>            Queue&lt;int&gt; queue = new Queue&lt;int&gt;();</a:t>
-            </a:r>
-            <a:endParaRPr lang="be-BY" sz="1000" dirty="0">
-              <a:solidFill>
-                <a:schemeClr val="bg1"/>
-              </a:solidFill>
-              <a:ea typeface="Calibri" pitchFamily="34" charset="0"/>
-              <a:cs typeface="Courier New" pitchFamily="49" charset="0"/>
-            </a:endParaRPr>
-          </a:p>
-          <a:p>
-            <a:pPr eaLnBrk="0" hangingPunct="0">
-              <a:defRPr/>
-            </a:pPr>
-            <a:r>
-              <a:rPr lang="be-BY" sz="1000" dirty="0">
-                <a:solidFill>
-                  <a:schemeClr val="bg1"/>
-                </a:solidFill>
-                <a:latin typeface="Courier New" pitchFamily="49" charset="0"/>
-                <a:ea typeface="Calibri" pitchFamily="34" charset="0"/>
-                <a:cs typeface="Courier New" pitchFamily="49" charset="0"/>
-              </a:rPr>
-              <a:t>            queue.Enqueue(1);</a:t>
-            </a:r>
-            <a:r>
-              <a:rPr lang="en-US" sz="1000" dirty="0">
-                <a:solidFill>
-                  <a:schemeClr val="bg1"/>
-                </a:solidFill>
-                <a:latin typeface="Courier New" pitchFamily="49" charset="0"/>
-                <a:ea typeface="Calibri" pitchFamily="34" charset="0"/>
-                <a:cs typeface="Courier New" pitchFamily="49" charset="0"/>
-              </a:rPr>
-              <a:t>                </a:t>
-            </a:r>
-            <a:r>
-              <a:rPr lang="ru-RU" sz="1000" dirty="0">
-                <a:solidFill>
-                  <a:schemeClr val="bg1"/>
-                </a:solidFill>
-                <a:latin typeface="Courier New" pitchFamily="49" charset="0"/>
-                <a:ea typeface="Calibri" pitchFamily="34" charset="0"/>
-                <a:cs typeface="Courier New" pitchFamily="49" charset="0"/>
-              </a:rPr>
-              <a:t>	//Помещаем в конец очереди</a:t>
-            </a:r>
-            <a:endParaRPr lang="be-BY" sz="1000" dirty="0">
-              <a:solidFill>
-                <a:schemeClr val="bg1"/>
-              </a:solidFill>
-              <a:ea typeface="Calibri" pitchFamily="34" charset="0"/>
-              <a:cs typeface="Courier New" pitchFamily="49" charset="0"/>
-            </a:endParaRPr>
-          </a:p>
-          <a:p>
-            <a:pPr eaLnBrk="0" hangingPunct="0">
-              <a:defRPr/>
-            </a:pPr>
-            <a:r>
-              <a:rPr lang="be-BY" sz="1000" dirty="0">
-                <a:solidFill>
-                  <a:schemeClr val="bg1"/>
-                </a:solidFill>
-                <a:latin typeface="Courier New" pitchFamily="49" charset="0"/>
-                <a:ea typeface="Calibri" pitchFamily="34" charset="0"/>
-                <a:cs typeface="Courier New" pitchFamily="49" charset="0"/>
-              </a:rPr>
-              <a:t>            queue.Enqueue(4);</a:t>
-            </a:r>
-            <a:endParaRPr lang="be-BY" sz="1000" dirty="0">
-              <a:solidFill>
-                <a:schemeClr val="bg1"/>
-              </a:solidFill>
-              <a:ea typeface="Calibri" pitchFamily="34" charset="0"/>
-              <a:cs typeface="Courier New" pitchFamily="49" charset="0"/>
-            </a:endParaRPr>
-          </a:p>
-          <a:p>
-            <a:pPr eaLnBrk="0" hangingPunct="0">
-              <a:defRPr/>
-            </a:pPr>
-            <a:r>
-              <a:rPr lang="be-BY" sz="1000" dirty="0">
-                <a:solidFill>
-                  <a:schemeClr val="bg1"/>
-                </a:solidFill>
-                <a:latin typeface="Courier New" pitchFamily="49" charset="0"/>
-                <a:ea typeface="Calibri" pitchFamily="34" charset="0"/>
-                <a:cs typeface="Courier New" pitchFamily="49" charset="0"/>
-              </a:rPr>
-              <a:t>            queue.Enqueue(6);</a:t>
-            </a:r>
-            <a:endParaRPr lang="be-BY" sz="1000" dirty="0">
-              <a:solidFill>
-                <a:schemeClr val="bg1"/>
-              </a:solidFill>
-              <a:ea typeface="Calibri" pitchFamily="34" charset="0"/>
-              <a:cs typeface="Courier New" pitchFamily="49" charset="0"/>
-            </a:endParaRPr>
-          </a:p>
-          <a:p>
-            <a:pPr eaLnBrk="0" hangingPunct="0">
-              <a:defRPr/>
-            </a:pPr>
-            <a:r>
-              <a:rPr lang="be-BY" sz="1000" dirty="0">
-                <a:solidFill>
-                  <a:schemeClr val="bg1"/>
-                </a:solidFill>
-                <a:latin typeface="Courier New" pitchFamily="49" charset="0"/>
-                <a:ea typeface="Calibri" pitchFamily="34" charset="0"/>
-                <a:cs typeface="Courier New" pitchFamily="49" charset="0"/>
-              </a:rPr>
-              <a:t>            </a:t>
-            </a:r>
-            <a:r>
-              <a:rPr lang="en-US" sz="1000" dirty="0">
-                <a:solidFill>
-                  <a:schemeClr val="bg1"/>
-                </a:solidFill>
-                <a:latin typeface="Courier New" pitchFamily="49" charset="0"/>
-                <a:ea typeface="Calibri" pitchFamily="34" charset="0"/>
-                <a:cs typeface="Courier New" pitchFamily="49" charset="0"/>
-              </a:rPr>
-              <a:t>while</a:t>
-            </a:r>
-            <a:r>
-              <a:rPr lang="be-BY" sz="1000" dirty="0">
-                <a:solidFill>
-                  <a:schemeClr val="bg1"/>
-                </a:solidFill>
-                <a:latin typeface="Courier New" pitchFamily="49" charset="0"/>
-                <a:ea typeface="Calibri" pitchFamily="34" charset="0"/>
-                <a:cs typeface="Courier New" pitchFamily="49" charset="0"/>
-              </a:rPr>
-              <a:t> (queue.</a:t>
-            </a:r>
-            <a:r>
-              <a:rPr lang="en-US" sz="1000" dirty="0">
-                <a:solidFill>
-                  <a:schemeClr val="bg1"/>
-                </a:solidFill>
-                <a:latin typeface="Courier New" pitchFamily="49" charset="0"/>
-                <a:ea typeface="Calibri" pitchFamily="34" charset="0"/>
-                <a:cs typeface="Courier New" pitchFamily="49" charset="0"/>
-              </a:rPr>
-              <a:t>Count &gt; 0</a:t>
-            </a:r>
-            <a:r>
-              <a:rPr lang="be-BY" sz="1000" dirty="0">
-                <a:solidFill>
-                  <a:schemeClr val="bg1"/>
-                </a:solidFill>
-                <a:latin typeface="Courier New" pitchFamily="49" charset="0"/>
-                <a:ea typeface="Calibri" pitchFamily="34" charset="0"/>
-                <a:cs typeface="Courier New" pitchFamily="49" charset="0"/>
-              </a:rPr>
-              <a:t>)</a:t>
-            </a:r>
-            <a:endParaRPr lang="be-BY" sz="1000" dirty="0">
-              <a:solidFill>
-                <a:schemeClr val="bg1"/>
-              </a:solidFill>
-              <a:ea typeface="Calibri" pitchFamily="34" charset="0"/>
-              <a:cs typeface="Courier New" pitchFamily="49" charset="0"/>
-            </a:endParaRPr>
-          </a:p>
-          <a:p>
-            <a:pPr eaLnBrk="0" hangingPunct="0">
-              <a:defRPr/>
-            </a:pPr>
-            <a:r>
-              <a:rPr lang="be-BY" sz="1000" dirty="0">
-                <a:solidFill>
-                  <a:schemeClr val="bg1"/>
-                </a:solidFill>
-                <a:latin typeface="Courier New" pitchFamily="49" charset="0"/>
-                <a:ea typeface="Calibri" pitchFamily="34" charset="0"/>
-                <a:cs typeface="Courier New" pitchFamily="49" charset="0"/>
-              </a:rPr>
-              <a:t>                Console.WriteLine(queue.Dequeue());	//Берем элементы из начала очереди</a:t>
-            </a:r>
-          </a:p>
-          <a:p>
-            <a:pPr eaLnBrk="0" hangingPunct="0">
-              <a:defRPr/>
-            </a:pPr>
-            <a:endParaRPr lang="be-BY" sz="1000" dirty="0">
-              <a:solidFill>
-                <a:schemeClr val="bg1"/>
-              </a:solidFill>
-              <a:ea typeface="Calibri" pitchFamily="34" charset="0"/>
-              <a:cs typeface="Courier New" pitchFamily="49" charset="0"/>
-            </a:endParaRPr>
-          </a:p>
-          <a:p>
-            <a:pPr eaLnBrk="0" hangingPunct="0">
-              <a:defRPr/>
-            </a:pPr>
-            <a:r>
-              <a:rPr lang="be-BY" sz="1000" dirty="0">
-                <a:solidFill>
-                  <a:schemeClr val="bg1"/>
-                </a:solidFill>
-                <a:latin typeface="Courier New" pitchFamily="49" charset="0"/>
-                <a:ea typeface="Calibri" pitchFamily="34" charset="0"/>
-                <a:cs typeface="Courier New" pitchFamily="49" charset="0"/>
-              </a:rPr>
-              <a:t>            Console.WriteLine("\nSorted List : ");</a:t>
-            </a:r>
-            <a:r>
-              <a:rPr lang="en-US" sz="1000" dirty="0">
-                <a:solidFill>
-                  <a:schemeClr val="bg1"/>
-                </a:solidFill>
-                <a:latin typeface="Courier New" pitchFamily="49" charset="0"/>
-                <a:ea typeface="Calibri" pitchFamily="34" charset="0"/>
-                <a:cs typeface="Courier New" pitchFamily="49" charset="0"/>
-              </a:rPr>
-              <a:t>	</a:t>
-            </a:r>
-            <a:r>
-              <a:rPr lang="ru-RU" sz="1000" dirty="0">
-                <a:solidFill>
-                  <a:schemeClr val="bg1"/>
-                </a:solidFill>
-                <a:latin typeface="Courier New" pitchFamily="49" charset="0"/>
-                <a:ea typeface="Calibri" pitchFamily="34" charset="0"/>
-                <a:cs typeface="Courier New" pitchFamily="49" charset="0"/>
-              </a:rPr>
-              <a:t> //Коллекция, работающая по принципу ключ-значение</a:t>
-            </a:r>
-            <a:endParaRPr lang="be-BY" sz="1000" dirty="0">
-              <a:solidFill>
-                <a:schemeClr val="bg1"/>
-              </a:solidFill>
-              <a:ea typeface="Calibri" pitchFamily="34" charset="0"/>
-              <a:cs typeface="Courier New" pitchFamily="49" charset="0"/>
-            </a:endParaRPr>
-          </a:p>
-          <a:p>
-            <a:pPr eaLnBrk="0" hangingPunct="0">
-              <a:defRPr/>
-            </a:pPr>
-            <a:r>
-              <a:rPr lang="be-BY" sz="1000" dirty="0">
-                <a:solidFill>
-                  <a:schemeClr val="bg1"/>
-                </a:solidFill>
-                <a:latin typeface="Courier New" pitchFamily="49" charset="0"/>
-                <a:ea typeface="Calibri" pitchFamily="34" charset="0"/>
-                <a:cs typeface="Courier New" pitchFamily="49" charset="0"/>
-              </a:rPr>
-              <a:t>            SortedList&lt;string, int&gt; sortList = new SortedList&lt;string, int&gt;();</a:t>
-            </a:r>
-            <a:endParaRPr lang="be-BY" sz="1000" dirty="0">
-              <a:solidFill>
-                <a:schemeClr val="bg1"/>
-              </a:solidFill>
-              <a:ea typeface="Calibri" pitchFamily="34" charset="0"/>
-              <a:cs typeface="Courier New" pitchFamily="49" charset="0"/>
-            </a:endParaRPr>
-          </a:p>
-          <a:p>
-            <a:pPr eaLnBrk="0" hangingPunct="0">
-              <a:defRPr/>
-            </a:pPr>
-            <a:r>
-              <a:rPr lang="be-BY" sz="1000" dirty="0">
-                <a:solidFill>
-                  <a:schemeClr val="bg1"/>
-                </a:solidFill>
-                <a:latin typeface="Courier New" pitchFamily="49" charset="0"/>
-                <a:ea typeface="Calibri" pitchFamily="34" charset="0"/>
-                <a:cs typeface="Courier New" pitchFamily="49" charset="0"/>
-              </a:rPr>
-              <a:t>            sortList["val1"] = 30;			</a:t>
-            </a:r>
-            <a:r>
-              <a:rPr lang="ru-RU" sz="1000" dirty="0">
-                <a:solidFill>
-                  <a:schemeClr val="bg1"/>
-                </a:solidFill>
-                <a:latin typeface="Courier New" pitchFamily="49" charset="0"/>
-                <a:ea typeface="Calibri" pitchFamily="34" charset="0"/>
-                <a:cs typeface="Courier New" pitchFamily="49" charset="0"/>
-              </a:rPr>
-              <a:t>//Помещаем значение 30 по ключу </a:t>
-            </a:r>
-            <a:r>
-              <a:rPr lang="en-US" sz="1000" dirty="0">
-                <a:solidFill>
-                  <a:schemeClr val="bg1"/>
-                </a:solidFill>
-                <a:latin typeface="Courier New" pitchFamily="49" charset="0"/>
-                <a:ea typeface="Calibri" pitchFamily="34" charset="0"/>
-                <a:cs typeface="Courier New" pitchFamily="49" charset="0"/>
-              </a:rPr>
-              <a:t>“val1”</a:t>
-            </a:r>
-            <a:endParaRPr lang="be-BY" sz="1000" dirty="0">
-              <a:solidFill>
-                <a:schemeClr val="bg1"/>
-              </a:solidFill>
-              <a:ea typeface="Calibri" pitchFamily="34" charset="0"/>
-              <a:cs typeface="Courier New" pitchFamily="49" charset="0"/>
-            </a:endParaRPr>
-          </a:p>
-          <a:p>
-            <a:pPr eaLnBrk="0" hangingPunct="0">
-              <a:defRPr/>
-            </a:pPr>
-            <a:r>
-              <a:rPr lang="be-BY" sz="1000" dirty="0">
-                <a:solidFill>
-                  <a:schemeClr val="bg1"/>
-                </a:solidFill>
-                <a:latin typeface="Courier New" pitchFamily="49" charset="0"/>
-                <a:ea typeface="Calibri" pitchFamily="34" charset="0"/>
-                <a:cs typeface="Courier New" pitchFamily="49" charset="0"/>
-              </a:rPr>
-              <a:t>            sortList["val2"] = 80;</a:t>
-            </a:r>
-            <a:endParaRPr lang="be-BY" sz="1000" dirty="0">
-              <a:solidFill>
-                <a:schemeClr val="bg1"/>
-              </a:solidFill>
-              <a:ea typeface="Calibri" pitchFamily="34" charset="0"/>
-              <a:cs typeface="Courier New" pitchFamily="49" charset="0"/>
-            </a:endParaRPr>
-          </a:p>
-          <a:p>
-            <a:pPr eaLnBrk="0" hangingPunct="0">
-              <a:defRPr/>
-            </a:pPr>
-            <a:r>
-              <a:rPr lang="be-BY" sz="1000" dirty="0">
-                <a:solidFill>
-                  <a:schemeClr val="bg1"/>
-                </a:solidFill>
-                <a:latin typeface="Courier New" pitchFamily="49" charset="0"/>
-                <a:ea typeface="Calibri" pitchFamily="34" charset="0"/>
-                <a:cs typeface="Courier New" pitchFamily="49" charset="0"/>
-              </a:rPr>
-              <a:t>            sortList["val3"] = 120;</a:t>
-            </a:r>
-            <a:endParaRPr lang="be-BY" sz="1000" dirty="0">
-              <a:solidFill>
-                <a:schemeClr val="bg1"/>
-              </a:solidFill>
-              <a:ea typeface="Calibri" pitchFamily="34" charset="0"/>
-              <a:cs typeface="Courier New" pitchFamily="49" charset="0"/>
-            </a:endParaRPr>
-          </a:p>
-          <a:p>
-            <a:pPr eaLnBrk="0" hangingPunct="0">
-              <a:defRPr/>
-            </a:pPr>
-            <a:r>
-              <a:rPr lang="be-BY" sz="1000" dirty="0">
-                <a:solidFill>
-                  <a:schemeClr val="bg1"/>
-                </a:solidFill>
-                <a:latin typeface="Courier New" pitchFamily="49" charset="0"/>
-                <a:ea typeface="Calibri" pitchFamily="34" charset="0"/>
-                <a:cs typeface="Courier New" pitchFamily="49" charset="0"/>
-              </a:rPr>
-              <a:t>            foreach (KeyValuePair&lt;string, int&gt; val in sortList)</a:t>
-            </a:r>
-            <a:r>
-              <a:rPr lang="en-US" sz="1000" dirty="0">
-                <a:solidFill>
-                  <a:schemeClr val="bg1"/>
-                </a:solidFill>
-                <a:latin typeface="Courier New" pitchFamily="49" charset="0"/>
-                <a:ea typeface="Calibri" pitchFamily="34" charset="0"/>
-                <a:cs typeface="Courier New" pitchFamily="49" charset="0"/>
-              </a:rPr>
-              <a:t> </a:t>
-            </a:r>
-            <a:r>
-              <a:rPr lang="ru-RU" sz="1000" dirty="0">
-                <a:solidFill>
-                  <a:schemeClr val="bg1"/>
-                </a:solidFill>
-                <a:latin typeface="Courier New" pitchFamily="49" charset="0"/>
-                <a:ea typeface="Calibri" pitchFamily="34" charset="0"/>
-                <a:cs typeface="Courier New" pitchFamily="49" charset="0"/>
-              </a:rPr>
-              <a:t>//</a:t>
-            </a:r>
-            <a:r>
-              <a:rPr lang="be-BY" sz="1000" dirty="0">
-                <a:solidFill>
-                  <a:schemeClr val="bg1"/>
-                </a:solidFill>
-                <a:latin typeface="Courier New" pitchFamily="49" charset="0"/>
-                <a:ea typeface="Calibri" pitchFamily="34" charset="0"/>
-                <a:cs typeface="Courier New" pitchFamily="49" charset="0"/>
-              </a:rPr>
-              <a:t> KeyValuePair</a:t>
-            </a:r>
-            <a:r>
-              <a:rPr lang="en-US" sz="1000" dirty="0">
-                <a:solidFill>
-                  <a:schemeClr val="bg1"/>
-                </a:solidFill>
-                <a:latin typeface="Courier New" pitchFamily="49" charset="0"/>
-                <a:ea typeface="Calibri" pitchFamily="34" charset="0"/>
-                <a:cs typeface="Courier New" pitchFamily="49" charset="0"/>
-              </a:rPr>
-              <a:t> – </a:t>
-            </a:r>
-            <a:r>
-              <a:rPr lang="ru-RU" sz="1000" dirty="0">
-                <a:solidFill>
-                  <a:schemeClr val="bg1"/>
-                </a:solidFill>
-                <a:latin typeface="Courier New" pitchFamily="49" charset="0"/>
-                <a:ea typeface="Calibri" pitchFamily="34" charset="0"/>
-                <a:cs typeface="Courier New" pitchFamily="49" charset="0"/>
-              </a:rPr>
-              <a:t>элемент списка</a:t>
-            </a:r>
-            <a:endParaRPr lang="be-BY" sz="1000" dirty="0">
-              <a:solidFill>
-                <a:schemeClr val="bg1"/>
-              </a:solidFill>
-              <a:ea typeface="Calibri" pitchFamily="34" charset="0"/>
-              <a:cs typeface="Courier New" pitchFamily="49" charset="0"/>
-            </a:endParaRPr>
-          </a:p>
-          <a:p>
-            <a:pPr eaLnBrk="0" hangingPunct="0">
-              <a:defRPr/>
-            </a:pPr>
-            <a:r>
-              <a:rPr lang="be-BY" sz="1000" dirty="0">
-                <a:solidFill>
-                  <a:schemeClr val="bg1"/>
-                </a:solidFill>
-                <a:latin typeface="Courier New" pitchFamily="49" charset="0"/>
-                <a:ea typeface="Calibri" pitchFamily="34" charset="0"/>
-                <a:cs typeface="Courier New" pitchFamily="49" charset="0"/>
-              </a:rPr>
-              <a:t>                Console.WriteLine(val);</a:t>
-            </a:r>
-            <a:endParaRPr lang="be-BY" sz="1000" dirty="0">
-              <a:solidFill>
-                <a:schemeClr val="bg1"/>
-              </a:solidFill>
-              <a:ea typeface="Calibri" pitchFamily="34" charset="0"/>
-              <a:cs typeface="Courier New" pitchFamily="49" charset="0"/>
-            </a:endParaRPr>
-          </a:p>
-          <a:p>
-            <a:pPr eaLnBrk="0" hangingPunct="0">
-              <a:defRPr/>
-            </a:pPr>
-            <a:r>
-              <a:rPr lang="be-BY" sz="1000" dirty="0">
-                <a:solidFill>
-                  <a:schemeClr val="bg1"/>
-                </a:solidFill>
-                <a:latin typeface="Courier New" pitchFamily="49" charset="0"/>
-                <a:ea typeface="Calibri" pitchFamily="34" charset="0"/>
-                <a:cs typeface="Courier New" pitchFamily="49" charset="0"/>
-              </a:rPr>
-              <a:t>            Console.WriteLine("val2 in sortedList = {0}",sortList["val2"]);</a:t>
-            </a:r>
-            <a:endParaRPr lang="be-BY" sz="1000" dirty="0">
-              <a:solidFill>
-                <a:schemeClr val="bg1"/>
-              </a:solidFill>
-              <a:ea typeface="Calibri" pitchFamily="34" charset="0"/>
-              <a:cs typeface="Courier New" pitchFamily="49" charset="0"/>
-            </a:endParaRPr>
-          </a:p>
-          <a:p>
-            <a:pPr eaLnBrk="0" hangingPunct="0">
-              <a:defRPr/>
-            </a:pPr>
-            <a:endParaRPr lang="be-BY" sz="1000" dirty="0">
-              <a:solidFill>
-                <a:schemeClr val="bg1"/>
-              </a:solidFill>
-              <a:latin typeface="Courier New" pitchFamily="49" charset="0"/>
-              <a:ea typeface="Calibri" pitchFamily="34" charset="0"/>
-              <a:cs typeface="Courier New" pitchFamily="49" charset="0"/>
-            </a:endParaRPr>
-          </a:p>
-          <a:p>
-            <a:pPr eaLnBrk="0" hangingPunct="0">
-              <a:defRPr/>
-            </a:pPr>
-            <a:r>
-              <a:rPr lang="be-BY" sz="1000" dirty="0">
-                <a:solidFill>
-                  <a:schemeClr val="bg1"/>
-                </a:solidFill>
-                <a:latin typeface="Courier New" pitchFamily="49" charset="0"/>
-                <a:ea typeface="Calibri" pitchFamily="34" charset="0"/>
-                <a:cs typeface="Courier New" pitchFamily="49" charset="0"/>
-              </a:rPr>
-              <a:t>            Console.WriteLine("\nStack : ");	//Стек – работает по принципу </a:t>
-            </a:r>
-            <a:r>
-              <a:rPr lang="en-US" sz="1000" dirty="0">
-                <a:solidFill>
-                  <a:schemeClr val="bg1"/>
-                </a:solidFill>
-                <a:latin typeface="Courier New" pitchFamily="49" charset="0"/>
-                <a:ea typeface="Calibri" pitchFamily="34" charset="0"/>
-                <a:cs typeface="Courier New" pitchFamily="49" charset="0"/>
-              </a:rPr>
-              <a:t>FIFO (First input first output)</a:t>
-            </a:r>
-            <a:endParaRPr lang="be-BY" sz="1000" dirty="0">
-              <a:solidFill>
-                <a:schemeClr val="bg1"/>
-              </a:solidFill>
-              <a:ea typeface="Calibri" pitchFamily="34" charset="0"/>
-              <a:cs typeface="Courier New" pitchFamily="49" charset="0"/>
-            </a:endParaRPr>
-          </a:p>
-          <a:p>
-            <a:pPr eaLnBrk="0" hangingPunct="0">
-              <a:defRPr/>
-            </a:pPr>
-            <a:r>
-              <a:rPr lang="be-BY" sz="1000" dirty="0">
-                <a:solidFill>
-                  <a:schemeClr val="bg1"/>
-                </a:solidFill>
-                <a:latin typeface="Courier New" pitchFamily="49" charset="0"/>
-                <a:ea typeface="Calibri" pitchFamily="34" charset="0"/>
-                <a:cs typeface="Courier New" pitchFamily="49" charset="0"/>
-              </a:rPr>
-              <a:t>            Stack&lt;string&gt; stack = new Stack&lt;string&gt;();</a:t>
-            </a:r>
-            <a:endParaRPr lang="be-BY" sz="1000" dirty="0">
-              <a:solidFill>
-                <a:schemeClr val="bg1"/>
-              </a:solidFill>
-              <a:ea typeface="Calibri" pitchFamily="34" charset="0"/>
-              <a:cs typeface="Courier New" pitchFamily="49" charset="0"/>
-            </a:endParaRPr>
-          </a:p>
-          <a:p>
-            <a:pPr eaLnBrk="0" hangingPunct="0">
-              <a:defRPr/>
-            </a:pPr>
-            <a:r>
-              <a:rPr lang="be-BY" sz="1000" dirty="0">
-                <a:solidFill>
-                  <a:schemeClr val="bg1"/>
-                </a:solidFill>
-                <a:latin typeface="Courier New" pitchFamily="49" charset="0"/>
-                <a:ea typeface="Calibri" pitchFamily="34" charset="0"/>
-                <a:cs typeface="Courier New" pitchFamily="49" charset="0"/>
-              </a:rPr>
-              <a:t>            stack.Push("is...");</a:t>
-            </a:r>
-            <a:r>
-              <a:rPr lang="en-US" sz="1000" dirty="0">
-                <a:solidFill>
-                  <a:schemeClr val="bg1"/>
-                </a:solidFill>
-                <a:latin typeface="Courier New" pitchFamily="49" charset="0"/>
-                <a:ea typeface="Calibri" pitchFamily="34" charset="0"/>
-                <a:cs typeface="Courier New" pitchFamily="49" charset="0"/>
-              </a:rPr>
-              <a:t>	</a:t>
-            </a:r>
-            <a:r>
-              <a:rPr lang="ru-RU" sz="1000" dirty="0">
-                <a:solidFill>
-                  <a:schemeClr val="bg1"/>
-                </a:solidFill>
-                <a:latin typeface="Courier New" pitchFamily="49" charset="0"/>
-                <a:ea typeface="Calibri" pitchFamily="34" charset="0"/>
-                <a:cs typeface="Courier New" pitchFamily="49" charset="0"/>
-              </a:rPr>
-              <a:t>	</a:t>
-            </a:r>
-            <a:r>
-              <a:rPr lang="en-US" sz="1000" dirty="0">
-                <a:solidFill>
-                  <a:schemeClr val="bg1"/>
-                </a:solidFill>
-                <a:latin typeface="Courier New" pitchFamily="49" charset="0"/>
-                <a:ea typeface="Calibri" pitchFamily="34" charset="0"/>
-                <a:cs typeface="Courier New" pitchFamily="49" charset="0"/>
-              </a:rPr>
-              <a:t>//</a:t>
-            </a:r>
-            <a:r>
-              <a:rPr lang="ru-RU" sz="1000" dirty="0">
-                <a:solidFill>
-                  <a:schemeClr val="bg1"/>
-                </a:solidFill>
-                <a:latin typeface="Courier New" pitchFamily="49" charset="0"/>
-                <a:ea typeface="Calibri" pitchFamily="34" charset="0"/>
-                <a:cs typeface="Courier New" pitchFamily="49" charset="0"/>
-              </a:rPr>
-              <a:t>Помещает строку на вершину стека</a:t>
-            </a:r>
-            <a:endParaRPr lang="be-BY" sz="1000" dirty="0">
-              <a:solidFill>
-                <a:schemeClr val="bg1"/>
-              </a:solidFill>
-              <a:ea typeface="Calibri" pitchFamily="34" charset="0"/>
-              <a:cs typeface="Courier New" pitchFamily="49" charset="0"/>
-            </a:endParaRPr>
-          </a:p>
-          <a:p>
-            <a:pPr eaLnBrk="0" hangingPunct="0">
-              <a:defRPr/>
-            </a:pPr>
-            <a:r>
-              <a:rPr lang="be-BY" sz="1000" dirty="0">
-                <a:solidFill>
-                  <a:schemeClr val="bg1"/>
-                </a:solidFill>
-                <a:latin typeface="Courier New" pitchFamily="49" charset="0"/>
-                <a:ea typeface="Calibri" pitchFamily="34" charset="0"/>
-                <a:cs typeface="Courier New" pitchFamily="49" charset="0"/>
-              </a:rPr>
-              <a:t>            stack.Push("name ");</a:t>
-            </a:r>
-            <a:endParaRPr lang="be-BY" sz="1000" dirty="0">
-              <a:solidFill>
-                <a:schemeClr val="bg1"/>
-              </a:solidFill>
-              <a:ea typeface="Calibri" pitchFamily="34" charset="0"/>
-              <a:cs typeface="Courier New" pitchFamily="49" charset="0"/>
-            </a:endParaRPr>
-          </a:p>
-          <a:p>
-            <a:pPr eaLnBrk="0" hangingPunct="0">
-              <a:defRPr/>
-            </a:pPr>
-            <a:r>
-              <a:rPr lang="be-BY" sz="1000" dirty="0">
-                <a:solidFill>
-                  <a:schemeClr val="bg1"/>
-                </a:solidFill>
-                <a:latin typeface="Courier New" pitchFamily="49" charset="0"/>
-                <a:ea typeface="Calibri" pitchFamily="34" charset="0"/>
-                <a:cs typeface="Courier New" pitchFamily="49" charset="0"/>
-              </a:rPr>
-              <a:t>            stack.Push("My ");</a:t>
-            </a:r>
-            <a:endParaRPr lang="be-BY" sz="1000" dirty="0">
-              <a:solidFill>
-                <a:schemeClr val="bg1"/>
-              </a:solidFill>
-              <a:ea typeface="Calibri" pitchFamily="34" charset="0"/>
-              <a:cs typeface="Courier New" pitchFamily="49" charset="0"/>
-            </a:endParaRPr>
-          </a:p>
-          <a:p>
-            <a:pPr eaLnBrk="0" hangingPunct="0">
-              <a:defRPr/>
-            </a:pPr>
-            <a:r>
-              <a:rPr lang="be-BY" sz="1000" dirty="0">
-                <a:solidFill>
-                  <a:schemeClr val="bg1"/>
-                </a:solidFill>
-                <a:latin typeface="Courier New" pitchFamily="49" charset="0"/>
-                <a:ea typeface="Calibri" pitchFamily="34" charset="0"/>
-                <a:cs typeface="Courier New" pitchFamily="49" charset="0"/>
-              </a:rPr>
-              <a:t>            for (int i = 0; i &lt; 3; i++)</a:t>
-            </a:r>
-            <a:endParaRPr lang="be-BY" sz="1000" dirty="0">
-              <a:solidFill>
-                <a:schemeClr val="bg1"/>
-              </a:solidFill>
-              <a:ea typeface="Calibri" pitchFamily="34" charset="0"/>
-              <a:cs typeface="Courier New" pitchFamily="49" charset="0"/>
-            </a:endParaRPr>
-          </a:p>
-          <a:p>
-            <a:pPr eaLnBrk="0" hangingPunct="0">
-              <a:defRPr/>
-            </a:pPr>
-            <a:r>
-              <a:rPr lang="be-BY" sz="1000" dirty="0">
-                <a:solidFill>
-                  <a:schemeClr val="bg1"/>
-                </a:solidFill>
-                <a:latin typeface="Courier New" pitchFamily="49" charset="0"/>
-                <a:ea typeface="Calibri" pitchFamily="34" charset="0"/>
-                <a:cs typeface="Courier New" pitchFamily="49" charset="0"/>
-              </a:rPr>
-              <a:t>                Console.Write(stack.Pop());	//Снимаем строки с вершаны стека</a:t>
-            </a:r>
-            <a:endParaRPr lang="be-BY" sz="1000" dirty="0">
-              <a:solidFill>
-                <a:schemeClr val="bg1"/>
-              </a:solidFill>
-              <a:ea typeface="Calibri" pitchFamily="34" charset="0"/>
-              <a:cs typeface="Courier New" pitchFamily="49" charset="0"/>
-            </a:endParaRPr>
-          </a:p>
-          <a:p>
-            <a:pPr eaLnBrk="0" hangingPunct="0">
-              <a:defRPr/>
-            </a:pPr>
-            <a:r>
-              <a:rPr lang="be-BY" sz="1000" dirty="0">
-                <a:solidFill>
-                  <a:schemeClr val="bg1"/>
-                </a:solidFill>
-                <a:latin typeface="Courier New" pitchFamily="49" charset="0"/>
-                <a:ea typeface="Calibri" pitchFamily="34" charset="0"/>
-                <a:cs typeface="Courier New" pitchFamily="49" charset="0"/>
-              </a:rPr>
-              <a:t>            Console.WriteLine("");</a:t>
-            </a:r>
-            <a:endParaRPr lang="be-BY" sz="1000" dirty="0">
-              <a:solidFill>
-                <a:schemeClr val="bg1"/>
-              </a:solidFill>
-              <a:ea typeface="Calibri" pitchFamily="34" charset="0"/>
-              <a:cs typeface="Courier New" pitchFamily="49" charset="0"/>
-            </a:endParaRPr>
-          </a:p>
-          <a:p>
-            <a:pPr eaLnBrk="0" hangingPunct="0">
-              <a:defRPr/>
-            </a:pPr>
-            <a:r>
-              <a:rPr lang="be-BY" sz="1000" dirty="0">
-                <a:solidFill>
-                  <a:schemeClr val="bg1"/>
-                </a:solidFill>
-                <a:latin typeface="Courier New" pitchFamily="49" charset="0"/>
-                <a:ea typeface="Calibri" pitchFamily="34" charset="0"/>
-                <a:cs typeface="Courier New" pitchFamily="49" charset="0"/>
-              </a:rPr>
-              <a:t>        }</a:t>
-            </a:r>
-            <a:endParaRPr lang="be-BY" sz="1000" dirty="0">
-              <a:solidFill>
-                <a:schemeClr val="bg1"/>
-              </a:solidFill>
-              <a:ea typeface="Calibri" pitchFamily="34" charset="0"/>
-              <a:cs typeface="Courier New" pitchFamily="49" charset="0"/>
-            </a:endParaRPr>
-          </a:p>
-          <a:p>
-            <a:pPr eaLnBrk="0" hangingPunct="0">
-              <a:defRPr/>
-            </a:pPr>
-            <a:r>
-              <a:rPr lang="be-BY" sz="1000" dirty="0">
-                <a:solidFill>
-                  <a:schemeClr val="bg1"/>
-                </a:solidFill>
-                <a:latin typeface="Courier New" pitchFamily="49" charset="0"/>
-                <a:ea typeface="Calibri" pitchFamily="34" charset="0"/>
-                <a:cs typeface="Courier New" pitchFamily="49" charset="0"/>
-              </a:rPr>
-              <a:t>    }</a:t>
-            </a:r>
-            <a:endParaRPr lang="be-BY" sz="1000" dirty="0">
-              <a:solidFill>
-                <a:schemeClr val="bg1"/>
-              </a:solidFill>
-              <a:ea typeface="Calibri" pitchFamily="34" charset="0"/>
-              <a:cs typeface="Courier New" pitchFamily="49" charset="0"/>
+            <a:r>
+              <a:rPr lang="ru-RU" u="sng" dirty="0" smtClean="0">
+                <a:solidFill>
+                  <a:schemeClr val="bg1"/>
+                </a:solidFill>
+              </a:rPr>
+              <a:t>Не пользуемся</a:t>
+            </a:r>
+            <a:r>
+              <a:rPr lang="ru-RU" dirty="0" smtClean="0">
+                <a:solidFill>
+                  <a:schemeClr val="bg1"/>
+                </a:solidFill>
+              </a:rPr>
+              <a:t> классами из пространства имен </a:t>
+            </a:r>
+            <a:r>
+              <a:rPr lang="en-US" dirty="0" err="1" smtClean="0">
+                <a:solidFill>
+                  <a:schemeClr val="bg1"/>
+                </a:solidFill>
+              </a:rPr>
+              <a:t>System.Collections</a:t>
+            </a:r>
+            <a:r>
+              <a:rPr lang="en-US" dirty="0" smtClean="0">
+                <a:solidFill>
+                  <a:schemeClr val="bg1"/>
+                </a:solidFill>
+              </a:rPr>
+              <a:t>. </a:t>
+            </a:r>
+            <a:r>
+              <a:rPr lang="ru-RU" dirty="0" smtClean="0">
+                <a:solidFill>
+                  <a:schemeClr val="bg1"/>
+                </a:solidFill>
+              </a:rPr>
+              <a:t>Они нужны только для совместимости с кодом из </a:t>
+            </a:r>
+            <a:r>
+              <a:rPr lang="en-US" dirty="0" smtClean="0">
+                <a:solidFill>
+                  <a:schemeClr val="bg1"/>
+                </a:solidFill>
+              </a:rPr>
+              <a:t>.NET 1.x</a:t>
+            </a:r>
+            <a:endParaRPr lang="en-US" dirty="0">
+              <a:solidFill>
+                <a:schemeClr val="bg1"/>
+              </a:solidFill>
             </a:endParaRPr>
           </a:p>
         </p:txBody>
@@ -17057,6 +16388,1291 @@
         </p:nvSpPr>
         <p:spPr bwMode="auto">
           <a:xfrm>
+            <a:off x="381000" y="-76200"/>
+            <a:ext cx="8305800" cy="461963"/>
+          </a:xfrm>
+          <a:prstGeom prst="rect">
+            <a:avLst/>
+          </a:prstGeom>
+          <a:noFill/>
+          <a:ln>
+            <a:noFill/>
+          </a:ln>
+          <a:extLst>
+            <a:ext uri="{909E8E84-426E-40DD-AFC4-6F175D3DCCD1}">
+              <a14:hiddenFill xmlns:a14="http://schemas.microsoft.com/office/drawing/2010/main">
+                <a:solidFill>
+                  <a:srgbClr val="FFFFFF"/>
+                </a:solidFill>
+              </a14:hiddenFill>
+            </a:ext>
+            <a:ext uri="{91240B29-F687-4F45-9708-019B960494DF}">
+              <a14:hiddenLine xmlns:a14="http://schemas.microsoft.com/office/drawing/2010/main" w="9525">
+                <a:solidFill>
+                  <a:srgbClr val="000000"/>
+                </a:solidFill>
+                <a:miter lim="800000"/>
+                <a:headEnd/>
+                <a:tailEnd/>
+              </a14:hiddenLine>
+            </a:ext>
+          </a:extLst>
+        </p:spPr>
+        <p:txBody>
+          <a:bodyPr anchor="ctr">
+            <a:spAutoFit/>
+          </a:bodyPr>
+          <a:lstStyle/>
+          <a:p>
+            <a:pPr algn="ctr">
+              <a:tabLst>
+                <a:tab pos="457200" algn="l"/>
+              </a:tabLst>
+            </a:pPr>
+            <a:r>
+              <a:rPr lang="ru-RU" sz="2400" b="1" dirty="0">
+                <a:solidFill>
+                  <a:schemeClr val="bg1"/>
+                </a:solidFill>
+                <a:cs typeface="Times New Roman" pitchFamily="18" charset="0"/>
+              </a:rPr>
+              <a:t>Коллекции</a:t>
+            </a:r>
+            <a:endParaRPr lang="en-US" sz="1200" dirty="0">
+              <a:solidFill>
+                <a:schemeClr val="bg1"/>
+              </a:solidFill>
+              <a:cs typeface="Times New Roman" pitchFamily="18" charset="0"/>
+            </a:endParaRPr>
+          </a:p>
+        </p:txBody>
+      </p:sp>
+      <p:sp>
+        <p:nvSpPr>
+          <p:cNvPr id="32769" name="Rectangle 1"/>
+          <p:cNvSpPr>
+            <a:spLocks noChangeArrowheads="1"/>
+          </p:cNvSpPr>
+          <p:nvPr/>
+        </p:nvSpPr>
+        <p:spPr bwMode="auto">
+          <a:xfrm>
+            <a:off x="152400" y="381000"/>
+            <a:ext cx="8839200" cy="6402388"/>
+          </a:xfrm>
+          <a:prstGeom prst="rect">
+            <a:avLst/>
+          </a:prstGeom>
+          <a:noFill/>
+          <a:ln w="9525">
+            <a:solidFill>
+              <a:schemeClr val="bg1">
+                <a:lumMod val="65000"/>
+              </a:schemeClr>
+            </a:solidFill>
+            <a:miter lim="800000"/>
+            <a:headEnd/>
+            <a:tailEnd/>
+          </a:ln>
+          <a:effectLst/>
+        </p:spPr>
+        <p:txBody>
+          <a:bodyPr anchor="ctr">
+            <a:spAutoFit/>
+          </a:bodyPr>
+          <a:lstStyle/>
+          <a:p>
+            <a:pPr eaLnBrk="0" hangingPunct="0">
+              <a:defRPr/>
+            </a:pPr>
+            <a:r>
+              <a:rPr lang="be-BY" sz="1000" dirty="0">
+                <a:solidFill>
+                  <a:schemeClr val="bg1"/>
+                </a:solidFill>
+                <a:latin typeface="Courier New" pitchFamily="49" charset="0"/>
+                <a:ea typeface="Calibri" pitchFamily="34" charset="0"/>
+                <a:cs typeface="Courier New" pitchFamily="49" charset="0"/>
+              </a:rPr>
+              <a:t>using System.Collections;		//</a:t>
+            </a:r>
+            <a:r>
+              <a:rPr lang="ru-RU" sz="1000" dirty="0">
+                <a:solidFill>
+                  <a:schemeClr val="bg1"/>
+                </a:solidFill>
+                <a:latin typeface="Courier New" pitchFamily="49" charset="0"/>
+                <a:ea typeface="Calibri" pitchFamily="34" charset="0"/>
+                <a:cs typeface="Courier New" pitchFamily="49" charset="0"/>
+              </a:rPr>
+              <a:t>Обязательно использование пространства имен</a:t>
+            </a:r>
+            <a:endParaRPr lang="be-BY" sz="1000" dirty="0">
+              <a:solidFill>
+                <a:schemeClr val="bg1"/>
+              </a:solidFill>
+              <a:latin typeface="Courier New" pitchFamily="49" charset="0"/>
+              <a:ea typeface="Calibri" pitchFamily="34" charset="0"/>
+              <a:cs typeface="Courier New" pitchFamily="49" charset="0"/>
+            </a:endParaRPr>
+          </a:p>
+          <a:p>
+            <a:pPr eaLnBrk="0" hangingPunct="0">
+              <a:defRPr/>
+            </a:pPr>
+            <a:endParaRPr lang="be-BY" sz="1000" dirty="0">
+              <a:solidFill>
+                <a:schemeClr val="bg1"/>
+              </a:solidFill>
+              <a:ea typeface="Calibri" pitchFamily="34" charset="0"/>
+              <a:cs typeface="Courier New" pitchFamily="49" charset="0"/>
+            </a:endParaRPr>
+          </a:p>
+          <a:p>
+            <a:pPr eaLnBrk="0" hangingPunct="0">
+              <a:defRPr/>
+            </a:pPr>
+            <a:r>
+              <a:rPr lang="be-BY" sz="1000" dirty="0">
+                <a:solidFill>
+                  <a:schemeClr val="bg1"/>
+                </a:solidFill>
+                <a:latin typeface="Courier New" pitchFamily="49" charset="0"/>
+                <a:ea typeface="Calibri" pitchFamily="34" charset="0"/>
+                <a:cs typeface="Courier New" pitchFamily="49" charset="0"/>
+              </a:rPr>
+              <a:t>    class Program</a:t>
+            </a:r>
+            <a:endParaRPr lang="be-BY" sz="1000" dirty="0">
+              <a:solidFill>
+                <a:schemeClr val="bg1"/>
+              </a:solidFill>
+              <a:ea typeface="Calibri" pitchFamily="34" charset="0"/>
+              <a:cs typeface="Courier New" pitchFamily="49" charset="0"/>
+            </a:endParaRPr>
+          </a:p>
+          <a:p>
+            <a:pPr eaLnBrk="0" hangingPunct="0">
+              <a:defRPr/>
+            </a:pPr>
+            <a:r>
+              <a:rPr lang="be-BY" sz="1000" dirty="0">
+                <a:solidFill>
+                  <a:schemeClr val="bg1"/>
+                </a:solidFill>
+                <a:latin typeface="Courier New" pitchFamily="49" charset="0"/>
+                <a:ea typeface="Calibri" pitchFamily="34" charset="0"/>
+                <a:cs typeface="Courier New" pitchFamily="49" charset="0"/>
+              </a:rPr>
+              <a:t>    {</a:t>
+            </a:r>
+            <a:endParaRPr lang="be-BY" sz="1000" dirty="0">
+              <a:solidFill>
+                <a:schemeClr val="bg1"/>
+              </a:solidFill>
+              <a:ea typeface="Calibri" pitchFamily="34" charset="0"/>
+              <a:cs typeface="Courier New" pitchFamily="49" charset="0"/>
+            </a:endParaRPr>
+          </a:p>
+          <a:p>
+            <a:pPr eaLnBrk="0" hangingPunct="0">
+              <a:defRPr/>
+            </a:pPr>
+            <a:r>
+              <a:rPr lang="be-BY" sz="1000" dirty="0">
+                <a:solidFill>
+                  <a:schemeClr val="bg1"/>
+                </a:solidFill>
+                <a:latin typeface="Courier New" pitchFamily="49" charset="0"/>
+                <a:ea typeface="Calibri" pitchFamily="34" charset="0"/>
+                <a:cs typeface="Courier New" pitchFamily="49" charset="0"/>
+              </a:rPr>
+              <a:t>        static void Main(string[] args)</a:t>
+            </a:r>
+            <a:endParaRPr lang="be-BY" sz="1000" dirty="0">
+              <a:solidFill>
+                <a:schemeClr val="bg1"/>
+              </a:solidFill>
+              <a:ea typeface="Calibri" pitchFamily="34" charset="0"/>
+              <a:cs typeface="Courier New" pitchFamily="49" charset="0"/>
+            </a:endParaRPr>
+          </a:p>
+          <a:p>
+            <a:pPr eaLnBrk="0" hangingPunct="0">
+              <a:defRPr/>
+            </a:pPr>
+            <a:r>
+              <a:rPr lang="be-BY" sz="1000" dirty="0">
+                <a:solidFill>
+                  <a:schemeClr val="bg1"/>
+                </a:solidFill>
+                <a:latin typeface="Courier New" pitchFamily="49" charset="0"/>
+                <a:ea typeface="Calibri" pitchFamily="34" charset="0"/>
+                <a:cs typeface="Courier New" pitchFamily="49" charset="0"/>
+              </a:rPr>
+              <a:t>        {</a:t>
+            </a:r>
+            <a:endParaRPr lang="be-BY" sz="1000" dirty="0">
+              <a:solidFill>
+                <a:schemeClr val="bg1"/>
+              </a:solidFill>
+              <a:ea typeface="Calibri" pitchFamily="34" charset="0"/>
+              <a:cs typeface="Courier New" pitchFamily="49" charset="0"/>
+            </a:endParaRPr>
+          </a:p>
+          <a:p>
+            <a:pPr eaLnBrk="0" hangingPunct="0">
+              <a:defRPr/>
+            </a:pPr>
+            <a:r>
+              <a:rPr lang="be-BY" sz="1000" dirty="0">
+                <a:solidFill>
+                  <a:schemeClr val="bg1"/>
+                </a:solidFill>
+                <a:latin typeface="Courier New" pitchFamily="49" charset="0"/>
+                <a:ea typeface="Calibri" pitchFamily="34" charset="0"/>
+                <a:cs typeface="Courier New" pitchFamily="49" charset="0"/>
+              </a:rPr>
+              <a:t>            Console.WriteLine("Array List : ");	//Безразмерный масив. В него можно помещать любой объект.</a:t>
+            </a:r>
+            <a:endParaRPr lang="be-BY" sz="1000" dirty="0">
+              <a:solidFill>
+                <a:schemeClr val="bg1"/>
+              </a:solidFill>
+              <a:ea typeface="Calibri" pitchFamily="34" charset="0"/>
+              <a:cs typeface="Courier New" pitchFamily="49" charset="0"/>
+            </a:endParaRPr>
+          </a:p>
+          <a:p>
+            <a:pPr eaLnBrk="0" hangingPunct="0">
+              <a:defRPr/>
+            </a:pPr>
+            <a:r>
+              <a:rPr lang="be-BY" sz="1000" dirty="0">
+                <a:solidFill>
+                  <a:schemeClr val="bg1"/>
+                </a:solidFill>
+                <a:latin typeface="Courier New" pitchFamily="49" charset="0"/>
+                <a:ea typeface="Calibri" pitchFamily="34" charset="0"/>
+                <a:cs typeface="Courier New" pitchFamily="49" charset="0"/>
+              </a:rPr>
+              <a:t>            ArrayList arrayList = new ArrayList();</a:t>
+            </a:r>
+            <a:endParaRPr lang="be-BY" sz="1000" dirty="0">
+              <a:solidFill>
+                <a:schemeClr val="bg1"/>
+              </a:solidFill>
+              <a:ea typeface="Calibri" pitchFamily="34" charset="0"/>
+              <a:cs typeface="Courier New" pitchFamily="49" charset="0"/>
+            </a:endParaRPr>
+          </a:p>
+          <a:p>
+            <a:pPr eaLnBrk="0" hangingPunct="0">
+              <a:defRPr/>
+            </a:pPr>
+            <a:r>
+              <a:rPr lang="be-BY" sz="1000" dirty="0">
+                <a:solidFill>
+                  <a:schemeClr val="bg1"/>
+                </a:solidFill>
+                <a:latin typeface="Courier New" pitchFamily="49" charset="0"/>
+                <a:ea typeface="Calibri" pitchFamily="34" charset="0"/>
+                <a:cs typeface="Courier New" pitchFamily="49" charset="0"/>
+              </a:rPr>
+              <a:t>            arrayList.Add(30.5);</a:t>
+            </a:r>
+            <a:endParaRPr lang="be-BY" sz="1000" dirty="0">
+              <a:solidFill>
+                <a:schemeClr val="bg1"/>
+              </a:solidFill>
+              <a:ea typeface="Calibri" pitchFamily="34" charset="0"/>
+              <a:cs typeface="Courier New" pitchFamily="49" charset="0"/>
+            </a:endParaRPr>
+          </a:p>
+          <a:p>
+            <a:pPr eaLnBrk="0" hangingPunct="0">
+              <a:defRPr/>
+            </a:pPr>
+            <a:r>
+              <a:rPr lang="be-BY" sz="1000" dirty="0">
+                <a:solidFill>
+                  <a:schemeClr val="bg1"/>
+                </a:solidFill>
+                <a:latin typeface="Courier New" pitchFamily="49" charset="0"/>
+                <a:ea typeface="Calibri" pitchFamily="34" charset="0"/>
+                <a:cs typeface="Courier New" pitchFamily="49" charset="0"/>
+              </a:rPr>
+              <a:t>            arrayList.Add(23.6);</a:t>
+            </a:r>
+            <a:endParaRPr lang="be-BY" sz="1000" dirty="0">
+              <a:solidFill>
+                <a:schemeClr val="bg1"/>
+              </a:solidFill>
+              <a:ea typeface="Calibri" pitchFamily="34" charset="0"/>
+              <a:cs typeface="Courier New" pitchFamily="49" charset="0"/>
+            </a:endParaRPr>
+          </a:p>
+          <a:p>
+            <a:pPr eaLnBrk="0" hangingPunct="0">
+              <a:defRPr/>
+            </a:pPr>
+            <a:r>
+              <a:rPr lang="be-BY" sz="1000" dirty="0">
+                <a:solidFill>
+                  <a:schemeClr val="bg1"/>
+                </a:solidFill>
+                <a:latin typeface="Courier New" pitchFamily="49" charset="0"/>
+                <a:ea typeface="Calibri" pitchFamily="34" charset="0"/>
+                <a:cs typeface="Courier New" pitchFamily="49" charset="0"/>
+              </a:rPr>
+              <a:t>            arrayList.Add(40);</a:t>
+            </a:r>
+            <a:endParaRPr lang="be-BY" sz="1000" dirty="0">
+              <a:solidFill>
+                <a:schemeClr val="bg1"/>
+              </a:solidFill>
+              <a:ea typeface="Calibri" pitchFamily="34" charset="0"/>
+              <a:cs typeface="Courier New" pitchFamily="49" charset="0"/>
+            </a:endParaRPr>
+          </a:p>
+          <a:p>
+            <a:pPr eaLnBrk="0" hangingPunct="0">
+              <a:defRPr/>
+            </a:pPr>
+            <a:r>
+              <a:rPr lang="be-BY" sz="1000" dirty="0">
+                <a:solidFill>
+                  <a:schemeClr val="bg1"/>
+                </a:solidFill>
+                <a:latin typeface="Courier New" pitchFamily="49" charset="0"/>
+                <a:ea typeface="Calibri" pitchFamily="34" charset="0"/>
+                <a:cs typeface="Courier New" pitchFamily="49" charset="0"/>
+              </a:rPr>
+              <a:t>            foreach (object val in arrayList)</a:t>
+            </a:r>
+            <a:endParaRPr lang="be-BY" sz="1000" dirty="0">
+              <a:solidFill>
+                <a:schemeClr val="bg1"/>
+              </a:solidFill>
+              <a:ea typeface="Calibri" pitchFamily="34" charset="0"/>
+              <a:cs typeface="Courier New" pitchFamily="49" charset="0"/>
+            </a:endParaRPr>
+          </a:p>
+          <a:p>
+            <a:pPr eaLnBrk="0" hangingPunct="0">
+              <a:defRPr/>
+            </a:pPr>
+            <a:r>
+              <a:rPr lang="be-BY" sz="1000" dirty="0">
+                <a:solidFill>
+                  <a:schemeClr val="bg1"/>
+                </a:solidFill>
+                <a:latin typeface="Courier New" pitchFamily="49" charset="0"/>
+                <a:ea typeface="Calibri" pitchFamily="34" charset="0"/>
+                <a:cs typeface="Courier New" pitchFamily="49" charset="0"/>
+              </a:rPr>
+              <a:t>                Console.WriteLine(val);</a:t>
+            </a:r>
+          </a:p>
+          <a:p>
+            <a:pPr eaLnBrk="0" hangingPunct="0">
+              <a:defRPr/>
+            </a:pPr>
+            <a:endParaRPr lang="be-BY" sz="1000" dirty="0">
+              <a:solidFill>
+                <a:schemeClr val="bg1"/>
+              </a:solidFill>
+              <a:ea typeface="Calibri" pitchFamily="34" charset="0"/>
+              <a:cs typeface="Courier New" pitchFamily="49" charset="0"/>
+            </a:endParaRPr>
+          </a:p>
+          <a:p>
+            <a:pPr eaLnBrk="0" hangingPunct="0">
+              <a:defRPr/>
+            </a:pPr>
+            <a:r>
+              <a:rPr lang="be-BY" sz="1000" dirty="0">
+                <a:solidFill>
+                  <a:schemeClr val="bg1"/>
+                </a:solidFill>
+                <a:latin typeface="Courier New" pitchFamily="49" charset="0"/>
+                <a:ea typeface="Calibri" pitchFamily="34" charset="0"/>
+                <a:cs typeface="Courier New" pitchFamily="49" charset="0"/>
+              </a:rPr>
+              <a:t>            Console.WriteLine("\nQueue : "); 	//Очередь – работает по принципу </a:t>
+            </a:r>
+            <a:r>
+              <a:rPr lang="en-US" sz="1000" dirty="0">
+                <a:solidFill>
+                  <a:schemeClr val="bg1"/>
+                </a:solidFill>
+                <a:latin typeface="Courier New" pitchFamily="49" charset="0"/>
+                <a:ea typeface="Calibri" pitchFamily="34" charset="0"/>
+                <a:cs typeface="Courier New" pitchFamily="49" charset="0"/>
+              </a:rPr>
+              <a:t>FILO ( first input last output )</a:t>
+            </a:r>
+            <a:endParaRPr lang="be-BY" sz="1000" dirty="0">
+              <a:solidFill>
+                <a:schemeClr val="bg1"/>
+              </a:solidFill>
+              <a:ea typeface="Calibri" pitchFamily="34" charset="0"/>
+              <a:cs typeface="Courier New" pitchFamily="49" charset="0"/>
+            </a:endParaRPr>
+          </a:p>
+          <a:p>
+            <a:pPr eaLnBrk="0" hangingPunct="0">
+              <a:defRPr/>
+            </a:pPr>
+            <a:r>
+              <a:rPr lang="be-BY" sz="1000" dirty="0">
+                <a:solidFill>
+                  <a:schemeClr val="bg1"/>
+                </a:solidFill>
+                <a:latin typeface="Courier New" pitchFamily="49" charset="0"/>
+                <a:ea typeface="Calibri" pitchFamily="34" charset="0"/>
+                <a:cs typeface="Courier New" pitchFamily="49" charset="0"/>
+              </a:rPr>
+              <a:t>            Queue&lt;int&gt; queue = new Queue&lt;int&gt;();</a:t>
+            </a:r>
+            <a:endParaRPr lang="be-BY" sz="1000" dirty="0">
+              <a:solidFill>
+                <a:schemeClr val="bg1"/>
+              </a:solidFill>
+              <a:ea typeface="Calibri" pitchFamily="34" charset="0"/>
+              <a:cs typeface="Courier New" pitchFamily="49" charset="0"/>
+            </a:endParaRPr>
+          </a:p>
+          <a:p>
+            <a:pPr eaLnBrk="0" hangingPunct="0">
+              <a:defRPr/>
+            </a:pPr>
+            <a:r>
+              <a:rPr lang="be-BY" sz="1000" dirty="0">
+                <a:solidFill>
+                  <a:schemeClr val="bg1"/>
+                </a:solidFill>
+                <a:latin typeface="Courier New" pitchFamily="49" charset="0"/>
+                <a:ea typeface="Calibri" pitchFamily="34" charset="0"/>
+                <a:cs typeface="Courier New" pitchFamily="49" charset="0"/>
+              </a:rPr>
+              <a:t>            queue.Enqueue(1);</a:t>
+            </a:r>
+            <a:r>
+              <a:rPr lang="en-US" sz="1000" dirty="0">
+                <a:solidFill>
+                  <a:schemeClr val="bg1"/>
+                </a:solidFill>
+                <a:latin typeface="Courier New" pitchFamily="49" charset="0"/>
+                <a:ea typeface="Calibri" pitchFamily="34" charset="0"/>
+                <a:cs typeface="Courier New" pitchFamily="49" charset="0"/>
+              </a:rPr>
+              <a:t>                </a:t>
+            </a:r>
+            <a:r>
+              <a:rPr lang="ru-RU" sz="1000" dirty="0">
+                <a:solidFill>
+                  <a:schemeClr val="bg1"/>
+                </a:solidFill>
+                <a:latin typeface="Courier New" pitchFamily="49" charset="0"/>
+                <a:ea typeface="Calibri" pitchFamily="34" charset="0"/>
+                <a:cs typeface="Courier New" pitchFamily="49" charset="0"/>
+              </a:rPr>
+              <a:t>	//Помещаем в конец очереди</a:t>
+            </a:r>
+            <a:endParaRPr lang="be-BY" sz="1000" dirty="0">
+              <a:solidFill>
+                <a:schemeClr val="bg1"/>
+              </a:solidFill>
+              <a:ea typeface="Calibri" pitchFamily="34" charset="0"/>
+              <a:cs typeface="Courier New" pitchFamily="49" charset="0"/>
+            </a:endParaRPr>
+          </a:p>
+          <a:p>
+            <a:pPr eaLnBrk="0" hangingPunct="0">
+              <a:defRPr/>
+            </a:pPr>
+            <a:r>
+              <a:rPr lang="be-BY" sz="1000" dirty="0">
+                <a:solidFill>
+                  <a:schemeClr val="bg1"/>
+                </a:solidFill>
+                <a:latin typeface="Courier New" pitchFamily="49" charset="0"/>
+                <a:ea typeface="Calibri" pitchFamily="34" charset="0"/>
+                <a:cs typeface="Courier New" pitchFamily="49" charset="0"/>
+              </a:rPr>
+              <a:t>            queue.Enqueue(4);</a:t>
+            </a:r>
+            <a:endParaRPr lang="be-BY" sz="1000" dirty="0">
+              <a:solidFill>
+                <a:schemeClr val="bg1"/>
+              </a:solidFill>
+              <a:ea typeface="Calibri" pitchFamily="34" charset="0"/>
+              <a:cs typeface="Courier New" pitchFamily="49" charset="0"/>
+            </a:endParaRPr>
+          </a:p>
+          <a:p>
+            <a:pPr eaLnBrk="0" hangingPunct="0">
+              <a:defRPr/>
+            </a:pPr>
+            <a:r>
+              <a:rPr lang="be-BY" sz="1000" dirty="0">
+                <a:solidFill>
+                  <a:schemeClr val="bg1"/>
+                </a:solidFill>
+                <a:latin typeface="Courier New" pitchFamily="49" charset="0"/>
+                <a:ea typeface="Calibri" pitchFamily="34" charset="0"/>
+                <a:cs typeface="Courier New" pitchFamily="49" charset="0"/>
+              </a:rPr>
+              <a:t>            queue.Enqueue(6);</a:t>
+            </a:r>
+            <a:endParaRPr lang="be-BY" sz="1000" dirty="0">
+              <a:solidFill>
+                <a:schemeClr val="bg1"/>
+              </a:solidFill>
+              <a:ea typeface="Calibri" pitchFamily="34" charset="0"/>
+              <a:cs typeface="Courier New" pitchFamily="49" charset="0"/>
+            </a:endParaRPr>
+          </a:p>
+          <a:p>
+            <a:pPr eaLnBrk="0" hangingPunct="0">
+              <a:defRPr/>
+            </a:pPr>
+            <a:r>
+              <a:rPr lang="be-BY" sz="1000" dirty="0">
+                <a:solidFill>
+                  <a:schemeClr val="bg1"/>
+                </a:solidFill>
+                <a:latin typeface="Courier New" pitchFamily="49" charset="0"/>
+                <a:ea typeface="Calibri" pitchFamily="34" charset="0"/>
+                <a:cs typeface="Courier New" pitchFamily="49" charset="0"/>
+              </a:rPr>
+              <a:t>            </a:t>
+            </a:r>
+            <a:r>
+              <a:rPr lang="en-US" sz="1000" dirty="0">
+                <a:solidFill>
+                  <a:schemeClr val="bg1"/>
+                </a:solidFill>
+                <a:latin typeface="Courier New" pitchFamily="49" charset="0"/>
+                <a:ea typeface="Calibri" pitchFamily="34" charset="0"/>
+                <a:cs typeface="Courier New" pitchFamily="49" charset="0"/>
+              </a:rPr>
+              <a:t>while</a:t>
+            </a:r>
+            <a:r>
+              <a:rPr lang="be-BY" sz="1000" dirty="0">
+                <a:solidFill>
+                  <a:schemeClr val="bg1"/>
+                </a:solidFill>
+                <a:latin typeface="Courier New" pitchFamily="49" charset="0"/>
+                <a:ea typeface="Calibri" pitchFamily="34" charset="0"/>
+                <a:cs typeface="Courier New" pitchFamily="49" charset="0"/>
+              </a:rPr>
+              <a:t> (queue.</a:t>
+            </a:r>
+            <a:r>
+              <a:rPr lang="en-US" sz="1000" dirty="0">
+                <a:solidFill>
+                  <a:schemeClr val="bg1"/>
+                </a:solidFill>
+                <a:latin typeface="Courier New" pitchFamily="49" charset="0"/>
+                <a:ea typeface="Calibri" pitchFamily="34" charset="0"/>
+                <a:cs typeface="Courier New" pitchFamily="49" charset="0"/>
+              </a:rPr>
+              <a:t>Count &gt; 0</a:t>
+            </a:r>
+            <a:r>
+              <a:rPr lang="be-BY" sz="1000" dirty="0">
+                <a:solidFill>
+                  <a:schemeClr val="bg1"/>
+                </a:solidFill>
+                <a:latin typeface="Courier New" pitchFamily="49" charset="0"/>
+                <a:ea typeface="Calibri" pitchFamily="34" charset="0"/>
+                <a:cs typeface="Courier New" pitchFamily="49" charset="0"/>
+              </a:rPr>
+              <a:t>)</a:t>
+            </a:r>
+            <a:endParaRPr lang="be-BY" sz="1000" dirty="0">
+              <a:solidFill>
+                <a:schemeClr val="bg1"/>
+              </a:solidFill>
+              <a:ea typeface="Calibri" pitchFamily="34" charset="0"/>
+              <a:cs typeface="Courier New" pitchFamily="49" charset="0"/>
+            </a:endParaRPr>
+          </a:p>
+          <a:p>
+            <a:pPr eaLnBrk="0" hangingPunct="0">
+              <a:defRPr/>
+            </a:pPr>
+            <a:r>
+              <a:rPr lang="be-BY" sz="1000" dirty="0">
+                <a:solidFill>
+                  <a:schemeClr val="bg1"/>
+                </a:solidFill>
+                <a:latin typeface="Courier New" pitchFamily="49" charset="0"/>
+                <a:ea typeface="Calibri" pitchFamily="34" charset="0"/>
+                <a:cs typeface="Courier New" pitchFamily="49" charset="0"/>
+              </a:rPr>
+              <a:t>                Console.WriteLine(queue.Dequeue());	//Берем элементы из начала очереди</a:t>
+            </a:r>
+          </a:p>
+          <a:p>
+            <a:pPr eaLnBrk="0" hangingPunct="0">
+              <a:defRPr/>
+            </a:pPr>
+            <a:endParaRPr lang="be-BY" sz="1000" dirty="0">
+              <a:solidFill>
+                <a:schemeClr val="bg1"/>
+              </a:solidFill>
+              <a:ea typeface="Calibri" pitchFamily="34" charset="0"/>
+              <a:cs typeface="Courier New" pitchFamily="49" charset="0"/>
+            </a:endParaRPr>
+          </a:p>
+          <a:p>
+            <a:pPr eaLnBrk="0" hangingPunct="0">
+              <a:defRPr/>
+            </a:pPr>
+            <a:r>
+              <a:rPr lang="be-BY" sz="1000" dirty="0">
+                <a:solidFill>
+                  <a:schemeClr val="bg1"/>
+                </a:solidFill>
+                <a:latin typeface="Courier New" pitchFamily="49" charset="0"/>
+                <a:ea typeface="Calibri" pitchFamily="34" charset="0"/>
+                <a:cs typeface="Courier New" pitchFamily="49" charset="0"/>
+              </a:rPr>
+              <a:t>            Console.WriteLine("\nSorted List : ");</a:t>
+            </a:r>
+            <a:r>
+              <a:rPr lang="en-US" sz="1000" dirty="0">
+                <a:solidFill>
+                  <a:schemeClr val="bg1"/>
+                </a:solidFill>
+                <a:latin typeface="Courier New" pitchFamily="49" charset="0"/>
+                <a:ea typeface="Calibri" pitchFamily="34" charset="0"/>
+                <a:cs typeface="Courier New" pitchFamily="49" charset="0"/>
+              </a:rPr>
+              <a:t>	</a:t>
+            </a:r>
+            <a:r>
+              <a:rPr lang="ru-RU" sz="1000" dirty="0">
+                <a:solidFill>
+                  <a:schemeClr val="bg1"/>
+                </a:solidFill>
+                <a:latin typeface="Courier New" pitchFamily="49" charset="0"/>
+                <a:ea typeface="Calibri" pitchFamily="34" charset="0"/>
+                <a:cs typeface="Courier New" pitchFamily="49" charset="0"/>
+              </a:rPr>
+              <a:t> //Коллекция, работающая по принципу ключ-значение</a:t>
+            </a:r>
+            <a:endParaRPr lang="be-BY" sz="1000" dirty="0">
+              <a:solidFill>
+                <a:schemeClr val="bg1"/>
+              </a:solidFill>
+              <a:ea typeface="Calibri" pitchFamily="34" charset="0"/>
+              <a:cs typeface="Courier New" pitchFamily="49" charset="0"/>
+            </a:endParaRPr>
+          </a:p>
+          <a:p>
+            <a:pPr eaLnBrk="0" hangingPunct="0">
+              <a:defRPr/>
+            </a:pPr>
+            <a:r>
+              <a:rPr lang="be-BY" sz="1000" dirty="0">
+                <a:solidFill>
+                  <a:schemeClr val="bg1"/>
+                </a:solidFill>
+                <a:latin typeface="Courier New" pitchFamily="49" charset="0"/>
+                <a:ea typeface="Calibri" pitchFamily="34" charset="0"/>
+                <a:cs typeface="Courier New" pitchFamily="49" charset="0"/>
+              </a:rPr>
+              <a:t>            SortedList&lt;string, int&gt; sortList = new SortedList&lt;string, int&gt;();</a:t>
+            </a:r>
+            <a:endParaRPr lang="be-BY" sz="1000" dirty="0">
+              <a:solidFill>
+                <a:schemeClr val="bg1"/>
+              </a:solidFill>
+              <a:ea typeface="Calibri" pitchFamily="34" charset="0"/>
+              <a:cs typeface="Courier New" pitchFamily="49" charset="0"/>
+            </a:endParaRPr>
+          </a:p>
+          <a:p>
+            <a:pPr eaLnBrk="0" hangingPunct="0">
+              <a:defRPr/>
+            </a:pPr>
+            <a:r>
+              <a:rPr lang="be-BY" sz="1000" dirty="0">
+                <a:solidFill>
+                  <a:schemeClr val="bg1"/>
+                </a:solidFill>
+                <a:latin typeface="Courier New" pitchFamily="49" charset="0"/>
+                <a:ea typeface="Calibri" pitchFamily="34" charset="0"/>
+                <a:cs typeface="Courier New" pitchFamily="49" charset="0"/>
+              </a:rPr>
+              <a:t>            sortList["val1"] = 30;			</a:t>
+            </a:r>
+            <a:r>
+              <a:rPr lang="ru-RU" sz="1000" dirty="0">
+                <a:solidFill>
+                  <a:schemeClr val="bg1"/>
+                </a:solidFill>
+                <a:latin typeface="Courier New" pitchFamily="49" charset="0"/>
+                <a:ea typeface="Calibri" pitchFamily="34" charset="0"/>
+                <a:cs typeface="Courier New" pitchFamily="49" charset="0"/>
+              </a:rPr>
+              <a:t>//Помещаем значение 30 по ключу </a:t>
+            </a:r>
+            <a:r>
+              <a:rPr lang="en-US" sz="1000" dirty="0">
+                <a:solidFill>
+                  <a:schemeClr val="bg1"/>
+                </a:solidFill>
+                <a:latin typeface="Courier New" pitchFamily="49" charset="0"/>
+                <a:ea typeface="Calibri" pitchFamily="34" charset="0"/>
+                <a:cs typeface="Courier New" pitchFamily="49" charset="0"/>
+              </a:rPr>
+              <a:t>“val1”</a:t>
+            </a:r>
+            <a:endParaRPr lang="be-BY" sz="1000" dirty="0">
+              <a:solidFill>
+                <a:schemeClr val="bg1"/>
+              </a:solidFill>
+              <a:ea typeface="Calibri" pitchFamily="34" charset="0"/>
+              <a:cs typeface="Courier New" pitchFamily="49" charset="0"/>
+            </a:endParaRPr>
+          </a:p>
+          <a:p>
+            <a:pPr eaLnBrk="0" hangingPunct="0">
+              <a:defRPr/>
+            </a:pPr>
+            <a:r>
+              <a:rPr lang="be-BY" sz="1000" dirty="0">
+                <a:solidFill>
+                  <a:schemeClr val="bg1"/>
+                </a:solidFill>
+                <a:latin typeface="Courier New" pitchFamily="49" charset="0"/>
+                <a:ea typeface="Calibri" pitchFamily="34" charset="0"/>
+                <a:cs typeface="Courier New" pitchFamily="49" charset="0"/>
+              </a:rPr>
+              <a:t>            sortList["val2"] = 80;</a:t>
+            </a:r>
+            <a:endParaRPr lang="be-BY" sz="1000" dirty="0">
+              <a:solidFill>
+                <a:schemeClr val="bg1"/>
+              </a:solidFill>
+              <a:ea typeface="Calibri" pitchFamily="34" charset="0"/>
+              <a:cs typeface="Courier New" pitchFamily="49" charset="0"/>
+            </a:endParaRPr>
+          </a:p>
+          <a:p>
+            <a:pPr eaLnBrk="0" hangingPunct="0">
+              <a:defRPr/>
+            </a:pPr>
+            <a:r>
+              <a:rPr lang="be-BY" sz="1000" dirty="0">
+                <a:solidFill>
+                  <a:schemeClr val="bg1"/>
+                </a:solidFill>
+                <a:latin typeface="Courier New" pitchFamily="49" charset="0"/>
+                <a:ea typeface="Calibri" pitchFamily="34" charset="0"/>
+                <a:cs typeface="Courier New" pitchFamily="49" charset="0"/>
+              </a:rPr>
+              <a:t>            sortList["val3"] = 120;</a:t>
+            </a:r>
+            <a:endParaRPr lang="be-BY" sz="1000" dirty="0">
+              <a:solidFill>
+                <a:schemeClr val="bg1"/>
+              </a:solidFill>
+              <a:ea typeface="Calibri" pitchFamily="34" charset="0"/>
+              <a:cs typeface="Courier New" pitchFamily="49" charset="0"/>
+            </a:endParaRPr>
+          </a:p>
+          <a:p>
+            <a:pPr eaLnBrk="0" hangingPunct="0">
+              <a:defRPr/>
+            </a:pPr>
+            <a:r>
+              <a:rPr lang="be-BY" sz="1000" dirty="0">
+                <a:solidFill>
+                  <a:schemeClr val="bg1"/>
+                </a:solidFill>
+                <a:latin typeface="Courier New" pitchFamily="49" charset="0"/>
+                <a:ea typeface="Calibri" pitchFamily="34" charset="0"/>
+                <a:cs typeface="Courier New" pitchFamily="49" charset="0"/>
+              </a:rPr>
+              <a:t>            foreach (KeyValuePair&lt;string, int&gt; val in sortList)</a:t>
+            </a:r>
+            <a:r>
+              <a:rPr lang="en-US" sz="1000" dirty="0">
+                <a:solidFill>
+                  <a:schemeClr val="bg1"/>
+                </a:solidFill>
+                <a:latin typeface="Courier New" pitchFamily="49" charset="0"/>
+                <a:ea typeface="Calibri" pitchFamily="34" charset="0"/>
+                <a:cs typeface="Courier New" pitchFamily="49" charset="0"/>
+              </a:rPr>
+              <a:t> </a:t>
+            </a:r>
+            <a:r>
+              <a:rPr lang="ru-RU" sz="1000" dirty="0">
+                <a:solidFill>
+                  <a:schemeClr val="bg1"/>
+                </a:solidFill>
+                <a:latin typeface="Courier New" pitchFamily="49" charset="0"/>
+                <a:ea typeface="Calibri" pitchFamily="34" charset="0"/>
+                <a:cs typeface="Courier New" pitchFamily="49" charset="0"/>
+              </a:rPr>
+              <a:t>//</a:t>
+            </a:r>
+            <a:r>
+              <a:rPr lang="be-BY" sz="1000" dirty="0">
+                <a:solidFill>
+                  <a:schemeClr val="bg1"/>
+                </a:solidFill>
+                <a:latin typeface="Courier New" pitchFamily="49" charset="0"/>
+                <a:ea typeface="Calibri" pitchFamily="34" charset="0"/>
+                <a:cs typeface="Courier New" pitchFamily="49" charset="0"/>
+              </a:rPr>
+              <a:t> KeyValuePair</a:t>
+            </a:r>
+            <a:r>
+              <a:rPr lang="en-US" sz="1000" dirty="0">
+                <a:solidFill>
+                  <a:schemeClr val="bg1"/>
+                </a:solidFill>
+                <a:latin typeface="Courier New" pitchFamily="49" charset="0"/>
+                <a:ea typeface="Calibri" pitchFamily="34" charset="0"/>
+                <a:cs typeface="Courier New" pitchFamily="49" charset="0"/>
+              </a:rPr>
+              <a:t> – </a:t>
+            </a:r>
+            <a:r>
+              <a:rPr lang="ru-RU" sz="1000" dirty="0">
+                <a:solidFill>
+                  <a:schemeClr val="bg1"/>
+                </a:solidFill>
+                <a:latin typeface="Courier New" pitchFamily="49" charset="0"/>
+                <a:ea typeface="Calibri" pitchFamily="34" charset="0"/>
+                <a:cs typeface="Courier New" pitchFamily="49" charset="0"/>
+              </a:rPr>
+              <a:t>элемент списка</a:t>
+            </a:r>
+            <a:endParaRPr lang="be-BY" sz="1000" dirty="0">
+              <a:solidFill>
+                <a:schemeClr val="bg1"/>
+              </a:solidFill>
+              <a:ea typeface="Calibri" pitchFamily="34" charset="0"/>
+              <a:cs typeface="Courier New" pitchFamily="49" charset="0"/>
+            </a:endParaRPr>
+          </a:p>
+          <a:p>
+            <a:pPr eaLnBrk="0" hangingPunct="0">
+              <a:defRPr/>
+            </a:pPr>
+            <a:r>
+              <a:rPr lang="be-BY" sz="1000" dirty="0">
+                <a:solidFill>
+                  <a:schemeClr val="bg1"/>
+                </a:solidFill>
+                <a:latin typeface="Courier New" pitchFamily="49" charset="0"/>
+                <a:ea typeface="Calibri" pitchFamily="34" charset="0"/>
+                <a:cs typeface="Courier New" pitchFamily="49" charset="0"/>
+              </a:rPr>
+              <a:t>                Console.WriteLine(val);</a:t>
+            </a:r>
+            <a:endParaRPr lang="be-BY" sz="1000" dirty="0">
+              <a:solidFill>
+                <a:schemeClr val="bg1"/>
+              </a:solidFill>
+              <a:ea typeface="Calibri" pitchFamily="34" charset="0"/>
+              <a:cs typeface="Courier New" pitchFamily="49" charset="0"/>
+            </a:endParaRPr>
+          </a:p>
+          <a:p>
+            <a:pPr eaLnBrk="0" hangingPunct="0">
+              <a:defRPr/>
+            </a:pPr>
+            <a:r>
+              <a:rPr lang="be-BY" sz="1000" dirty="0">
+                <a:solidFill>
+                  <a:schemeClr val="bg1"/>
+                </a:solidFill>
+                <a:latin typeface="Courier New" pitchFamily="49" charset="0"/>
+                <a:ea typeface="Calibri" pitchFamily="34" charset="0"/>
+                <a:cs typeface="Courier New" pitchFamily="49" charset="0"/>
+              </a:rPr>
+              <a:t>            Console.WriteLine("val2 in sortedList = {0}",sortList["val2"]);</a:t>
+            </a:r>
+            <a:endParaRPr lang="be-BY" sz="1000" dirty="0">
+              <a:solidFill>
+                <a:schemeClr val="bg1"/>
+              </a:solidFill>
+              <a:ea typeface="Calibri" pitchFamily="34" charset="0"/>
+              <a:cs typeface="Courier New" pitchFamily="49" charset="0"/>
+            </a:endParaRPr>
+          </a:p>
+          <a:p>
+            <a:pPr eaLnBrk="0" hangingPunct="0">
+              <a:defRPr/>
+            </a:pPr>
+            <a:endParaRPr lang="be-BY" sz="1000" dirty="0">
+              <a:solidFill>
+                <a:schemeClr val="bg1"/>
+              </a:solidFill>
+              <a:latin typeface="Courier New" pitchFamily="49" charset="0"/>
+              <a:ea typeface="Calibri" pitchFamily="34" charset="0"/>
+              <a:cs typeface="Courier New" pitchFamily="49" charset="0"/>
+            </a:endParaRPr>
+          </a:p>
+          <a:p>
+            <a:pPr eaLnBrk="0" hangingPunct="0">
+              <a:defRPr/>
+            </a:pPr>
+            <a:r>
+              <a:rPr lang="be-BY" sz="1000" dirty="0">
+                <a:solidFill>
+                  <a:schemeClr val="bg1"/>
+                </a:solidFill>
+                <a:latin typeface="Courier New" pitchFamily="49" charset="0"/>
+                <a:ea typeface="Calibri" pitchFamily="34" charset="0"/>
+                <a:cs typeface="Courier New" pitchFamily="49" charset="0"/>
+              </a:rPr>
+              <a:t>            Console.WriteLine("\nStack : ");	//Стек – работает по принципу </a:t>
+            </a:r>
+            <a:r>
+              <a:rPr lang="en-US" sz="1000" dirty="0">
+                <a:solidFill>
+                  <a:schemeClr val="bg1"/>
+                </a:solidFill>
+                <a:latin typeface="Courier New" pitchFamily="49" charset="0"/>
+                <a:ea typeface="Calibri" pitchFamily="34" charset="0"/>
+                <a:cs typeface="Courier New" pitchFamily="49" charset="0"/>
+              </a:rPr>
+              <a:t>FIFO (First input first output)</a:t>
+            </a:r>
+            <a:endParaRPr lang="be-BY" sz="1000" dirty="0">
+              <a:solidFill>
+                <a:schemeClr val="bg1"/>
+              </a:solidFill>
+              <a:ea typeface="Calibri" pitchFamily="34" charset="0"/>
+              <a:cs typeface="Courier New" pitchFamily="49" charset="0"/>
+            </a:endParaRPr>
+          </a:p>
+          <a:p>
+            <a:pPr eaLnBrk="0" hangingPunct="0">
+              <a:defRPr/>
+            </a:pPr>
+            <a:r>
+              <a:rPr lang="be-BY" sz="1000" dirty="0">
+                <a:solidFill>
+                  <a:schemeClr val="bg1"/>
+                </a:solidFill>
+                <a:latin typeface="Courier New" pitchFamily="49" charset="0"/>
+                <a:ea typeface="Calibri" pitchFamily="34" charset="0"/>
+                <a:cs typeface="Courier New" pitchFamily="49" charset="0"/>
+              </a:rPr>
+              <a:t>            Stack&lt;string&gt; stack = new Stack&lt;string&gt;();</a:t>
+            </a:r>
+            <a:endParaRPr lang="be-BY" sz="1000" dirty="0">
+              <a:solidFill>
+                <a:schemeClr val="bg1"/>
+              </a:solidFill>
+              <a:ea typeface="Calibri" pitchFamily="34" charset="0"/>
+              <a:cs typeface="Courier New" pitchFamily="49" charset="0"/>
+            </a:endParaRPr>
+          </a:p>
+          <a:p>
+            <a:pPr eaLnBrk="0" hangingPunct="0">
+              <a:defRPr/>
+            </a:pPr>
+            <a:r>
+              <a:rPr lang="be-BY" sz="1000" dirty="0">
+                <a:solidFill>
+                  <a:schemeClr val="bg1"/>
+                </a:solidFill>
+                <a:latin typeface="Courier New" pitchFamily="49" charset="0"/>
+                <a:ea typeface="Calibri" pitchFamily="34" charset="0"/>
+                <a:cs typeface="Courier New" pitchFamily="49" charset="0"/>
+              </a:rPr>
+              <a:t>            stack.Push("is...");</a:t>
+            </a:r>
+            <a:r>
+              <a:rPr lang="en-US" sz="1000" dirty="0">
+                <a:solidFill>
+                  <a:schemeClr val="bg1"/>
+                </a:solidFill>
+                <a:latin typeface="Courier New" pitchFamily="49" charset="0"/>
+                <a:ea typeface="Calibri" pitchFamily="34" charset="0"/>
+                <a:cs typeface="Courier New" pitchFamily="49" charset="0"/>
+              </a:rPr>
+              <a:t>	</a:t>
+            </a:r>
+            <a:r>
+              <a:rPr lang="ru-RU" sz="1000" dirty="0">
+                <a:solidFill>
+                  <a:schemeClr val="bg1"/>
+                </a:solidFill>
+                <a:latin typeface="Courier New" pitchFamily="49" charset="0"/>
+                <a:ea typeface="Calibri" pitchFamily="34" charset="0"/>
+                <a:cs typeface="Courier New" pitchFamily="49" charset="0"/>
+              </a:rPr>
+              <a:t>	</a:t>
+            </a:r>
+            <a:r>
+              <a:rPr lang="en-US" sz="1000" dirty="0">
+                <a:solidFill>
+                  <a:schemeClr val="bg1"/>
+                </a:solidFill>
+                <a:latin typeface="Courier New" pitchFamily="49" charset="0"/>
+                <a:ea typeface="Calibri" pitchFamily="34" charset="0"/>
+                <a:cs typeface="Courier New" pitchFamily="49" charset="0"/>
+              </a:rPr>
+              <a:t>//</a:t>
+            </a:r>
+            <a:r>
+              <a:rPr lang="ru-RU" sz="1000" dirty="0">
+                <a:solidFill>
+                  <a:schemeClr val="bg1"/>
+                </a:solidFill>
+                <a:latin typeface="Courier New" pitchFamily="49" charset="0"/>
+                <a:ea typeface="Calibri" pitchFamily="34" charset="0"/>
+                <a:cs typeface="Courier New" pitchFamily="49" charset="0"/>
+              </a:rPr>
+              <a:t>Помещает строку на вершину стека</a:t>
+            </a:r>
+            <a:endParaRPr lang="be-BY" sz="1000" dirty="0">
+              <a:solidFill>
+                <a:schemeClr val="bg1"/>
+              </a:solidFill>
+              <a:ea typeface="Calibri" pitchFamily="34" charset="0"/>
+              <a:cs typeface="Courier New" pitchFamily="49" charset="0"/>
+            </a:endParaRPr>
+          </a:p>
+          <a:p>
+            <a:pPr eaLnBrk="0" hangingPunct="0">
+              <a:defRPr/>
+            </a:pPr>
+            <a:r>
+              <a:rPr lang="be-BY" sz="1000" dirty="0">
+                <a:solidFill>
+                  <a:schemeClr val="bg1"/>
+                </a:solidFill>
+                <a:latin typeface="Courier New" pitchFamily="49" charset="0"/>
+                <a:ea typeface="Calibri" pitchFamily="34" charset="0"/>
+                <a:cs typeface="Courier New" pitchFamily="49" charset="0"/>
+              </a:rPr>
+              <a:t>            stack.Push("name ");</a:t>
+            </a:r>
+            <a:endParaRPr lang="be-BY" sz="1000" dirty="0">
+              <a:solidFill>
+                <a:schemeClr val="bg1"/>
+              </a:solidFill>
+              <a:ea typeface="Calibri" pitchFamily="34" charset="0"/>
+              <a:cs typeface="Courier New" pitchFamily="49" charset="0"/>
+            </a:endParaRPr>
+          </a:p>
+          <a:p>
+            <a:pPr eaLnBrk="0" hangingPunct="0">
+              <a:defRPr/>
+            </a:pPr>
+            <a:r>
+              <a:rPr lang="be-BY" sz="1000" dirty="0">
+                <a:solidFill>
+                  <a:schemeClr val="bg1"/>
+                </a:solidFill>
+                <a:latin typeface="Courier New" pitchFamily="49" charset="0"/>
+                <a:ea typeface="Calibri" pitchFamily="34" charset="0"/>
+                <a:cs typeface="Courier New" pitchFamily="49" charset="0"/>
+              </a:rPr>
+              <a:t>            stack.Push("My ");</a:t>
+            </a:r>
+            <a:endParaRPr lang="be-BY" sz="1000" dirty="0">
+              <a:solidFill>
+                <a:schemeClr val="bg1"/>
+              </a:solidFill>
+              <a:ea typeface="Calibri" pitchFamily="34" charset="0"/>
+              <a:cs typeface="Courier New" pitchFamily="49" charset="0"/>
+            </a:endParaRPr>
+          </a:p>
+          <a:p>
+            <a:pPr eaLnBrk="0" hangingPunct="0">
+              <a:defRPr/>
+            </a:pPr>
+            <a:r>
+              <a:rPr lang="be-BY" sz="1000" dirty="0">
+                <a:solidFill>
+                  <a:schemeClr val="bg1"/>
+                </a:solidFill>
+                <a:latin typeface="Courier New" pitchFamily="49" charset="0"/>
+                <a:ea typeface="Calibri" pitchFamily="34" charset="0"/>
+                <a:cs typeface="Courier New" pitchFamily="49" charset="0"/>
+              </a:rPr>
+              <a:t>            for (int i = 0; i &lt; 3; i++)</a:t>
+            </a:r>
+            <a:endParaRPr lang="be-BY" sz="1000" dirty="0">
+              <a:solidFill>
+                <a:schemeClr val="bg1"/>
+              </a:solidFill>
+              <a:ea typeface="Calibri" pitchFamily="34" charset="0"/>
+              <a:cs typeface="Courier New" pitchFamily="49" charset="0"/>
+            </a:endParaRPr>
+          </a:p>
+          <a:p>
+            <a:pPr eaLnBrk="0" hangingPunct="0">
+              <a:defRPr/>
+            </a:pPr>
+            <a:r>
+              <a:rPr lang="be-BY" sz="1000" dirty="0">
+                <a:solidFill>
+                  <a:schemeClr val="bg1"/>
+                </a:solidFill>
+                <a:latin typeface="Courier New" pitchFamily="49" charset="0"/>
+                <a:ea typeface="Calibri" pitchFamily="34" charset="0"/>
+                <a:cs typeface="Courier New" pitchFamily="49" charset="0"/>
+              </a:rPr>
+              <a:t>                Console.Write(stack.Pop());	//Снимаем строки с вершаны стека</a:t>
+            </a:r>
+            <a:endParaRPr lang="be-BY" sz="1000" dirty="0">
+              <a:solidFill>
+                <a:schemeClr val="bg1"/>
+              </a:solidFill>
+              <a:ea typeface="Calibri" pitchFamily="34" charset="0"/>
+              <a:cs typeface="Courier New" pitchFamily="49" charset="0"/>
+            </a:endParaRPr>
+          </a:p>
+          <a:p>
+            <a:pPr eaLnBrk="0" hangingPunct="0">
+              <a:defRPr/>
+            </a:pPr>
+            <a:r>
+              <a:rPr lang="be-BY" sz="1000" dirty="0">
+                <a:solidFill>
+                  <a:schemeClr val="bg1"/>
+                </a:solidFill>
+                <a:latin typeface="Courier New" pitchFamily="49" charset="0"/>
+                <a:ea typeface="Calibri" pitchFamily="34" charset="0"/>
+                <a:cs typeface="Courier New" pitchFamily="49" charset="0"/>
+              </a:rPr>
+              <a:t>            Console.WriteLine("");</a:t>
+            </a:r>
+            <a:endParaRPr lang="be-BY" sz="1000" dirty="0">
+              <a:solidFill>
+                <a:schemeClr val="bg1"/>
+              </a:solidFill>
+              <a:ea typeface="Calibri" pitchFamily="34" charset="0"/>
+              <a:cs typeface="Courier New" pitchFamily="49" charset="0"/>
+            </a:endParaRPr>
+          </a:p>
+          <a:p>
+            <a:pPr eaLnBrk="0" hangingPunct="0">
+              <a:defRPr/>
+            </a:pPr>
+            <a:r>
+              <a:rPr lang="be-BY" sz="1000" dirty="0">
+                <a:solidFill>
+                  <a:schemeClr val="bg1"/>
+                </a:solidFill>
+                <a:latin typeface="Courier New" pitchFamily="49" charset="0"/>
+                <a:ea typeface="Calibri" pitchFamily="34" charset="0"/>
+                <a:cs typeface="Courier New" pitchFamily="49" charset="0"/>
+              </a:rPr>
+              <a:t>        }</a:t>
+            </a:r>
+            <a:endParaRPr lang="be-BY" sz="1000" dirty="0">
+              <a:solidFill>
+                <a:schemeClr val="bg1"/>
+              </a:solidFill>
+              <a:ea typeface="Calibri" pitchFamily="34" charset="0"/>
+              <a:cs typeface="Courier New" pitchFamily="49" charset="0"/>
+            </a:endParaRPr>
+          </a:p>
+          <a:p>
+            <a:pPr eaLnBrk="0" hangingPunct="0">
+              <a:defRPr/>
+            </a:pPr>
+            <a:r>
+              <a:rPr lang="be-BY" sz="1000" dirty="0">
+                <a:solidFill>
+                  <a:schemeClr val="bg1"/>
+                </a:solidFill>
+                <a:latin typeface="Courier New" pitchFamily="49" charset="0"/>
+                <a:ea typeface="Calibri" pitchFamily="34" charset="0"/>
+                <a:cs typeface="Courier New" pitchFamily="49" charset="0"/>
+              </a:rPr>
+              <a:t>    }</a:t>
+            </a:r>
+            <a:endParaRPr lang="be-BY" sz="1000" dirty="0">
+              <a:solidFill>
+                <a:schemeClr val="bg1"/>
+              </a:solidFill>
+              <a:ea typeface="Calibri" pitchFamily="34" charset="0"/>
+              <a:cs typeface="Courier New" pitchFamily="49" charset="0"/>
+            </a:endParaRPr>
+          </a:p>
+        </p:txBody>
+      </p:sp>
+    </p:spTree>
+    <p:extLst>
+      <p:ext uri="{BB962C8B-B14F-4D97-AF65-F5344CB8AC3E}">
+        <p14:creationId xmlns:p14="http://schemas.microsoft.com/office/powerpoint/2010/main" val="2364817515"/>
+      </p:ext>
+    </p:extLst>
+  </p:cSld>
+  <p:clrMapOvr>
+    <a:masterClrMapping/>
+  </p:clrMapOvr>
+  <p:timing>
+    <p:tnLst>
+      <p:par>
+        <p:cTn id="1" dur="indefinite" restart="never" nodeType="tmRoot"/>
+      </p:par>
+    </p:tnLst>
+  </p:timing>
+</p:sld>
+</file>
+
+<file path=ppt/slides/slide24.xml><?xml version="1.0" encoding="utf-8"?>
+<p:sld xmlns:a="http://schemas.openxmlformats.org/drawingml/2006/main" xmlns:r="http://schemas.openxmlformats.org/officeDocument/2006/relationships" xmlns:p="http://schemas.openxmlformats.org/presentationml/2006/main">
+  <p:cSld>
+    <p:bg>
+      <p:bgPr>
+        <a:blipFill dpi="0" rotWithShape="1">
+          <a:blip r:embed="rId2">
+            <a:lum/>
+          </a:blip>
+          <a:srcRect/>
+          <a:stretch>
+            <a:fillRect/>
+          </a:stretch>
+        </a:blipFill>
+        <a:effectLst/>
+      </p:bgPr>
+    </p:bg>
+    <p:spTree>
+      <p:nvGrpSpPr>
+        <p:cNvPr id="1" name=""/>
+        <p:cNvGrpSpPr/>
+        <p:nvPr/>
+      </p:nvGrpSpPr>
+      <p:grpSpPr>
+        <a:xfrm>
+          <a:off x="0" y="0"/>
+          <a:ext cx="0" cy="0"/>
+          <a:chOff x="0" y="0"/>
+          <a:chExt cx="0" cy="0"/>
+        </a:xfrm>
+      </p:grpSpPr>
+      <p:sp>
+        <p:nvSpPr>
+          <p:cNvPr id="22530" name="Rectangle 1"/>
+          <p:cNvSpPr>
+            <a:spLocks noChangeArrowheads="1"/>
+          </p:cNvSpPr>
+          <p:nvPr/>
+        </p:nvSpPr>
+        <p:spPr bwMode="auto">
+          <a:xfrm>
             <a:off x="381000" y="-76051"/>
             <a:ext cx="8305800" cy="461665"/>
           </a:xfrm>
@@ -17363,7 +17979,7 @@
 </p:sld>
 </file>
 
-<file path=ppt/slides/slide24.xml><?xml version="1.0" encoding="utf-8"?>
+<file path=ppt/slides/slide25.xml><?xml version="1.0" encoding="utf-8"?>
 <p:sld xmlns:a="http://schemas.openxmlformats.org/drawingml/2006/main" xmlns:r="http://schemas.openxmlformats.org/officeDocument/2006/relationships" xmlns:p="http://schemas.openxmlformats.org/presentationml/2006/main">
   <p:cSld>
     <p:bg>

</xml_diff>

<commit_message>
Updated lesson #2 presentation
</commit_message>
<xml_diff>
--- a/Presentation/lesson-02.pptx
+++ b/Presentation/lesson-02.pptx
@@ -17,19 +17,20 @@
     <p:sldId id="266" r:id="rId11"/>
     <p:sldId id="267" r:id="rId12"/>
     <p:sldId id="268" r:id="rId13"/>
-    <p:sldId id="269" r:id="rId14"/>
-    <p:sldId id="270" r:id="rId15"/>
-    <p:sldId id="271" r:id="rId16"/>
-    <p:sldId id="272" r:id="rId17"/>
-    <p:sldId id="273" r:id="rId18"/>
-    <p:sldId id="274" r:id="rId19"/>
-    <p:sldId id="275" r:id="rId20"/>
-    <p:sldId id="276" r:id="rId21"/>
-    <p:sldId id="277" r:id="rId22"/>
-    <p:sldId id="278" r:id="rId23"/>
-    <p:sldId id="282" r:id="rId24"/>
-    <p:sldId id="281" r:id="rId25"/>
-    <p:sldId id="279" r:id="rId26"/>
+    <p:sldId id="283" r:id="rId14"/>
+    <p:sldId id="269" r:id="rId15"/>
+    <p:sldId id="270" r:id="rId16"/>
+    <p:sldId id="271" r:id="rId17"/>
+    <p:sldId id="272" r:id="rId18"/>
+    <p:sldId id="273" r:id="rId19"/>
+    <p:sldId id="274" r:id="rId20"/>
+    <p:sldId id="275" r:id="rId21"/>
+    <p:sldId id="276" r:id="rId22"/>
+    <p:sldId id="277" r:id="rId23"/>
+    <p:sldId id="278" r:id="rId24"/>
+    <p:sldId id="282" r:id="rId25"/>
+    <p:sldId id="281" r:id="rId26"/>
+    <p:sldId id="279" r:id="rId27"/>
   </p:sldIdLst>
   <p:sldSz cx="9144000" cy="6858000" type="screen4x3"/>
   <p:notesSz cx="6858000" cy="9144000"/>
@@ -312,7 +313,7 @@
           <a:p>
             <a:fld id="{8E6E6A2A-E9D3-4A0D-B04A-ABDD367A1E08}" type="datetimeFigureOut">
               <a:rPr lang="ru-RU" smtClean="0"/>
-              <a:t>22.02.2013</a:t>
+              <a:t>14.03.2013</a:t>
             </a:fld>
             <a:endParaRPr lang="ru-RU"/>
           </a:p>
@@ -482,7 +483,7 @@
           <a:p>
             <a:fld id="{8E6E6A2A-E9D3-4A0D-B04A-ABDD367A1E08}" type="datetimeFigureOut">
               <a:rPr lang="ru-RU" smtClean="0"/>
-              <a:t>22.02.2013</a:t>
+              <a:t>14.03.2013</a:t>
             </a:fld>
             <a:endParaRPr lang="ru-RU"/>
           </a:p>
@@ -662,7 +663,7 @@
           <a:p>
             <a:fld id="{8E6E6A2A-E9D3-4A0D-B04A-ABDD367A1E08}" type="datetimeFigureOut">
               <a:rPr lang="ru-RU" smtClean="0"/>
-              <a:t>22.02.2013</a:t>
+              <a:t>14.03.2013</a:t>
             </a:fld>
             <a:endParaRPr lang="ru-RU"/>
           </a:p>
@@ -832,7 +833,7 @@
           <a:p>
             <a:fld id="{8E6E6A2A-E9D3-4A0D-B04A-ABDD367A1E08}" type="datetimeFigureOut">
               <a:rPr lang="ru-RU" smtClean="0"/>
-              <a:t>22.02.2013</a:t>
+              <a:t>14.03.2013</a:t>
             </a:fld>
             <a:endParaRPr lang="ru-RU"/>
           </a:p>
@@ -1078,7 +1079,7 @@
           <a:p>
             <a:fld id="{8E6E6A2A-E9D3-4A0D-B04A-ABDD367A1E08}" type="datetimeFigureOut">
               <a:rPr lang="ru-RU" smtClean="0"/>
-              <a:t>22.02.2013</a:t>
+              <a:t>14.03.2013</a:t>
             </a:fld>
             <a:endParaRPr lang="ru-RU"/>
           </a:p>
@@ -1366,7 +1367,7 @@
           <a:p>
             <a:fld id="{8E6E6A2A-E9D3-4A0D-B04A-ABDD367A1E08}" type="datetimeFigureOut">
               <a:rPr lang="ru-RU" smtClean="0"/>
-              <a:t>22.02.2013</a:t>
+              <a:t>14.03.2013</a:t>
             </a:fld>
             <a:endParaRPr lang="ru-RU"/>
           </a:p>
@@ -1788,7 +1789,7 @@
           <a:p>
             <a:fld id="{8E6E6A2A-E9D3-4A0D-B04A-ABDD367A1E08}" type="datetimeFigureOut">
               <a:rPr lang="ru-RU" smtClean="0"/>
-              <a:t>22.02.2013</a:t>
+              <a:t>14.03.2013</a:t>
             </a:fld>
             <a:endParaRPr lang="ru-RU"/>
           </a:p>
@@ -1906,7 +1907,7 @@
           <a:p>
             <a:fld id="{8E6E6A2A-E9D3-4A0D-B04A-ABDD367A1E08}" type="datetimeFigureOut">
               <a:rPr lang="ru-RU" smtClean="0"/>
-              <a:t>22.02.2013</a:t>
+              <a:t>14.03.2013</a:t>
             </a:fld>
             <a:endParaRPr lang="ru-RU"/>
           </a:p>
@@ -2001,7 +2002,7 @@
           <a:p>
             <a:fld id="{8E6E6A2A-E9D3-4A0D-B04A-ABDD367A1E08}" type="datetimeFigureOut">
               <a:rPr lang="ru-RU" smtClean="0"/>
-              <a:t>22.02.2013</a:t>
+              <a:t>14.03.2013</a:t>
             </a:fld>
             <a:endParaRPr lang="ru-RU"/>
           </a:p>
@@ -2278,7 +2279,7 @@
           <a:p>
             <a:fld id="{8E6E6A2A-E9D3-4A0D-B04A-ABDD367A1E08}" type="datetimeFigureOut">
               <a:rPr lang="ru-RU" smtClean="0"/>
-              <a:t>22.02.2013</a:t>
+              <a:t>14.03.2013</a:t>
             </a:fld>
             <a:endParaRPr lang="ru-RU"/>
           </a:p>
@@ -2531,7 +2532,7 @@
           <a:p>
             <a:fld id="{8E6E6A2A-E9D3-4A0D-B04A-ABDD367A1E08}" type="datetimeFigureOut">
               <a:rPr lang="ru-RU" smtClean="0"/>
-              <a:t>22.02.2013</a:t>
+              <a:t>14.03.2013</a:t>
             </a:fld>
             <a:endParaRPr lang="ru-RU"/>
           </a:p>
@@ -2744,7 +2745,7 @@
           <a:p>
             <a:fld id="{8E6E6A2A-E9D3-4A0D-B04A-ABDD367A1E08}" type="datetimeFigureOut">
               <a:rPr lang="ru-RU" smtClean="0"/>
-              <a:t>22.02.2013</a:t>
+              <a:t>14.03.2013</a:t>
             </a:fld>
             <a:endParaRPr lang="ru-RU"/>
           </a:p>
@@ -6611,6 +6612,126 @@
       </p:grpSpPr>
       <p:sp>
         <p:nvSpPr>
+          <p:cNvPr id="12290" name="Rectangle 1"/>
+          <p:cNvSpPr>
+            <a:spLocks noChangeArrowheads="1"/>
+          </p:cNvSpPr>
+          <p:nvPr/>
+        </p:nvSpPr>
+        <p:spPr bwMode="auto">
+          <a:xfrm>
+            <a:off x="381000" y="0"/>
+            <a:ext cx="8305800" cy="461963"/>
+          </a:xfrm>
+          <a:prstGeom prst="rect">
+            <a:avLst/>
+          </a:prstGeom>
+          <a:noFill/>
+          <a:ln>
+            <a:noFill/>
+          </a:ln>
+          <a:extLst>
+            <a:ext uri="{909E8E84-426E-40DD-AFC4-6F175D3DCCD1}">
+              <a14:hiddenFill xmlns:a14="http://schemas.microsoft.com/office/drawing/2010/main">
+                <a:solidFill>
+                  <a:srgbClr val="FFFFFF"/>
+                </a:solidFill>
+              </a14:hiddenFill>
+            </a:ext>
+            <a:ext uri="{91240B29-F687-4F45-9708-019B960494DF}">
+              <a14:hiddenLine xmlns:a14="http://schemas.microsoft.com/office/drawing/2010/main" w="9525">
+                <a:solidFill>
+                  <a:srgbClr val="000000"/>
+                </a:solidFill>
+                <a:miter lim="800000"/>
+                <a:headEnd/>
+                <a:tailEnd/>
+              </a14:hiddenLine>
+            </a:ext>
+          </a:extLst>
+        </p:spPr>
+        <p:txBody>
+          <a:bodyPr anchor="ctr">
+            <a:spAutoFit/>
+          </a:bodyPr>
+          <a:lstStyle/>
+          <a:p>
+            <a:pPr algn="ctr">
+              <a:tabLst>
+                <a:tab pos="457200" algn="l"/>
+              </a:tabLst>
+            </a:pPr>
+            <a:r>
+              <a:rPr lang="ru-RU" sz="2400" b="1" dirty="0" smtClean="0">
+                <a:solidFill>
+                  <a:schemeClr val="bg1"/>
+                </a:solidFill>
+                <a:cs typeface="Times New Roman" pitchFamily="18" charset="0"/>
+              </a:rPr>
+              <a:t>Виртуальные методы и конструктор</a:t>
+            </a:r>
+            <a:endParaRPr lang="en-US" sz="2400" dirty="0">
+              <a:solidFill>
+                <a:schemeClr val="bg1"/>
+              </a:solidFill>
+              <a:cs typeface="Times New Roman" pitchFamily="18" charset="0"/>
+            </a:endParaRPr>
+          </a:p>
+        </p:txBody>
+      </p:sp>
+    </p:spTree>
+    <p:extLst>
+      <p:ext uri="{BB962C8B-B14F-4D97-AF65-F5344CB8AC3E}">
+        <p14:creationId xmlns:p14="http://schemas.microsoft.com/office/powerpoint/2010/main" val="906402801"/>
+      </p:ext>
+    </p:extLst>
+  </p:cSld>
+  <p:clrMapOvr>
+    <a:masterClrMapping/>
+  </p:clrMapOvr>
+  <p:timing>
+    <p:tnLst>
+      <p:par>
+        <p:cTn id="1" dur="indefinite" restart="never" nodeType="tmRoot"/>
+      </p:par>
+    </p:tnLst>
+  </p:timing>
+</p:sld>
+</file>
+
+<file path=ppt/slides/slide14.xml><?xml version="1.0" encoding="utf-8"?>
+<p:sld xmlns:a="http://schemas.openxmlformats.org/drawingml/2006/main" xmlns:r="http://schemas.openxmlformats.org/officeDocument/2006/relationships" xmlns:p="http://schemas.openxmlformats.org/presentationml/2006/main">
+  <p:cSld>
+    <p:bg>
+      <p:bgPr>
+        <a:blipFill dpi="0" rotWithShape="1">
+          <a:blip r:embed="rId2">
+            <a:lum/>
+          </a:blip>
+          <a:srcRect/>
+          <a:stretch>
+            <a:fillRect/>
+          </a:stretch>
+        </a:blipFill>
+        <a:effectLst/>
+      </p:bgPr>
+    </p:bg>
+    <p:spTree>
+      <p:nvGrpSpPr>
+        <p:cNvPr id="1" name=""/>
+        <p:cNvGrpSpPr/>
+        <p:nvPr/>
+      </p:nvGrpSpPr>
+      <p:grpSpPr>
+        <a:xfrm>
+          <a:off x="0" y="0"/>
+          <a:ext cx="0" cy="0"/>
+          <a:chOff x="0" y="0"/>
+          <a:chExt cx="0" cy="0"/>
+        </a:xfrm>
+      </p:grpSpPr>
+      <p:sp>
+        <p:nvSpPr>
           <p:cNvPr id="13314" name="Rectangle 1"/>
           <p:cNvSpPr>
             <a:spLocks noChangeArrowheads="1"/>
@@ -7685,7 +7806,7 @@
 </p:sld>
 </file>
 
-<file path=ppt/slides/slide14.xml><?xml version="1.0" encoding="utf-8"?>
+<file path=ppt/slides/slide15.xml><?xml version="1.0" encoding="utf-8"?>
 <p:sld xmlns:a="http://schemas.openxmlformats.org/drawingml/2006/main" xmlns:r="http://schemas.openxmlformats.org/officeDocument/2006/relationships" xmlns:p="http://schemas.openxmlformats.org/presentationml/2006/main">
   <p:cSld>
     <p:bg>
@@ -8820,7 +8941,7 @@
 </p:sld>
 </file>
 
-<file path=ppt/slides/slide15.xml><?xml version="1.0" encoding="utf-8"?>
+<file path=ppt/slides/slide16.xml><?xml version="1.0" encoding="utf-8"?>
 <p:sld xmlns:a="http://schemas.openxmlformats.org/drawingml/2006/main" xmlns:r="http://schemas.openxmlformats.org/officeDocument/2006/relationships" xmlns:p="http://schemas.openxmlformats.org/presentationml/2006/main">
   <p:cSld>
     <p:bg>
@@ -9752,7 +9873,7 @@
 </p:sld>
 </file>
 
-<file path=ppt/slides/slide16.xml><?xml version="1.0" encoding="utf-8"?>
+<file path=ppt/slides/slide17.xml><?xml version="1.0" encoding="utf-8"?>
 <p:sld xmlns:a="http://schemas.openxmlformats.org/drawingml/2006/main" xmlns:r="http://schemas.openxmlformats.org/officeDocument/2006/relationships" xmlns:p="http://schemas.openxmlformats.org/presentationml/2006/main">
   <p:cSld>
     <p:bg>
@@ -11125,7 +11246,7 @@
 </p:sld>
 </file>
 
-<file path=ppt/slides/slide17.xml><?xml version="1.0" encoding="utf-8"?>
+<file path=ppt/slides/slide18.xml><?xml version="1.0" encoding="utf-8"?>
 <p:sld xmlns:a="http://schemas.openxmlformats.org/drawingml/2006/main" xmlns:r="http://schemas.openxmlformats.org/officeDocument/2006/relationships" xmlns:p="http://schemas.openxmlformats.org/presentationml/2006/main">
   <p:cSld>
     <p:bg>
@@ -12298,7 +12419,7 @@
 </p:sld>
 </file>
 
-<file path=ppt/slides/slide18.xml><?xml version="1.0" encoding="utf-8"?>
+<file path=ppt/slides/slide19.xml><?xml version="1.0" encoding="utf-8"?>
 <p:sld xmlns:a="http://schemas.openxmlformats.org/drawingml/2006/main" xmlns:r="http://schemas.openxmlformats.org/officeDocument/2006/relationships" xmlns:p="http://schemas.openxmlformats.org/presentationml/2006/main">
   <p:cSld>
     <p:bg>
@@ -13398,574 +13519,6 @@
     <p:extLst>
       <p:ext uri="{BB962C8B-B14F-4D97-AF65-F5344CB8AC3E}">
         <p14:creationId xmlns:p14="http://schemas.microsoft.com/office/powerpoint/2010/main" val="3537645717"/>
-      </p:ext>
-    </p:extLst>
-  </p:cSld>
-  <p:clrMapOvr>
-    <a:masterClrMapping/>
-  </p:clrMapOvr>
-  <p:timing>
-    <p:tnLst>
-      <p:par>
-        <p:cTn id="1" dur="indefinite" restart="never" nodeType="tmRoot"/>
-      </p:par>
-    </p:tnLst>
-  </p:timing>
-</p:sld>
-</file>
-
-<file path=ppt/slides/slide19.xml><?xml version="1.0" encoding="utf-8"?>
-<p:sld xmlns:a="http://schemas.openxmlformats.org/drawingml/2006/main" xmlns:r="http://schemas.openxmlformats.org/officeDocument/2006/relationships" xmlns:p="http://schemas.openxmlformats.org/presentationml/2006/main">
-  <p:cSld>
-    <p:bg>
-      <p:bgPr>
-        <a:blipFill dpi="0" rotWithShape="1">
-          <a:blip r:embed="rId2">
-            <a:lum/>
-          </a:blip>
-          <a:srcRect/>
-          <a:stretch>
-            <a:fillRect/>
-          </a:stretch>
-        </a:blipFill>
-        <a:effectLst/>
-      </p:bgPr>
-    </p:bg>
-    <p:spTree>
-      <p:nvGrpSpPr>
-        <p:cNvPr id="1" name=""/>
-        <p:cNvGrpSpPr/>
-        <p:nvPr/>
-      </p:nvGrpSpPr>
-      <p:grpSpPr>
-        <a:xfrm>
-          <a:off x="0" y="0"/>
-          <a:ext cx="0" cy="0"/>
-          <a:chOff x="0" y="0"/>
-          <a:chExt cx="0" cy="0"/>
-        </a:xfrm>
-      </p:grpSpPr>
-      <p:sp>
-        <p:nvSpPr>
-          <p:cNvPr id="19458" name="Rectangle 1"/>
-          <p:cNvSpPr>
-            <a:spLocks noChangeArrowheads="1"/>
-          </p:cNvSpPr>
-          <p:nvPr/>
-        </p:nvSpPr>
-        <p:spPr bwMode="auto">
-          <a:xfrm>
-            <a:off x="381000" y="-4763"/>
-            <a:ext cx="8305800" cy="461963"/>
-          </a:xfrm>
-          <a:prstGeom prst="rect">
-            <a:avLst/>
-          </a:prstGeom>
-          <a:noFill/>
-          <a:ln>
-            <a:noFill/>
-          </a:ln>
-          <a:extLst>
-            <a:ext uri="{909E8E84-426E-40DD-AFC4-6F175D3DCCD1}">
-              <a14:hiddenFill xmlns:a14="http://schemas.microsoft.com/office/drawing/2010/main">
-                <a:solidFill>
-                  <a:srgbClr val="FFFFFF"/>
-                </a:solidFill>
-              </a14:hiddenFill>
-            </a:ext>
-            <a:ext uri="{91240B29-F687-4F45-9708-019B960494DF}">
-              <a14:hiddenLine xmlns:a14="http://schemas.microsoft.com/office/drawing/2010/main" w="9525">
-                <a:solidFill>
-                  <a:srgbClr val="000000"/>
-                </a:solidFill>
-                <a:miter lim="800000"/>
-                <a:headEnd/>
-                <a:tailEnd/>
-              </a14:hiddenLine>
-            </a:ext>
-          </a:extLst>
-        </p:spPr>
-        <p:txBody>
-          <a:bodyPr anchor="ctr">
-            <a:spAutoFit/>
-          </a:bodyPr>
-          <a:lstStyle/>
-          <a:p>
-            <a:pPr algn="ctr">
-              <a:tabLst>
-                <a:tab pos="457200" algn="l"/>
-              </a:tabLst>
-            </a:pPr>
-            <a:r>
-              <a:rPr lang="ru-RU" sz="2400" b="1" dirty="0">
-                <a:solidFill>
-                  <a:schemeClr val="bg1"/>
-                </a:solidFill>
-                <a:cs typeface="Times New Roman" pitchFamily="18" charset="0"/>
-              </a:rPr>
-              <a:t>Интерфейсы</a:t>
-            </a:r>
-            <a:endParaRPr lang="en-US" sz="2400" b="1" dirty="0">
-              <a:solidFill>
-                <a:schemeClr val="bg1"/>
-              </a:solidFill>
-              <a:cs typeface="Times New Roman" pitchFamily="18" charset="0"/>
-            </a:endParaRPr>
-          </a:p>
-        </p:txBody>
-      </p:sp>
-      <p:sp>
-        <p:nvSpPr>
-          <p:cNvPr id="19459" name="TextBox 7"/>
-          <p:cNvSpPr txBox="1">
-            <a:spLocks noChangeArrowheads="1"/>
-          </p:cNvSpPr>
-          <p:nvPr/>
-        </p:nvSpPr>
-        <p:spPr bwMode="auto">
-          <a:xfrm>
-            <a:off x="152400" y="457200"/>
-            <a:ext cx="8839200" cy="2308324"/>
-          </a:xfrm>
-          <a:prstGeom prst="rect">
-            <a:avLst/>
-          </a:prstGeom>
-          <a:noFill/>
-          <a:ln>
-            <a:noFill/>
-          </a:ln>
-          <a:extLst>
-            <a:ext uri="{909E8E84-426E-40DD-AFC4-6F175D3DCCD1}">
-              <a14:hiddenFill xmlns:a14="http://schemas.microsoft.com/office/drawing/2010/main">
-                <a:solidFill>
-                  <a:srgbClr val="FFFFFF"/>
-                </a:solidFill>
-              </a14:hiddenFill>
-            </a:ext>
-            <a:ext uri="{91240B29-F687-4F45-9708-019B960494DF}">
-              <a14:hiddenLine xmlns:a14="http://schemas.microsoft.com/office/drawing/2010/main" w="9525">
-                <a:solidFill>
-                  <a:srgbClr val="000000"/>
-                </a:solidFill>
-                <a:miter lim="800000"/>
-                <a:headEnd/>
-                <a:tailEnd/>
-              </a14:hiddenLine>
-            </a:ext>
-          </a:extLst>
-        </p:spPr>
-        <p:txBody>
-          <a:bodyPr>
-            <a:spAutoFit/>
-          </a:bodyPr>
-          <a:lstStyle>
-            <a:lvl1pPr defTabSz="358775" eaLnBrk="0" hangingPunct="0">
-              <a:defRPr>
-                <a:solidFill>
-                  <a:schemeClr val="tx1"/>
-                </a:solidFill>
-                <a:latin typeface="Arial" charset="0"/>
-              </a:defRPr>
-            </a:lvl1pPr>
-            <a:lvl2pPr marL="742950" indent="-285750" defTabSz="358775" eaLnBrk="0" hangingPunct="0">
-              <a:defRPr>
-                <a:solidFill>
-                  <a:schemeClr val="tx1"/>
-                </a:solidFill>
-                <a:latin typeface="Arial" charset="0"/>
-              </a:defRPr>
-            </a:lvl2pPr>
-            <a:lvl3pPr marL="1143000" indent="-228600" defTabSz="358775" eaLnBrk="0" hangingPunct="0">
-              <a:defRPr>
-                <a:solidFill>
-                  <a:schemeClr val="tx1"/>
-                </a:solidFill>
-                <a:latin typeface="Arial" charset="0"/>
-              </a:defRPr>
-            </a:lvl3pPr>
-            <a:lvl4pPr marL="1600200" indent="-228600" defTabSz="358775" eaLnBrk="0" hangingPunct="0">
-              <a:defRPr>
-                <a:solidFill>
-                  <a:schemeClr val="tx1"/>
-                </a:solidFill>
-                <a:latin typeface="Arial" charset="0"/>
-              </a:defRPr>
-            </a:lvl4pPr>
-            <a:lvl5pPr marL="2057400" indent="-228600" defTabSz="358775" eaLnBrk="0" hangingPunct="0">
-              <a:defRPr>
-                <a:solidFill>
-                  <a:schemeClr val="tx1"/>
-                </a:solidFill>
-                <a:latin typeface="Arial" charset="0"/>
-              </a:defRPr>
-            </a:lvl5pPr>
-            <a:lvl6pPr marL="2514600" indent="-228600" defTabSz="358775" eaLnBrk="0" fontAlgn="base" hangingPunct="0">
-              <a:spcBef>
-                <a:spcPct val="0"/>
-              </a:spcBef>
-              <a:spcAft>
-                <a:spcPct val="0"/>
-              </a:spcAft>
-              <a:defRPr>
-                <a:solidFill>
-                  <a:schemeClr val="tx1"/>
-                </a:solidFill>
-                <a:latin typeface="Arial" charset="0"/>
-              </a:defRPr>
-            </a:lvl6pPr>
-            <a:lvl7pPr marL="2971800" indent="-228600" defTabSz="358775" eaLnBrk="0" fontAlgn="base" hangingPunct="0">
-              <a:spcBef>
-                <a:spcPct val="0"/>
-              </a:spcBef>
-              <a:spcAft>
-                <a:spcPct val="0"/>
-              </a:spcAft>
-              <a:defRPr>
-                <a:solidFill>
-                  <a:schemeClr val="tx1"/>
-                </a:solidFill>
-                <a:latin typeface="Arial" charset="0"/>
-              </a:defRPr>
-            </a:lvl7pPr>
-            <a:lvl8pPr marL="3429000" indent="-228600" defTabSz="358775" eaLnBrk="0" fontAlgn="base" hangingPunct="0">
-              <a:spcBef>
-                <a:spcPct val="0"/>
-              </a:spcBef>
-              <a:spcAft>
-                <a:spcPct val="0"/>
-              </a:spcAft>
-              <a:defRPr>
-                <a:solidFill>
-                  <a:schemeClr val="tx1"/>
-                </a:solidFill>
-                <a:latin typeface="Arial" charset="0"/>
-              </a:defRPr>
-            </a:lvl8pPr>
-            <a:lvl9pPr marL="3886200" indent="-228600" defTabSz="358775" eaLnBrk="0" fontAlgn="base" hangingPunct="0">
-              <a:spcBef>
-                <a:spcPct val="0"/>
-              </a:spcBef>
-              <a:spcAft>
-                <a:spcPct val="0"/>
-              </a:spcAft>
-              <a:defRPr>
-                <a:solidFill>
-                  <a:schemeClr val="tx1"/>
-                </a:solidFill>
-                <a:latin typeface="Arial" charset="0"/>
-              </a:defRPr>
-            </a:lvl9pPr>
-          </a:lstStyle>
-          <a:p>
-            <a:pPr eaLnBrk="1" hangingPunct="1"/>
-            <a:r>
-              <a:rPr lang="ru-RU" sz="1600" dirty="0" smtClean="0">
-                <a:solidFill>
-                  <a:schemeClr val="bg1"/>
-                </a:solidFill>
-              </a:rPr>
-              <a:t>Информацию </a:t>
-            </a:r>
-            <a:r>
-              <a:rPr lang="ru-RU" sz="1600" dirty="0">
-                <a:solidFill>
-                  <a:schemeClr val="bg1"/>
-                </a:solidFill>
-              </a:rPr>
-              <a:t>о большинстве интерфейсов можно посмотреть </a:t>
-            </a:r>
-            <a:r>
-              <a:rPr lang="ru-RU" sz="1600" dirty="0" smtClean="0">
-                <a:solidFill>
-                  <a:schemeClr val="bg1"/>
-                </a:solidFill>
-              </a:rPr>
-              <a:t>в </a:t>
-            </a:r>
-            <a:r>
-              <a:rPr lang="en-US" sz="1600" dirty="0" smtClean="0">
-                <a:solidFill>
-                  <a:schemeClr val="bg1"/>
-                </a:solidFill>
-              </a:rPr>
-              <a:t>Object Browser:</a:t>
-            </a:r>
-            <a:endParaRPr lang="ru-RU" sz="1600" dirty="0">
-              <a:solidFill>
-                <a:schemeClr val="bg1"/>
-              </a:solidFill>
-            </a:endParaRPr>
-          </a:p>
-          <a:p>
-            <a:pPr marL="1028700" lvl="1" eaLnBrk="1" hangingPunct="1">
-              <a:buFont typeface="Arial" pitchFamily="34" charset="0"/>
-              <a:buChar char="•"/>
-            </a:pPr>
-            <a:r>
-              <a:rPr lang="en-US" sz="1600" b="1" dirty="0" smtClean="0">
-                <a:solidFill>
-                  <a:schemeClr val="bg1"/>
-                </a:solidFill>
-                <a:latin typeface="Courier New" pitchFamily="49" charset="0"/>
-                <a:cs typeface="Courier New" pitchFamily="49" charset="0"/>
-              </a:rPr>
-              <a:t>View </a:t>
-            </a:r>
-            <a:r>
-              <a:rPr lang="en-US" sz="1600" b="1" dirty="0">
-                <a:solidFill>
-                  <a:schemeClr val="bg1"/>
-                </a:solidFill>
-                <a:latin typeface="Courier New" pitchFamily="49" charset="0"/>
-                <a:cs typeface="Courier New" pitchFamily="49" charset="0"/>
-              </a:rPr>
-              <a:t>&gt; Object Browser -&gt; </a:t>
-            </a:r>
-            <a:r>
-              <a:rPr lang="en-US" sz="1600" b="1" dirty="0" smtClean="0">
-                <a:solidFill>
-                  <a:schemeClr val="bg1"/>
-                </a:solidFill>
-                <a:latin typeface="Courier New" pitchFamily="49" charset="0"/>
-                <a:cs typeface="Courier New" pitchFamily="49" charset="0"/>
-              </a:rPr>
-              <a:t>system</a:t>
-            </a:r>
-          </a:p>
-          <a:p>
-            <a:pPr marL="1028700" lvl="1" eaLnBrk="1" hangingPunct="1">
-              <a:buFont typeface="Arial" pitchFamily="34" charset="0"/>
-              <a:buChar char="•"/>
-            </a:pPr>
-            <a:r>
-              <a:rPr lang="en-US" sz="1600" b="1" dirty="0" smtClean="0">
-                <a:solidFill>
-                  <a:schemeClr val="bg1"/>
-                </a:solidFill>
-                <a:latin typeface="Courier New" pitchFamily="49" charset="0"/>
-                <a:cs typeface="Courier New" pitchFamily="49" charset="0"/>
-              </a:rPr>
-              <a:t>View </a:t>
-            </a:r>
-            <a:r>
-              <a:rPr lang="en-US" sz="1600" b="1" dirty="0">
-                <a:solidFill>
-                  <a:schemeClr val="bg1"/>
-                </a:solidFill>
-                <a:latin typeface="Courier New" pitchFamily="49" charset="0"/>
-                <a:cs typeface="Courier New" pitchFamily="49" charset="0"/>
-              </a:rPr>
-              <a:t>&gt; Object Browser -&gt; </a:t>
-            </a:r>
-            <a:r>
-              <a:rPr lang="en-US" sz="1600" b="1" dirty="0" err="1">
-                <a:solidFill>
-                  <a:schemeClr val="bg1"/>
-                </a:solidFill>
-                <a:latin typeface="Courier New" pitchFamily="49" charset="0"/>
-                <a:cs typeface="Courier New" pitchFamily="49" charset="0"/>
-              </a:rPr>
-              <a:t>mscorlib</a:t>
-            </a:r>
-            <a:r>
-              <a:rPr lang="en-US" sz="1600" b="1" dirty="0">
-                <a:solidFill>
-                  <a:schemeClr val="bg1"/>
-                </a:solidFill>
-                <a:latin typeface="Courier New" pitchFamily="49" charset="0"/>
-                <a:cs typeface="Courier New" pitchFamily="49" charset="0"/>
-              </a:rPr>
-              <a:t> -&gt;</a:t>
-            </a:r>
-            <a:r>
-              <a:rPr lang="en-US" sz="1600" b="1" dirty="0" err="1" smtClean="0">
-                <a:solidFill>
-                  <a:schemeClr val="bg1"/>
-                </a:solidFill>
-                <a:latin typeface="Courier New" pitchFamily="49" charset="0"/>
-                <a:cs typeface="Courier New" pitchFamily="49" charset="0"/>
-              </a:rPr>
-              <a:t>System.Collections</a:t>
-            </a:r>
-            <a:endParaRPr lang="en-US" sz="1600" b="1" dirty="0" smtClean="0">
-              <a:solidFill>
-                <a:schemeClr val="bg1"/>
-              </a:solidFill>
-              <a:latin typeface="Courier New" pitchFamily="49" charset="0"/>
-              <a:cs typeface="Courier New" pitchFamily="49" charset="0"/>
-            </a:endParaRPr>
-          </a:p>
-          <a:p>
-            <a:pPr marL="1028700" lvl="1" eaLnBrk="1" hangingPunct="1">
-              <a:buFont typeface="Arial" pitchFamily="34" charset="0"/>
-              <a:buChar char="•"/>
-            </a:pPr>
-            <a:r>
-              <a:rPr lang="en-US" sz="1600" b="1" dirty="0" smtClean="0">
-                <a:solidFill>
-                  <a:schemeClr val="bg1"/>
-                </a:solidFill>
-                <a:latin typeface="Courier New" pitchFamily="49" charset="0"/>
-                <a:cs typeface="Courier New" pitchFamily="49" charset="0"/>
-              </a:rPr>
-              <a:t>View </a:t>
-            </a:r>
-            <a:r>
-              <a:rPr lang="en-US" sz="1600" b="1" dirty="0">
-                <a:solidFill>
-                  <a:schemeClr val="bg1"/>
-                </a:solidFill>
-                <a:latin typeface="Courier New" pitchFamily="49" charset="0"/>
-                <a:cs typeface="Courier New" pitchFamily="49" charset="0"/>
-              </a:rPr>
-              <a:t>&gt; Object Browser -&gt; </a:t>
-            </a:r>
-            <a:r>
-              <a:rPr lang="en-US" sz="1600" b="1" dirty="0" err="1">
-                <a:solidFill>
-                  <a:schemeClr val="bg1"/>
-                </a:solidFill>
-                <a:latin typeface="Courier New" pitchFamily="49" charset="0"/>
-                <a:cs typeface="Courier New" pitchFamily="49" charset="0"/>
-              </a:rPr>
-              <a:t>mscorlib</a:t>
-            </a:r>
-            <a:r>
-              <a:rPr lang="en-US" sz="1600" b="1" dirty="0">
-                <a:solidFill>
-                  <a:schemeClr val="bg1"/>
-                </a:solidFill>
-                <a:latin typeface="Courier New" pitchFamily="49" charset="0"/>
-                <a:cs typeface="Courier New" pitchFamily="49" charset="0"/>
-              </a:rPr>
-              <a:t> -&gt;</a:t>
-            </a:r>
-            <a:r>
-              <a:rPr lang="en-US" sz="1600" b="1" dirty="0" err="1" smtClean="0">
-                <a:solidFill>
-                  <a:schemeClr val="bg1"/>
-                </a:solidFill>
-                <a:latin typeface="Courier New" pitchFamily="49" charset="0"/>
-                <a:cs typeface="Courier New" pitchFamily="49" charset="0"/>
-              </a:rPr>
-              <a:t>System.Collections.Generic</a:t>
-            </a:r>
-            <a:endParaRPr lang="en-US" sz="1600" b="1" dirty="0" smtClean="0">
-              <a:solidFill>
-                <a:schemeClr val="bg1"/>
-              </a:solidFill>
-              <a:latin typeface="Courier New" pitchFamily="49" charset="0"/>
-              <a:cs typeface="Courier New" pitchFamily="49" charset="0"/>
-            </a:endParaRPr>
-          </a:p>
-          <a:p>
-            <a:pPr eaLnBrk="1" hangingPunct="1"/>
-            <a:endParaRPr lang="en-US" sz="1600" b="1" dirty="0" smtClean="0">
-              <a:solidFill>
-                <a:schemeClr val="bg1"/>
-              </a:solidFill>
-              <a:latin typeface="Courier New" pitchFamily="49" charset="0"/>
-              <a:cs typeface="Courier New" pitchFamily="49" charset="0"/>
-            </a:endParaRPr>
-          </a:p>
-          <a:p>
-            <a:pPr eaLnBrk="1" hangingPunct="1"/>
-            <a:r>
-              <a:rPr lang="ru-RU" sz="1600" b="1" dirty="0" smtClean="0">
-                <a:solidFill>
-                  <a:schemeClr val="bg1"/>
-                </a:solidFill>
-                <a:latin typeface="Courier New" pitchFamily="49" charset="0"/>
-                <a:cs typeface="Courier New" pitchFamily="49" charset="0"/>
-              </a:rPr>
-              <a:t>Другие полезные интерфейсы</a:t>
-            </a:r>
-          </a:p>
-          <a:p>
-            <a:pPr marL="1028700" lvl="1" eaLnBrk="1" hangingPunct="1">
-              <a:buFont typeface="Arial" pitchFamily="34" charset="0"/>
-              <a:buChar char="•"/>
-            </a:pPr>
-            <a:r>
-              <a:rPr lang="en-US" sz="1600" b="1" dirty="0" err="1" smtClean="0">
-                <a:solidFill>
-                  <a:schemeClr val="bg1"/>
-                </a:solidFill>
-                <a:latin typeface="Courier New" pitchFamily="49" charset="0"/>
-                <a:cs typeface="Courier New" pitchFamily="49" charset="0"/>
-              </a:rPr>
-              <a:t>System.IEnumerable</a:t>
-            </a:r>
-            <a:r>
-              <a:rPr lang="en-US" sz="1600" b="1" dirty="0" smtClean="0">
-                <a:solidFill>
-                  <a:schemeClr val="bg1"/>
-                </a:solidFill>
-                <a:latin typeface="Courier New" pitchFamily="49" charset="0"/>
-                <a:cs typeface="Courier New" pitchFamily="49" charset="0"/>
-              </a:rPr>
-              <a:t>, </a:t>
-            </a:r>
-            <a:r>
-              <a:rPr lang="en-US" sz="1600" b="1" dirty="0" err="1" smtClean="0">
-                <a:solidFill>
-                  <a:schemeClr val="bg1"/>
-                </a:solidFill>
-                <a:latin typeface="Courier New" pitchFamily="49" charset="0"/>
-                <a:cs typeface="Courier New" pitchFamily="49" charset="0"/>
-              </a:rPr>
-              <a:t>System.Collections.Generic.IEnumerable</a:t>
-            </a:r>
-            <a:r>
-              <a:rPr lang="en-US" sz="1600" b="1" dirty="0" smtClean="0">
-                <a:solidFill>
-                  <a:schemeClr val="bg1"/>
-                </a:solidFill>
-                <a:latin typeface="Courier New" pitchFamily="49" charset="0"/>
-                <a:cs typeface="Courier New" pitchFamily="49" charset="0"/>
-              </a:rPr>
-              <a:t>&lt;T&gt;</a:t>
-            </a:r>
-          </a:p>
-          <a:p>
-            <a:pPr marL="1028700" lvl="1" eaLnBrk="1" hangingPunct="1">
-              <a:buFont typeface="Arial" pitchFamily="34" charset="0"/>
-              <a:buChar char="•"/>
-            </a:pPr>
-            <a:r>
-              <a:rPr lang="en-US" sz="1600" b="1" dirty="0" err="1" smtClean="0">
-                <a:solidFill>
-                  <a:schemeClr val="bg1"/>
-                </a:solidFill>
-                <a:latin typeface="Courier New" pitchFamily="49" charset="0"/>
-                <a:cs typeface="Courier New" pitchFamily="49" charset="0"/>
-              </a:rPr>
-              <a:t>System.IDisposable</a:t>
-            </a:r>
-            <a:endParaRPr lang="en-US" sz="1600" b="1" dirty="0">
-              <a:solidFill>
-                <a:schemeClr val="bg1"/>
-              </a:solidFill>
-              <a:latin typeface="Courier New" pitchFamily="49" charset="0"/>
-              <a:cs typeface="Courier New" pitchFamily="49" charset="0"/>
-            </a:endParaRPr>
-          </a:p>
-          <a:p>
-            <a:pPr eaLnBrk="1" hangingPunct="1"/>
-            <a:endParaRPr lang="ru-RU" sz="1600" b="1" dirty="0">
-              <a:solidFill>
-                <a:schemeClr val="bg1"/>
-              </a:solidFill>
-              <a:latin typeface="Courier New" pitchFamily="49" charset="0"/>
-              <a:cs typeface="Courier New" pitchFamily="49" charset="0"/>
-            </a:endParaRPr>
-          </a:p>
-        </p:txBody>
-      </p:sp>
-    </p:spTree>
-    <p:extLst>
-      <p:ext uri="{BB962C8B-B14F-4D97-AF65-F5344CB8AC3E}">
-        <p14:creationId xmlns:p14="http://schemas.microsoft.com/office/powerpoint/2010/main" val="629269632"/>
       </p:ext>
     </p:extLst>
   </p:cSld>
@@ -14238,6 +13791,574 @@
       </p:grpSpPr>
       <p:sp>
         <p:nvSpPr>
+          <p:cNvPr id="19458" name="Rectangle 1"/>
+          <p:cNvSpPr>
+            <a:spLocks noChangeArrowheads="1"/>
+          </p:cNvSpPr>
+          <p:nvPr/>
+        </p:nvSpPr>
+        <p:spPr bwMode="auto">
+          <a:xfrm>
+            <a:off x="381000" y="-4763"/>
+            <a:ext cx="8305800" cy="461963"/>
+          </a:xfrm>
+          <a:prstGeom prst="rect">
+            <a:avLst/>
+          </a:prstGeom>
+          <a:noFill/>
+          <a:ln>
+            <a:noFill/>
+          </a:ln>
+          <a:extLst>
+            <a:ext uri="{909E8E84-426E-40DD-AFC4-6F175D3DCCD1}">
+              <a14:hiddenFill xmlns:a14="http://schemas.microsoft.com/office/drawing/2010/main">
+                <a:solidFill>
+                  <a:srgbClr val="FFFFFF"/>
+                </a:solidFill>
+              </a14:hiddenFill>
+            </a:ext>
+            <a:ext uri="{91240B29-F687-4F45-9708-019B960494DF}">
+              <a14:hiddenLine xmlns:a14="http://schemas.microsoft.com/office/drawing/2010/main" w="9525">
+                <a:solidFill>
+                  <a:srgbClr val="000000"/>
+                </a:solidFill>
+                <a:miter lim="800000"/>
+                <a:headEnd/>
+                <a:tailEnd/>
+              </a14:hiddenLine>
+            </a:ext>
+          </a:extLst>
+        </p:spPr>
+        <p:txBody>
+          <a:bodyPr anchor="ctr">
+            <a:spAutoFit/>
+          </a:bodyPr>
+          <a:lstStyle/>
+          <a:p>
+            <a:pPr algn="ctr">
+              <a:tabLst>
+                <a:tab pos="457200" algn="l"/>
+              </a:tabLst>
+            </a:pPr>
+            <a:r>
+              <a:rPr lang="ru-RU" sz="2400" b="1" dirty="0">
+                <a:solidFill>
+                  <a:schemeClr val="bg1"/>
+                </a:solidFill>
+                <a:cs typeface="Times New Roman" pitchFamily="18" charset="0"/>
+              </a:rPr>
+              <a:t>Интерфейсы</a:t>
+            </a:r>
+            <a:endParaRPr lang="en-US" sz="2400" b="1" dirty="0">
+              <a:solidFill>
+                <a:schemeClr val="bg1"/>
+              </a:solidFill>
+              <a:cs typeface="Times New Roman" pitchFamily="18" charset="0"/>
+            </a:endParaRPr>
+          </a:p>
+        </p:txBody>
+      </p:sp>
+      <p:sp>
+        <p:nvSpPr>
+          <p:cNvPr id="19459" name="TextBox 7"/>
+          <p:cNvSpPr txBox="1">
+            <a:spLocks noChangeArrowheads="1"/>
+          </p:cNvSpPr>
+          <p:nvPr/>
+        </p:nvSpPr>
+        <p:spPr bwMode="auto">
+          <a:xfrm>
+            <a:off x="152400" y="457200"/>
+            <a:ext cx="8839200" cy="2308324"/>
+          </a:xfrm>
+          <a:prstGeom prst="rect">
+            <a:avLst/>
+          </a:prstGeom>
+          <a:noFill/>
+          <a:ln>
+            <a:noFill/>
+          </a:ln>
+          <a:extLst>
+            <a:ext uri="{909E8E84-426E-40DD-AFC4-6F175D3DCCD1}">
+              <a14:hiddenFill xmlns:a14="http://schemas.microsoft.com/office/drawing/2010/main">
+                <a:solidFill>
+                  <a:srgbClr val="FFFFFF"/>
+                </a:solidFill>
+              </a14:hiddenFill>
+            </a:ext>
+            <a:ext uri="{91240B29-F687-4F45-9708-019B960494DF}">
+              <a14:hiddenLine xmlns:a14="http://schemas.microsoft.com/office/drawing/2010/main" w="9525">
+                <a:solidFill>
+                  <a:srgbClr val="000000"/>
+                </a:solidFill>
+                <a:miter lim="800000"/>
+                <a:headEnd/>
+                <a:tailEnd/>
+              </a14:hiddenLine>
+            </a:ext>
+          </a:extLst>
+        </p:spPr>
+        <p:txBody>
+          <a:bodyPr>
+            <a:spAutoFit/>
+          </a:bodyPr>
+          <a:lstStyle>
+            <a:lvl1pPr defTabSz="358775" eaLnBrk="0" hangingPunct="0">
+              <a:defRPr>
+                <a:solidFill>
+                  <a:schemeClr val="tx1"/>
+                </a:solidFill>
+                <a:latin typeface="Arial" charset="0"/>
+              </a:defRPr>
+            </a:lvl1pPr>
+            <a:lvl2pPr marL="742950" indent="-285750" defTabSz="358775" eaLnBrk="0" hangingPunct="0">
+              <a:defRPr>
+                <a:solidFill>
+                  <a:schemeClr val="tx1"/>
+                </a:solidFill>
+                <a:latin typeface="Arial" charset="0"/>
+              </a:defRPr>
+            </a:lvl2pPr>
+            <a:lvl3pPr marL="1143000" indent="-228600" defTabSz="358775" eaLnBrk="0" hangingPunct="0">
+              <a:defRPr>
+                <a:solidFill>
+                  <a:schemeClr val="tx1"/>
+                </a:solidFill>
+                <a:latin typeface="Arial" charset="0"/>
+              </a:defRPr>
+            </a:lvl3pPr>
+            <a:lvl4pPr marL="1600200" indent="-228600" defTabSz="358775" eaLnBrk="0" hangingPunct="0">
+              <a:defRPr>
+                <a:solidFill>
+                  <a:schemeClr val="tx1"/>
+                </a:solidFill>
+                <a:latin typeface="Arial" charset="0"/>
+              </a:defRPr>
+            </a:lvl4pPr>
+            <a:lvl5pPr marL="2057400" indent="-228600" defTabSz="358775" eaLnBrk="0" hangingPunct="0">
+              <a:defRPr>
+                <a:solidFill>
+                  <a:schemeClr val="tx1"/>
+                </a:solidFill>
+                <a:latin typeface="Arial" charset="0"/>
+              </a:defRPr>
+            </a:lvl5pPr>
+            <a:lvl6pPr marL="2514600" indent="-228600" defTabSz="358775" eaLnBrk="0" fontAlgn="base" hangingPunct="0">
+              <a:spcBef>
+                <a:spcPct val="0"/>
+              </a:spcBef>
+              <a:spcAft>
+                <a:spcPct val="0"/>
+              </a:spcAft>
+              <a:defRPr>
+                <a:solidFill>
+                  <a:schemeClr val="tx1"/>
+                </a:solidFill>
+                <a:latin typeface="Arial" charset="0"/>
+              </a:defRPr>
+            </a:lvl6pPr>
+            <a:lvl7pPr marL="2971800" indent="-228600" defTabSz="358775" eaLnBrk="0" fontAlgn="base" hangingPunct="0">
+              <a:spcBef>
+                <a:spcPct val="0"/>
+              </a:spcBef>
+              <a:spcAft>
+                <a:spcPct val="0"/>
+              </a:spcAft>
+              <a:defRPr>
+                <a:solidFill>
+                  <a:schemeClr val="tx1"/>
+                </a:solidFill>
+                <a:latin typeface="Arial" charset="0"/>
+              </a:defRPr>
+            </a:lvl7pPr>
+            <a:lvl8pPr marL="3429000" indent="-228600" defTabSz="358775" eaLnBrk="0" fontAlgn="base" hangingPunct="0">
+              <a:spcBef>
+                <a:spcPct val="0"/>
+              </a:spcBef>
+              <a:spcAft>
+                <a:spcPct val="0"/>
+              </a:spcAft>
+              <a:defRPr>
+                <a:solidFill>
+                  <a:schemeClr val="tx1"/>
+                </a:solidFill>
+                <a:latin typeface="Arial" charset="0"/>
+              </a:defRPr>
+            </a:lvl8pPr>
+            <a:lvl9pPr marL="3886200" indent="-228600" defTabSz="358775" eaLnBrk="0" fontAlgn="base" hangingPunct="0">
+              <a:spcBef>
+                <a:spcPct val="0"/>
+              </a:spcBef>
+              <a:spcAft>
+                <a:spcPct val="0"/>
+              </a:spcAft>
+              <a:defRPr>
+                <a:solidFill>
+                  <a:schemeClr val="tx1"/>
+                </a:solidFill>
+                <a:latin typeface="Arial" charset="0"/>
+              </a:defRPr>
+            </a:lvl9pPr>
+          </a:lstStyle>
+          <a:p>
+            <a:pPr eaLnBrk="1" hangingPunct="1"/>
+            <a:r>
+              <a:rPr lang="ru-RU" sz="1600" dirty="0" smtClean="0">
+                <a:solidFill>
+                  <a:schemeClr val="bg1"/>
+                </a:solidFill>
+              </a:rPr>
+              <a:t>Информацию </a:t>
+            </a:r>
+            <a:r>
+              <a:rPr lang="ru-RU" sz="1600" dirty="0">
+                <a:solidFill>
+                  <a:schemeClr val="bg1"/>
+                </a:solidFill>
+              </a:rPr>
+              <a:t>о большинстве интерфейсов можно посмотреть </a:t>
+            </a:r>
+            <a:r>
+              <a:rPr lang="ru-RU" sz="1600" dirty="0" smtClean="0">
+                <a:solidFill>
+                  <a:schemeClr val="bg1"/>
+                </a:solidFill>
+              </a:rPr>
+              <a:t>в </a:t>
+            </a:r>
+            <a:r>
+              <a:rPr lang="en-US" sz="1600" dirty="0" smtClean="0">
+                <a:solidFill>
+                  <a:schemeClr val="bg1"/>
+                </a:solidFill>
+              </a:rPr>
+              <a:t>Object Browser:</a:t>
+            </a:r>
+            <a:endParaRPr lang="ru-RU" sz="1600" dirty="0">
+              <a:solidFill>
+                <a:schemeClr val="bg1"/>
+              </a:solidFill>
+            </a:endParaRPr>
+          </a:p>
+          <a:p>
+            <a:pPr marL="1028700" lvl="1" eaLnBrk="1" hangingPunct="1">
+              <a:buFont typeface="Arial" pitchFamily="34" charset="0"/>
+              <a:buChar char="•"/>
+            </a:pPr>
+            <a:r>
+              <a:rPr lang="en-US" sz="1600" b="1" dirty="0" smtClean="0">
+                <a:solidFill>
+                  <a:schemeClr val="bg1"/>
+                </a:solidFill>
+                <a:latin typeface="Courier New" pitchFamily="49" charset="0"/>
+                <a:cs typeface="Courier New" pitchFamily="49" charset="0"/>
+              </a:rPr>
+              <a:t>View </a:t>
+            </a:r>
+            <a:r>
+              <a:rPr lang="en-US" sz="1600" b="1" dirty="0">
+                <a:solidFill>
+                  <a:schemeClr val="bg1"/>
+                </a:solidFill>
+                <a:latin typeface="Courier New" pitchFamily="49" charset="0"/>
+                <a:cs typeface="Courier New" pitchFamily="49" charset="0"/>
+              </a:rPr>
+              <a:t>&gt; Object Browser -&gt; </a:t>
+            </a:r>
+            <a:r>
+              <a:rPr lang="en-US" sz="1600" b="1" dirty="0" smtClean="0">
+                <a:solidFill>
+                  <a:schemeClr val="bg1"/>
+                </a:solidFill>
+                <a:latin typeface="Courier New" pitchFamily="49" charset="0"/>
+                <a:cs typeface="Courier New" pitchFamily="49" charset="0"/>
+              </a:rPr>
+              <a:t>system</a:t>
+            </a:r>
+          </a:p>
+          <a:p>
+            <a:pPr marL="1028700" lvl="1" eaLnBrk="1" hangingPunct="1">
+              <a:buFont typeface="Arial" pitchFamily="34" charset="0"/>
+              <a:buChar char="•"/>
+            </a:pPr>
+            <a:r>
+              <a:rPr lang="en-US" sz="1600" b="1" dirty="0" smtClean="0">
+                <a:solidFill>
+                  <a:schemeClr val="bg1"/>
+                </a:solidFill>
+                <a:latin typeface="Courier New" pitchFamily="49" charset="0"/>
+                <a:cs typeface="Courier New" pitchFamily="49" charset="0"/>
+              </a:rPr>
+              <a:t>View </a:t>
+            </a:r>
+            <a:r>
+              <a:rPr lang="en-US" sz="1600" b="1" dirty="0">
+                <a:solidFill>
+                  <a:schemeClr val="bg1"/>
+                </a:solidFill>
+                <a:latin typeface="Courier New" pitchFamily="49" charset="0"/>
+                <a:cs typeface="Courier New" pitchFamily="49" charset="0"/>
+              </a:rPr>
+              <a:t>&gt; Object Browser -&gt; </a:t>
+            </a:r>
+            <a:r>
+              <a:rPr lang="en-US" sz="1600" b="1" dirty="0" err="1">
+                <a:solidFill>
+                  <a:schemeClr val="bg1"/>
+                </a:solidFill>
+                <a:latin typeface="Courier New" pitchFamily="49" charset="0"/>
+                <a:cs typeface="Courier New" pitchFamily="49" charset="0"/>
+              </a:rPr>
+              <a:t>mscorlib</a:t>
+            </a:r>
+            <a:r>
+              <a:rPr lang="en-US" sz="1600" b="1" dirty="0">
+                <a:solidFill>
+                  <a:schemeClr val="bg1"/>
+                </a:solidFill>
+                <a:latin typeface="Courier New" pitchFamily="49" charset="0"/>
+                <a:cs typeface="Courier New" pitchFamily="49" charset="0"/>
+              </a:rPr>
+              <a:t> -&gt;</a:t>
+            </a:r>
+            <a:r>
+              <a:rPr lang="en-US" sz="1600" b="1" dirty="0" err="1" smtClean="0">
+                <a:solidFill>
+                  <a:schemeClr val="bg1"/>
+                </a:solidFill>
+                <a:latin typeface="Courier New" pitchFamily="49" charset="0"/>
+                <a:cs typeface="Courier New" pitchFamily="49" charset="0"/>
+              </a:rPr>
+              <a:t>System.Collections</a:t>
+            </a:r>
+            <a:endParaRPr lang="en-US" sz="1600" b="1" dirty="0" smtClean="0">
+              <a:solidFill>
+                <a:schemeClr val="bg1"/>
+              </a:solidFill>
+              <a:latin typeface="Courier New" pitchFamily="49" charset="0"/>
+              <a:cs typeface="Courier New" pitchFamily="49" charset="0"/>
+            </a:endParaRPr>
+          </a:p>
+          <a:p>
+            <a:pPr marL="1028700" lvl="1" eaLnBrk="1" hangingPunct="1">
+              <a:buFont typeface="Arial" pitchFamily="34" charset="0"/>
+              <a:buChar char="•"/>
+            </a:pPr>
+            <a:r>
+              <a:rPr lang="en-US" sz="1600" b="1" dirty="0" smtClean="0">
+                <a:solidFill>
+                  <a:schemeClr val="bg1"/>
+                </a:solidFill>
+                <a:latin typeface="Courier New" pitchFamily="49" charset="0"/>
+                <a:cs typeface="Courier New" pitchFamily="49" charset="0"/>
+              </a:rPr>
+              <a:t>View </a:t>
+            </a:r>
+            <a:r>
+              <a:rPr lang="en-US" sz="1600" b="1" dirty="0">
+                <a:solidFill>
+                  <a:schemeClr val="bg1"/>
+                </a:solidFill>
+                <a:latin typeface="Courier New" pitchFamily="49" charset="0"/>
+                <a:cs typeface="Courier New" pitchFamily="49" charset="0"/>
+              </a:rPr>
+              <a:t>&gt; Object Browser -&gt; </a:t>
+            </a:r>
+            <a:r>
+              <a:rPr lang="en-US" sz="1600" b="1" dirty="0" err="1">
+                <a:solidFill>
+                  <a:schemeClr val="bg1"/>
+                </a:solidFill>
+                <a:latin typeface="Courier New" pitchFamily="49" charset="0"/>
+                <a:cs typeface="Courier New" pitchFamily="49" charset="0"/>
+              </a:rPr>
+              <a:t>mscorlib</a:t>
+            </a:r>
+            <a:r>
+              <a:rPr lang="en-US" sz="1600" b="1" dirty="0">
+                <a:solidFill>
+                  <a:schemeClr val="bg1"/>
+                </a:solidFill>
+                <a:latin typeface="Courier New" pitchFamily="49" charset="0"/>
+                <a:cs typeface="Courier New" pitchFamily="49" charset="0"/>
+              </a:rPr>
+              <a:t> -&gt;</a:t>
+            </a:r>
+            <a:r>
+              <a:rPr lang="en-US" sz="1600" b="1" dirty="0" err="1" smtClean="0">
+                <a:solidFill>
+                  <a:schemeClr val="bg1"/>
+                </a:solidFill>
+                <a:latin typeface="Courier New" pitchFamily="49" charset="0"/>
+                <a:cs typeface="Courier New" pitchFamily="49" charset="0"/>
+              </a:rPr>
+              <a:t>System.Collections.Generic</a:t>
+            </a:r>
+            <a:endParaRPr lang="en-US" sz="1600" b="1" dirty="0" smtClean="0">
+              <a:solidFill>
+                <a:schemeClr val="bg1"/>
+              </a:solidFill>
+              <a:latin typeface="Courier New" pitchFamily="49" charset="0"/>
+              <a:cs typeface="Courier New" pitchFamily="49" charset="0"/>
+            </a:endParaRPr>
+          </a:p>
+          <a:p>
+            <a:pPr eaLnBrk="1" hangingPunct="1"/>
+            <a:endParaRPr lang="en-US" sz="1600" b="1" dirty="0" smtClean="0">
+              <a:solidFill>
+                <a:schemeClr val="bg1"/>
+              </a:solidFill>
+              <a:latin typeface="Courier New" pitchFamily="49" charset="0"/>
+              <a:cs typeface="Courier New" pitchFamily="49" charset="0"/>
+            </a:endParaRPr>
+          </a:p>
+          <a:p>
+            <a:pPr eaLnBrk="1" hangingPunct="1"/>
+            <a:r>
+              <a:rPr lang="ru-RU" sz="1600" b="1" dirty="0" smtClean="0">
+                <a:solidFill>
+                  <a:schemeClr val="bg1"/>
+                </a:solidFill>
+                <a:latin typeface="Courier New" pitchFamily="49" charset="0"/>
+                <a:cs typeface="Courier New" pitchFamily="49" charset="0"/>
+              </a:rPr>
+              <a:t>Другие полезные интерфейсы</a:t>
+            </a:r>
+          </a:p>
+          <a:p>
+            <a:pPr marL="1028700" lvl="1" eaLnBrk="1" hangingPunct="1">
+              <a:buFont typeface="Arial" pitchFamily="34" charset="0"/>
+              <a:buChar char="•"/>
+            </a:pPr>
+            <a:r>
+              <a:rPr lang="en-US" sz="1600" b="1" dirty="0" err="1" smtClean="0">
+                <a:solidFill>
+                  <a:schemeClr val="bg1"/>
+                </a:solidFill>
+                <a:latin typeface="Courier New" pitchFamily="49" charset="0"/>
+                <a:cs typeface="Courier New" pitchFamily="49" charset="0"/>
+              </a:rPr>
+              <a:t>System.IEnumerable</a:t>
+            </a:r>
+            <a:r>
+              <a:rPr lang="en-US" sz="1600" b="1" dirty="0" smtClean="0">
+                <a:solidFill>
+                  <a:schemeClr val="bg1"/>
+                </a:solidFill>
+                <a:latin typeface="Courier New" pitchFamily="49" charset="0"/>
+                <a:cs typeface="Courier New" pitchFamily="49" charset="0"/>
+              </a:rPr>
+              <a:t>, </a:t>
+            </a:r>
+            <a:r>
+              <a:rPr lang="en-US" sz="1600" b="1" dirty="0" err="1" smtClean="0">
+                <a:solidFill>
+                  <a:schemeClr val="bg1"/>
+                </a:solidFill>
+                <a:latin typeface="Courier New" pitchFamily="49" charset="0"/>
+                <a:cs typeface="Courier New" pitchFamily="49" charset="0"/>
+              </a:rPr>
+              <a:t>System.Collections.Generic.IEnumerable</a:t>
+            </a:r>
+            <a:r>
+              <a:rPr lang="en-US" sz="1600" b="1" dirty="0" smtClean="0">
+                <a:solidFill>
+                  <a:schemeClr val="bg1"/>
+                </a:solidFill>
+                <a:latin typeface="Courier New" pitchFamily="49" charset="0"/>
+                <a:cs typeface="Courier New" pitchFamily="49" charset="0"/>
+              </a:rPr>
+              <a:t>&lt;T&gt;</a:t>
+            </a:r>
+          </a:p>
+          <a:p>
+            <a:pPr marL="1028700" lvl="1" eaLnBrk="1" hangingPunct="1">
+              <a:buFont typeface="Arial" pitchFamily="34" charset="0"/>
+              <a:buChar char="•"/>
+            </a:pPr>
+            <a:r>
+              <a:rPr lang="en-US" sz="1600" b="1" dirty="0" err="1" smtClean="0">
+                <a:solidFill>
+                  <a:schemeClr val="bg1"/>
+                </a:solidFill>
+                <a:latin typeface="Courier New" pitchFamily="49" charset="0"/>
+                <a:cs typeface="Courier New" pitchFamily="49" charset="0"/>
+              </a:rPr>
+              <a:t>System.IDisposable</a:t>
+            </a:r>
+            <a:endParaRPr lang="en-US" sz="1600" b="1" dirty="0">
+              <a:solidFill>
+                <a:schemeClr val="bg1"/>
+              </a:solidFill>
+              <a:latin typeface="Courier New" pitchFamily="49" charset="0"/>
+              <a:cs typeface="Courier New" pitchFamily="49" charset="0"/>
+            </a:endParaRPr>
+          </a:p>
+          <a:p>
+            <a:pPr eaLnBrk="1" hangingPunct="1"/>
+            <a:endParaRPr lang="ru-RU" sz="1600" b="1" dirty="0">
+              <a:solidFill>
+                <a:schemeClr val="bg1"/>
+              </a:solidFill>
+              <a:latin typeface="Courier New" pitchFamily="49" charset="0"/>
+              <a:cs typeface="Courier New" pitchFamily="49" charset="0"/>
+            </a:endParaRPr>
+          </a:p>
+        </p:txBody>
+      </p:sp>
+    </p:spTree>
+    <p:extLst>
+      <p:ext uri="{BB962C8B-B14F-4D97-AF65-F5344CB8AC3E}">
+        <p14:creationId xmlns:p14="http://schemas.microsoft.com/office/powerpoint/2010/main" val="629269632"/>
+      </p:ext>
+    </p:extLst>
+  </p:cSld>
+  <p:clrMapOvr>
+    <a:masterClrMapping/>
+  </p:clrMapOvr>
+  <p:timing>
+    <p:tnLst>
+      <p:par>
+        <p:cTn id="1" dur="indefinite" restart="never" nodeType="tmRoot"/>
+      </p:par>
+    </p:tnLst>
+  </p:timing>
+</p:sld>
+</file>
+
+<file path=ppt/slides/slide21.xml><?xml version="1.0" encoding="utf-8"?>
+<p:sld xmlns:a="http://schemas.openxmlformats.org/drawingml/2006/main" xmlns:r="http://schemas.openxmlformats.org/officeDocument/2006/relationships" xmlns:p="http://schemas.openxmlformats.org/presentationml/2006/main">
+  <p:cSld>
+    <p:bg>
+      <p:bgPr>
+        <a:blipFill dpi="0" rotWithShape="1">
+          <a:blip r:embed="rId2">
+            <a:lum/>
+          </a:blip>
+          <a:srcRect/>
+          <a:stretch>
+            <a:fillRect/>
+          </a:stretch>
+        </a:blipFill>
+        <a:effectLst/>
+      </p:bgPr>
+    </p:bg>
+    <p:spTree>
+      <p:nvGrpSpPr>
+        <p:cNvPr id="1" name=""/>
+        <p:cNvGrpSpPr/>
+        <p:nvPr/>
+      </p:nvGrpSpPr>
+      <p:grpSpPr>
+        <a:xfrm>
+          <a:off x="0" y="0"/>
+          <a:ext cx="0" cy="0"/>
+          <a:chOff x="0" y="0"/>
+          <a:chExt cx="0" cy="0"/>
+        </a:xfrm>
+      </p:grpSpPr>
+      <p:sp>
+        <p:nvSpPr>
           <p:cNvPr id="20482" name="Rectangle 1"/>
           <p:cNvSpPr>
             <a:spLocks noChangeArrowheads="1"/>
@@ -14696,7 +14817,7 @@
 </p:sld>
 </file>
 
-<file path=ppt/slides/slide21.xml><?xml version="1.0" encoding="utf-8"?>
+<file path=ppt/slides/slide22.xml><?xml version="1.0" encoding="utf-8"?>
 <p:sld xmlns:a="http://schemas.openxmlformats.org/drawingml/2006/main" xmlns:r="http://schemas.openxmlformats.org/officeDocument/2006/relationships" xmlns:p="http://schemas.openxmlformats.org/presentationml/2006/main">
   <p:cSld>
     <p:bg>
@@ -15732,7 +15853,7 @@
 </p:sld>
 </file>
 
-<file path=ppt/slides/slide22.xml><?xml version="1.0" encoding="utf-8"?>
+<file path=ppt/slides/slide23.xml><?xml version="1.0" encoding="utf-8"?>
 <p:sld xmlns:a="http://schemas.openxmlformats.org/drawingml/2006/main" xmlns:r="http://schemas.openxmlformats.org/officeDocument/2006/relationships" xmlns:p="http://schemas.openxmlformats.org/presentationml/2006/main">
   <p:cSld>
     <p:bg>
@@ -15839,16 +15960,7 @@
                 </a:solidFill>
                 <a:cs typeface="Times New Roman" pitchFamily="18" charset="0"/>
               </a:rPr>
-              <a:t>System.Collection</a:t>
-            </a:r>
-            <a:r>
-              <a:rPr lang="en-US" sz="2400" b="1" dirty="0" err="1" smtClean="0">
-                <a:solidFill>
-                  <a:schemeClr val="bg1"/>
-                </a:solidFill>
-                <a:cs typeface="Times New Roman" pitchFamily="18" charset="0"/>
-              </a:rPr>
-              <a:t>s.Generic</a:t>
+              <a:t>System.Collections.Generic</a:t>
             </a:r>
             <a:endParaRPr lang="en-US" sz="1200" dirty="0">
               <a:solidFill>
@@ -16347,7 +16459,7 @@
 </p:sld>
 </file>
 
-<file path=ppt/slides/slide23.xml><?xml version="1.0" encoding="utf-8"?>
+<file path=ppt/slides/slide24.xml><?xml version="1.0" encoding="utf-8"?>
 <p:sld xmlns:a="http://schemas.openxmlformats.org/drawingml/2006/main" xmlns:r="http://schemas.openxmlformats.org/officeDocument/2006/relationships" xmlns:p="http://schemas.openxmlformats.org/presentationml/2006/main">
   <p:cSld>
     <p:bg>
@@ -17632,7 +17744,7 @@
 </p:sld>
 </file>
 
-<file path=ppt/slides/slide24.xml><?xml version="1.0" encoding="utf-8"?>
+<file path=ppt/slides/slide25.xml><?xml version="1.0" encoding="utf-8"?>
 <p:sld xmlns:a="http://schemas.openxmlformats.org/drawingml/2006/main" xmlns:r="http://schemas.openxmlformats.org/officeDocument/2006/relationships" xmlns:p="http://schemas.openxmlformats.org/presentationml/2006/main">
   <p:cSld>
     <p:bg>
@@ -17979,7 +18091,7 @@
 </p:sld>
 </file>
 
-<file path=ppt/slides/slide25.xml><?xml version="1.0" encoding="utf-8"?>
+<file path=ppt/slides/slide26.xml><?xml version="1.0" encoding="utf-8"?>
 <p:sld xmlns:a="http://schemas.openxmlformats.org/drawingml/2006/main" xmlns:r="http://schemas.openxmlformats.org/officeDocument/2006/relationships" xmlns:p="http://schemas.openxmlformats.org/presentationml/2006/main">
   <p:cSld>
     <p:bg>

</xml_diff>